<commit_message>
Updated the example plots.
</commit_message>
<xml_diff>
--- a/Example of Plots.pptx
+++ b/Example of Plots.pptx
@@ -5,9 +5,9 @@
     <p:sldMasterId id="2147483648" r:id="rId4"/>
   </p:sldMasterIdLst>
   <p:sldIdLst>
-    <p:sldId id="289" r:id="rId5"/>
-    <p:sldId id="277" r:id="rId6"/>
-    <p:sldId id="268" r:id="rId7"/>
+    <p:sldId id="277" r:id="rId5"/>
+    <p:sldId id="268" r:id="rId6"/>
+    <p:sldId id="289" r:id="rId7"/>
     <p:sldId id="258" r:id="rId8"/>
     <p:sldId id="262" r:id="rId9"/>
     <p:sldId id="279" r:id="rId10"/>
@@ -114,7 +114,7 @@
   </p:defaultTextStyle>
   <p:extLst>
     <p:ext uri="{EFAFB233-063F-42B5-8137-9DF3F51BA10A}">
-      <p15:sldGuideLst xmlns="" xmlns:p15="http://schemas.microsoft.com/office/powerpoint/2012/main">
+      <p15:sldGuideLst xmlns:p15="http://schemas.microsoft.com/office/powerpoint/2012/main" xmlns="">
         <p15:guide id="1" orient="horz" pos="2160">
           <p15:clr>
             <a:srgbClr val="A4A3A4"/>
@@ -153,7 +153,7 @@
           <p:cNvPr id="2" name="Title 1">
             <a:extLst>
               <a:ext uri="{FF2B5EF4-FFF2-40B4-BE49-F238E27FC236}">
-                <a16:creationId xmlns="" xmlns:a16="http://schemas.microsoft.com/office/drawing/2014/main" id="{A6A9EB63-D83E-4BBE-A32E-51DE95FC5140}"/>
+                <a16:creationId xmlns:a16="http://schemas.microsoft.com/office/drawing/2014/main" xmlns="" id="{A6A9EB63-D83E-4BBE-A32E-51DE95FC5140}"/>
               </a:ext>
             </a:extLst>
           </p:cNvPr>
@@ -190,7 +190,7 @@
           <p:cNvPr id="3" name="Subtitle 2">
             <a:extLst>
               <a:ext uri="{FF2B5EF4-FFF2-40B4-BE49-F238E27FC236}">
-                <a16:creationId xmlns="" xmlns:a16="http://schemas.microsoft.com/office/drawing/2014/main" id="{5FDB88B7-6B23-4EE4-840D-D0771304AF2B}"/>
+                <a16:creationId xmlns:a16="http://schemas.microsoft.com/office/drawing/2014/main" xmlns="" id="{5FDB88B7-6B23-4EE4-840D-D0771304AF2B}"/>
               </a:ext>
             </a:extLst>
           </p:cNvPr>
@@ -260,7 +260,7 @@
           <p:cNvPr id="4" name="Date Placeholder 3">
             <a:extLst>
               <a:ext uri="{FF2B5EF4-FFF2-40B4-BE49-F238E27FC236}">
-                <a16:creationId xmlns="" xmlns:a16="http://schemas.microsoft.com/office/drawing/2014/main" id="{C602DBE8-5777-420D-8763-81354F7B6008}"/>
+                <a16:creationId xmlns:a16="http://schemas.microsoft.com/office/drawing/2014/main" xmlns="" id="{C602DBE8-5777-420D-8763-81354F7B6008}"/>
               </a:ext>
             </a:extLst>
           </p:cNvPr>
@@ -289,7 +289,7 @@
           <p:cNvPr id="5" name="Footer Placeholder 4">
             <a:extLst>
               <a:ext uri="{FF2B5EF4-FFF2-40B4-BE49-F238E27FC236}">
-                <a16:creationId xmlns="" xmlns:a16="http://schemas.microsoft.com/office/drawing/2014/main" id="{5311775A-EC16-448B-A1CD-9753C624847E}"/>
+                <a16:creationId xmlns:a16="http://schemas.microsoft.com/office/drawing/2014/main" xmlns="" id="{5311775A-EC16-448B-A1CD-9753C624847E}"/>
               </a:ext>
             </a:extLst>
           </p:cNvPr>
@@ -314,7 +314,7 @@
           <p:cNvPr id="6" name="Slide Number Placeholder 5">
             <a:extLst>
               <a:ext uri="{FF2B5EF4-FFF2-40B4-BE49-F238E27FC236}">
-                <a16:creationId xmlns="" xmlns:a16="http://schemas.microsoft.com/office/drawing/2014/main" id="{90672EDC-D87B-4BCF-B801-F2EBF148B7F0}"/>
+                <a16:creationId xmlns:a16="http://schemas.microsoft.com/office/drawing/2014/main" xmlns="" id="{90672EDC-D87B-4BCF-B801-F2EBF148B7F0}"/>
               </a:ext>
             </a:extLst>
           </p:cNvPr>
@@ -373,7 +373,7 @@
           <p:cNvPr id="2" name="Title 1">
             <a:extLst>
               <a:ext uri="{FF2B5EF4-FFF2-40B4-BE49-F238E27FC236}">
-                <a16:creationId xmlns="" xmlns:a16="http://schemas.microsoft.com/office/drawing/2014/main" id="{2CEAC356-DF8B-4DB4-B4E3-A0AB03600CF2}"/>
+                <a16:creationId xmlns:a16="http://schemas.microsoft.com/office/drawing/2014/main" xmlns="" id="{2CEAC356-DF8B-4DB4-B4E3-A0AB03600CF2}"/>
               </a:ext>
             </a:extLst>
           </p:cNvPr>
@@ -401,7 +401,7 @@
           <p:cNvPr id="3" name="Vertical Text Placeholder 2">
             <a:extLst>
               <a:ext uri="{FF2B5EF4-FFF2-40B4-BE49-F238E27FC236}">
-                <a16:creationId xmlns="" xmlns:a16="http://schemas.microsoft.com/office/drawing/2014/main" id="{920DEB07-B21D-418D-AD57-E9877DE671D0}"/>
+                <a16:creationId xmlns:a16="http://schemas.microsoft.com/office/drawing/2014/main" xmlns="" id="{920DEB07-B21D-418D-AD57-E9877DE671D0}"/>
               </a:ext>
             </a:extLst>
           </p:cNvPr>
@@ -458,7 +458,7 @@
           <p:cNvPr id="4" name="Date Placeholder 3">
             <a:extLst>
               <a:ext uri="{FF2B5EF4-FFF2-40B4-BE49-F238E27FC236}">
-                <a16:creationId xmlns="" xmlns:a16="http://schemas.microsoft.com/office/drawing/2014/main" id="{31254DBB-28BD-4EF4-A444-0F1379FE3807}"/>
+                <a16:creationId xmlns:a16="http://schemas.microsoft.com/office/drawing/2014/main" xmlns="" id="{31254DBB-28BD-4EF4-A444-0F1379FE3807}"/>
               </a:ext>
             </a:extLst>
           </p:cNvPr>
@@ -487,7 +487,7 @@
           <p:cNvPr id="5" name="Footer Placeholder 4">
             <a:extLst>
               <a:ext uri="{FF2B5EF4-FFF2-40B4-BE49-F238E27FC236}">
-                <a16:creationId xmlns="" xmlns:a16="http://schemas.microsoft.com/office/drawing/2014/main" id="{54E955E4-8D70-49F8-84B3-7FA09A64D747}"/>
+                <a16:creationId xmlns:a16="http://schemas.microsoft.com/office/drawing/2014/main" xmlns="" id="{54E955E4-8D70-49F8-84B3-7FA09A64D747}"/>
               </a:ext>
             </a:extLst>
           </p:cNvPr>
@@ -512,7 +512,7 @@
           <p:cNvPr id="6" name="Slide Number Placeholder 5">
             <a:extLst>
               <a:ext uri="{FF2B5EF4-FFF2-40B4-BE49-F238E27FC236}">
-                <a16:creationId xmlns="" xmlns:a16="http://schemas.microsoft.com/office/drawing/2014/main" id="{23E937B4-C1A6-41B3-8C7F-3DB5A24E93E8}"/>
+                <a16:creationId xmlns:a16="http://schemas.microsoft.com/office/drawing/2014/main" xmlns="" id="{23E937B4-C1A6-41B3-8C7F-3DB5A24E93E8}"/>
               </a:ext>
             </a:extLst>
           </p:cNvPr>
@@ -571,7 +571,7 @@
           <p:cNvPr id="2" name="Vertical Title 1">
             <a:extLst>
               <a:ext uri="{FF2B5EF4-FFF2-40B4-BE49-F238E27FC236}">
-                <a16:creationId xmlns="" xmlns:a16="http://schemas.microsoft.com/office/drawing/2014/main" id="{10A4DA98-F63C-42D3-860B-1E34F0240C7F}"/>
+                <a16:creationId xmlns:a16="http://schemas.microsoft.com/office/drawing/2014/main" xmlns="" id="{10A4DA98-F63C-42D3-860B-1E34F0240C7F}"/>
               </a:ext>
             </a:extLst>
           </p:cNvPr>
@@ -604,7 +604,7 @@
           <p:cNvPr id="3" name="Vertical Text Placeholder 2">
             <a:extLst>
               <a:ext uri="{FF2B5EF4-FFF2-40B4-BE49-F238E27FC236}">
-                <a16:creationId xmlns="" xmlns:a16="http://schemas.microsoft.com/office/drawing/2014/main" id="{B8262034-1578-4088-BD25-EA672F0ED406}"/>
+                <a16:creationId xmlns:a16="http://schemas.microsoft.com/office/drawing/2014/main" xmlns="" id="{B8262034-1578-4088-BD25-EA672F0ED406}"/>
               </a:ext>
             </a:extLst>
           </p:cNvPr>
@@ -666,7 +666,7 @@
           <p:cNvPr id="4" name="Date Placeholder 3">
             <a:extLst>
               <a:ext uri="{FF2B5EF4-FFF2-40B4-BE49-F238E27FC236}">
-                <a16:creationId xmlns="" xmlns:a16="http://schemas.microsoft.com/office/drawing/2014/main" id="{754FB790-CE9E-4D67-8A88-BDBE6A23DB98}"/>
+                <a16:creationId xmlns:a16="http://schemas.microsoft.com/office/drawing/2014/main" xmlns="" id="{754FB790-CE9E-4D67-8A88-BDBE6A23DB98}"/>
               </a:ext>
             </a:extLst>
           </p:cNvPr>
@@ -695,7 +695,7 @@
           <p:cNvPr id="5" name="Footer Placeholder 4">
             <a:extLst>
               <a:ext uri="{FF2B5EF4-FFF2-40B4-BE49-F238E27FC236}">
-                <a16:creationId xmlns="" xmlns:a16="http://schemas.microsoft.com/office/drawing/2014/main" id="{3615FF90-C6A7-40EE-984A-B0BD216101F1}"/>
+                <a16:creationId xmlns:a16="http://schemas.microsoft.com/office/drawing/2014/main" xmlns="" id="{3615FF90-C6A7-40EE-984A-B0BD216101F1}"/>
               </a:ext>
             </a:extLst>
           </p:cNvPr>
@@ -720,7 +720,7 @@
           <p:cNvPr id="6" name="Slide Number Placeholder 5">
             <a:extLst>
               <a:ext uri="{FF2B5EF4-FFF2-40B4-BE49-F238E27FC236}">
-                <a16:creationId xmlns="" xmlns:a16="http://schemas.microsoft.com/office/drawing/2014/main" id="{2F0CF9C6-A466-4CFD-AF8E-49B9880521EF}"/>
+                <a16:creationId xmlns:a16="http://schemas.microsoft.com/office/drawing/2014/main" xmlns="" id="{2F0CF9C6-A466-4CFD-AF8E-49B9880521EF}"/>
               </a:ext>
             </a:extLst>
           </p:cNvPr>
@@ -779,7 +779,7 @@
           <p:cNvPr id="2" name="Title 1">
             <a:extLst>
               <a:ext uri="{FF2B5EF4-FFF2-40B4-BE49-F238E27FC236}">
-                <a16:creationId xmlns="" xmlns:a16="http://schemas.microsoft.com/office/drawing/2014/main" id="{F0DCE27D-3425-4B69-8EFF-040E29DBC6A9}"/>
+                <a16:creationId xmlns:a16="http://schemas.microsoft.com/office/drawing/2014/main" xmlns="" id="{F0DCE27D-3425-4B69-8EFF-040E29DBC6A9}"/>
               </a:ext>
             </a:extLst>
           </p:cNvPr>
@@ -807,7 +807,7 @@
           <p:cNvPr id="3" name="Content Placeholder 2">
             <a:extLst>
               <a:ext uri="{FF2B5EF4-FFF2-40B4-BE49-F238E27FC236}">
-                <a16:creationId xmlns="" xmlns:a16="http://schemas.microsoft.com/office/drawing/2014/main" id="{80F8839B-D0D7-42F4-BD94-D1C51A9A3EDF}"/>
+                <a16:creationId xmlns:a16="http://schemas.microsoft.com/office/drawing/2014/main" xmlns="" id="{80F8839B-D0D7-42F4-BD94-D1C51A9A3EDF}"/>
               </a:ext>
             </a:extLst>
           </p:cNvPr>
@@ -864,7 +864,7 @@
           <p:cNvPr id="4" name="Date Placeholder 3">
             <a:extLst>
               <a:ext uri="{FF2B5EF4-FFF2-40B4-BE49-F238E27FC236}">
-                <a16:creationId xmlns="" xmlns:a16="http://schemas.microsoft.com/office/drawing/2014/main" id="{4EBF3CF4-B92C-489F-B22E-CA76199DD3DD}"/>
+                <a16:creationId xmlns:a16="http://schemas.microsoft.com/office/drawing/2014/main" xmlns="" id="{4EBF3CF4-B92C-489F-B22E-CA76199DD3DD}"/>
               </a:ext>
             </a:extLst>
           </p:cNvPr>
@@ -893,7 +893,7 @@
           <p:cNvPr id="5" name="Footer Placeholder 4">
             <a:extLst>
               <a:ext uri="{FF2B5EF4-FFF2-40B4-BE49-F238E27FC236}">
-                <a16:creationId xmlns="" xmlns:a16="http://schemas.microsoft.com/office/drawing/2014/main" id="{1FE73743-E822-42DD-897B-716F9E44DC16}"/>
+                <a16:creationId xmlns:a16="http://schemas.microsoft.com/office/drawing/2014/main" xmlns="" id="{1FE73743-E822-42DD-897B-716F9E44DC16}"/>
               </a:ext>
             </a:extLst>
           </p:cNvPr>
@@ -918,7 +918,7 @@
           <p:cNvPr id="6" name="Slide Number Placeholder 5">
             <a:extLst>
               <a:ext uri="{FF2B5EF4-FFF2-40B4-BE49-F238E27FC236}">
-                <a16:creationId xmlns="" xmlns:a16="http://schemas.microsoft.com/office/drawing/2014/main" id="{42AB6D90-8E16-4335-BEAE-895207192178}"/>
+                <a16:creationId xmlns:a16="http://schemas.microsoft.com/office/drawing/2014/main" xmlns="" id="{42AB6D90-8E16-4335-BEAE-895207192178}"/>
               </a:ext>
             </a:extLst>
           </p:cNvPr>
@@ -977,7 +977,7 @@
           <p:cNvPr id="2" name="Title 1">
             <a:extLst>
               <a:ext uri="{FF2B5EF4-FFF2-40B4-BE49-F238E27FC236}">
-                <a16:creationId xmlns="" xmlns:a16="http://schemas.microsoft.com/office/drawing/2014/main" id="{B5AACE50-5F96-4C46-A5AC-81E60B9C2D81}"/>
+                <a16:creationId xmlns:a16="http://schemas.microsoft.com/office/drawing/2014/main" xmlns="" id="{B5AACE50-5F96-4C46-A5AC-81E60B9C2D81}"/>
               </a:ext>
             </a:extLst>
           </p:cNvPr>
@@ -1014,7 +1014,7 @@
           <p:cNvPr id="3" name="Text Placeholder 2">
             <a:extLst>
               <a:ext uri="{FF2B5EF4-FFF2-40B4-BE49-F238E27FC236}">
-                <a16:creationId xmlns="" xmlns:a16="http://schemas.microsoft.com/office/drawing/2014/main" id="{246BFC54-8A5B-47AB-9896-6BFA75D95D40}"/>
+                <a16:creationId xmlns:a16="http://schemas.microsoft.com/office/drawing/2014/main" xmlns="" id="{246BFC54-8A5B-47AB-9896-6BFA75D95D40}"/>
               </a:ext>
             </a:extLst>
           </p:cNvPr>
@@ -1139,7 +1139,7 @@
           <p:cNvPr id="4" name="Date Placeholder 3">
             <a:extLst>
               <a:ext uri="{FF2B5EF4-FFF2-40B4-BE49-F238E27FC236}">
-                <a16:creationId xmlns="" xmlns:a16="http://schemas.microsoft.com/office/drawing/2014/main" id="{3F5D8255-5EB8-4E15-A570-BB44F4F1B0E9}"/>
+                <a16:creationId xmlns:a16="http://schemas.microsoft.com/office/drawing/2014/main" xmlns="" id="{3F5D8255-5EB8-4E15-A570-BB44F4F1B0E9}"/>
               </a:ext>
             </a:extLst>
           </p:cNvPr>
@@ -1168,7 +1168,7 @@
           <p:cNvPr id="5" name="Footer Placeholder 4">
             <a:extLst>
               <a:ext uri="{FF2B5EF4-FFF2-40B4-BE49-F238E27FC236}">
-                <a16:creationId xmlns="" xmlns:a16="http://schemas.microsoft.com/office/drawing/2014/main" id="{ED55DE8E-E74F-47CB-BAD2-6BBC45BB838F}"/>
+                <a16:creationId xmlns:a16="http://schemas.microsoft.com/office/drawing/2014/main" xmlns="" id="{ED55DE8E-E74F-47CB-BAD2-6BBC45BB838F}"/>
               </a:ext>
             </a:extLst>
           </p:cNvPr>
@@ -1193,7 +1193,7 @@
           <p:cNvPr id="6" name="Slide Number Placeholder 5">
             <a:extLst>
               <a:ext uri="{FF2B5EF4-FFF2-40B4-BE49-F238E27FC236}">
-                <a16:creationId xmlns="" xmlns:a16="http://schemas.microsoft.com/office/drawing/2014/main" id="{729368FE-420A-46BA-86FD-189097B8097B}"/>
+                <a16:creationId xmlns:a16="http://schemas.microsoft.com/office/drawing/2014/main" xmlns="" id="{729368FE-420A-46BA-86FD-189097B8097B}"/>
               </a:ext>
             </a:extLst>
           </p:cNvPr>
@@ -1252,7 +1252,7 @@
           <p:cNvPr id="2" name="Title 1">
             <a:extLst>
               <a:ext uri="{FF2B5EF4-FFF2-40B4-BE49-F238E27FC236}">
-                <a16:creationId xmlns="" xmlns:a16="http://schemas.microsoft.com/office/drawing/2014/main" id="{ECB6CD3E-E5D8-47E1-AF0D-864BF275DE03}"/>
+                <a16:creationId xmlns:a16="http://schemas.microsoft.com/office/drawing/2014/main" xmlns="" id="{ECB6CD3E-E5D8-47E1-AF0D-864BF275DE03}"/>
               </a:ext>
             </a:extLst>
           </p:cNvPr>
@@ -1280,7 +1280,7 @@
           <p:cNvPr id="3" name="Content Placeholder 2">
             <a:extLst>
               <a:ext uri="{FF2B5EF4-FFF2-40B4-BE49-F238E27FC236}">
-                <a16:creationId xmlns="" xmlns:a16="http://schemas.microsoft.com/office/drawing/2014/main" id="{F5625D72-C62A-43A0-953C-EF5D4DE8A80D}"/>
+                <a16:creationId xmlns:a16="http://schemas.microsoft.com/office/drawing/2014/main" xmlns="" id="{F5625D72-C62A-43A0-953C-EF5D4DE8A80D}"/>
               </a:ext>
             </a:extLst>
           </p:cNvPr>
@@ -1342,7 +1342,7 @@
           <p:cNvPr id="4" name="Content Placeholder 3">
             <a:extLst>
               <a:ext uri="{FF2B5EF4-FFF2-40B4-BE49-F238E27FC236}">
-                <a16:creationId xmlns="" xmlns:a16="http://schemas.microsoft.com/office/drawing/2014/main" id="{26159A55-F831-409E-814C-0FF7B4675F03}"/>
+                <a16:creationId xmlns:a16="http://schemas.microsoft.com/office/drawing/2014/main" xmlns="" id="{26159A55-F831-409E-814C-0FF7B4675F03}"/>
               </a:ext>
             </a:extLst>
           </p:cNvPr>
@@ -1404,7 +1404,7 @@
           <p:cNvPr id="5" name="Date Placeholder 4">
             <a:extLst>
               <a:ext uri="{FF2B5EF4-FFF2-40B4-BE49-F238E27FC236}">
-                <a16:creationId xmlns="" xmlns:a16="http://schemas.microsoft.com/office/drawing/2014/main" id="{67A8054E-238C-408A-9038-7B4BAEC155E8}"/>
+                <a16:creationId xmlns:a16="http://schemas.microsoft.com/office/drawing/2014/main" xmlns="" id="{67A8054E-238C-408A-9038-7B4BAEC155E8}"/>
               </a:ext>
             </a:extLst>
           </p:cNvPr>
@@ -1433,7 +1433,7 @@
           <p:cNvPr id="6" name="Footer Placeholder 5">
             <a:extLst>
               <a:ext uri="{FF2B5EF4-FFF2-40B4-BE49-F238E27FC236}">
-                <a16:creationId xmlns="" xmlns:a16="http://schemas.microsoft.com/office/drawing/2014/main" id="{19FD3C0A-2B8E-4C2F-90D8-63E43D271C7E}"/>
+                <a16:creationId xmlns:a16="http://schemas.microsoft.com/office/drawing/2014/main" xmlns="" id="{19FD3C0A-2B8E-4C2F-90D8-63E43D271C7E}"/>
               </a:ext>
             </a:extLst>
           </p:cNvPr>
@@ -1458,7 +1458,7 @@
           <p:cNvPr id="7" name="Slide Number Placeholder 6">
             <a:extLst>
               <a:ext uri="{FF2B5EF4-FFF2-40B4-BE49-F238E27FC236}">
-                <a16:creationId xmlns="" xmlns:a16="http://schemas.microsoft.com/office/drawing/2014/main" id="{834471DE-B516-45E4-A8E9-B1F6E59E0B7A}"/>
+                <a16:creationId xmlns:a16="http://schemas.microsoft.com/office/drawing/2014/main" xmlns="" id="{834471DE-B516-45E4-A8E9-B1F6E59E0B7A}"/>
               </a:ext>
             </a:extLst>
           </p:cNvPr>
@@ -1517,7 +1517,7 @@
           <p:cNvPr id="2" name="Title 1">
             <a:extLst>
               <a:ext uri="{FF2B5EF4-FFF2-40B4-BE49-F238E27FC236}">
-                <a16:creationId xmlns="" xmlns:a16="http://schemas.microsoft.com/office/drawing/2014/main" id="{23C03818-DBC5-4587-9BC0-5126E283974F}"/>
+                <a16:creationId xmlns:a16="http://schemas.microsoft.com/office/drawing/2014/main" xmlns="" id="{23C03818-DBC5-4587-9BC0-5126E283974F}"/>
               </a:ext>
             </a:extLst>
           </p:cNvPr>
@@ -1550,7 +1550,7 @@
           <p:cNvPr id="3" name="Text Placeholder 2">
             <a:extLst>
               <a:ext uri="{FF2B5EF4-FFF2-40B4-BE49-F238E27FC236}">
-                <a16:creationId xmlns="" xmlns:a16="http://schemas.microsoft.com/office/drawing/2014/main" id="{6A72DF4B-7260-448B-9048-413E4EF9882E}"/>
+                <a16:creationId xmlns:a16="http://schemas.microsoft.com/office/drawing/2014/main" xmlns="" id="{6A72DF4B-7260-448B-9048-413E4EF9882E}"/>
               </a:ext>
             </a:extLst>
           </p:cNvPr>
@@ -1621,7 +1621,7 @@
           <p:cNvPr id="4" name="Content Placeholder 3">
             <a:extLst>
               <a:ext uri="{FF2B5EF4-FFF2-40B4-BE49-F238E27FC236}">
-                <a16:creationId xmlns="" xmlns:a16="http://schemas.microsoft.com/office/drawing/2014/main" id="{1E7A18BF-58B1-4636-9E50-90DD7162ED91}"/>
+                <a16:creationId xmlns:a16="http://schemas.microsoft.com/office/drawing/2014/main" xmlns="" id="{1E7A18BF-58B1-4636-9E50-90DD7162ED91}"/>
               </a:ext>
             </a:extLst>
           </p:cNvPr>
@@ -1683,7 +1683,7 @@
           <p:cNvPr id="5" name="Text Placeholder 4">
             <a:extLst>
               <a:ext uri="{FF2B5EF4-FFF2-40B4-BE49-F238E27FC236}">
-                <a16:creationId xmlns="" xmlns:a16="http://schemas.microsoft.com/office/drawing/2014/main" id="{F30D738C-3AD0-44D1-A772-7F35A6DCB164}"/>
+                <a16:creationId xmlns:a16="http://schemas.microsoft.com/office/drawing/2014/main" xmlns="" id="{F30D738C-3AD0-44D1-A772-7F35A6DCB164}"/>
               </a:ext>
             </a:extLst>
           </p:cNvPr>
@@ -1754,7 +1754,7 @@
           <p:cNvPr id="6" name="Content Placeholder 5">
             <a:extLst>
               <a:ext uri="{FF2B5EF4-FFF2-40B4-BE49-F238E27FC236}">
-                <a16:creationId xmlns="" xmlns:a16="http://schemas.microsoft.com/office/drawing/2014/main" id="{F095DB52-63A5-4196-8067-9E9B0D16FE84}"/>
+                <a16:creationId xmlns:a16="http://schemas.microsoft.com/office/drawing/2014/main" xmlns="" id="{F095DB52-63A5-4196-8067-9E9B0D16FE84}"/>
               </a:ext>
             </a:extLst>
           </p:cNvPr>
@@ -1816,7 +1816,7 @@
           <p:cNvPr id="7" name="Date Placeholder 6">
             <a:extLst>
               <a:ext uri="{FF2B5EF4-FFF2-40B4-BE49-F238E27FC236}">
-                <a16:creationId xmlns="" xmlns:a16="http://schemas.microsoft.com/office/drawing/2014/main" id="{086BC6DC-7C74-40E4-8B89-F4FA730A24C1}"/>
+                <a16:creationId xmlns:a16="http://schemas.microsoft.com/office/drawing/2014/main" xmlns="" id="{086BC6DC-7C74-40E4-8B89-F4FA730A24C1}"/>
               </a:ext>
             </a:extLst>
           </p:cNvPr>
@@ -1845,7 +1845,7 @@
           <p:cNvPr id="8" name="Footer Placeholder 7">
             <a:extLst>
               <a:ext uri="{FF2B5EF4-FFF2-40B4-BE49-F238E27FC236}">
-                <a16:creationId xmlns="" xmlns:a16="http://schemas.microsoft.com/office/drawing/2014/main" id="{03C8E4CA-47BC-42B7-AF0C-B2455E07D71F}"/>
+                <a16:creationId xmlns:a16="http://schemas.microsoft.com/office/drawing/2014/main" xmlns="" id="{03C8E4CA-47BC-42B7-AF0C-B2455E07D71F}"/>
               </a:ext>
             </a:extLst>
           </p:cNvPr>
@@ -1870,7 +1870,7 @@
           <p:cNvPr id="9" name="Slide Number Placeholder 8">
             <a:extLst>
               <a:ext uri="{FF2B5EF4-FFF2-40B4-BE49-F238E27FC236}">
-                <a16:creationId xmlns="" xmlns:a16="http://schemas.microsoft.com/office/drawing/2014/main" id="{640CD4AC-B513-41ED-8047-51722D10EC70}"/>
+                <a16:creationId xmlns:a16="http://schemas.microsoft.com/office/drawing/2014/main" xmlns="" id="{640CD4AC-B513-41ED-8047-51722D10EC70}"/>
               </a:ext>
             </a:extLst>
           </p:cNvPr>
@@ -1929,7 +1929,7 @@
           <p:cNvPr id="2" name="Title 1">
             <a:extLst>
               <a:ext uri="{FF2B5EF4-FFF2-40B4-BE49-F238E27FC236}">
-                <a16:creationId xmlns="" xmlns:a16="http://schemas.microsoft.com/office/drawing/2014/main" id="{08FF5E3F-3FC3-49F8-ADB1-F0A571B09957}"/>
+                <a16:creationId xmlns:a16="http://schemas.microsoft.com/office/drawing/2014/main" xmlns="" id="{08FF5E3F-3FC3-49F8-ADB1-F0A571B09957}"/>
               </a:ext>
             </a:extLst>
           </p:cNvPr>
@@ -1957,7 +1957,7 @@
           <p:cNvPr id="3" name="Date Placeholder 2">
             <a:extLst>
               <a:ext uri="{FF2B5EF4-FFF2-40B4-BE49-F238E27FC236}">
-                <a16:creationId xmlns="" xmlns:a16="http://schemas.microsoft.com/office/drawing/2014/main" id="{BE162ABE-9627-48FC-BACD-4D7D6F0E3B1B}"/>
+                <a16:creationId xmlns:a16="http://schemas.microsoft.com/office/drawing/2014/main" xmlns="" id="{BE162ABE-9627-48FC-BACD-4D7D6F0E3B1B}"/>
               </a:ext>
             </a:extLst>
           </p:cNvPr>
@@ -1986,7 +1986,7 @@
           <p:cNvPr id="4" name="Footer Placeholder 3">
             <a:extLst>
               <a:ext uri="{FF2B5EF4-FFF2-40B4-BE49-F238E27FC236}">
-                <a16:creationId xmlns="" xmlns:a16="http://schemas.microsoft.com/office/drawing/2014/main" id="{B75D0162-EA0D-444E-A0DA-228314AA3C05}"/>
+                <a16:creationId xmlns:a16="http://schemas.microsoft.com/office/drawing/2014/main" xmlns="" id="{B75D0162-EA0D-444E-A0DA-228314AA3C05}"/>
               </a:ext>
             </a:extLst>
           </p:cNvPr>
@@ -2011,7 +2011,7 @@
           <p:cNvPr id="5" name="Slide Number Placeholder 4">
             <a:extLst>
               <a:ext uri="{FF2B5EF4-FFF2-40B4-BE49-F238E27FC236}">
-                <a16:creationId xmlns="" xmlns:a16="http://schemas.microsoft.com/office/drawing/2014/main" id="{F1161FB8-E235-434C-ABDE-32E6FB652CDF}"/>
+                <a16:creationId xmlns:a16="http://schemas.microsoft.com/office/drawing/2014/main" xmlns="" id="{F1161FB8-E235-434C-ABDE-32E6FB652CDF}"/>
               </a:ext>
             </a:extLst>
           </p:cNvPr>
@@ -2070,7 +2070,7 @@
           <p:cNvPr id="2" name="Date Placeholder 1">
             <a:extLst>
               <a:ext uri="{FF2B5EF4-FFF2-40B4-BE49-F238E27FC236}">
-                <a16:creationId xmlns="" xmlns:a16="http://schemas.microsoft.com/office/drawing/2014/main" id="{89602BF0-7BAB-442F-A174-62D25C2C1EB9}"/>
+                <a16:creationId xmlns:a16="http://schemas.microsoft.com/office/drawing/2014/main" xmlns="" id="{89602BF0-7BAB-442F-A174-62D25C2C1EB9}"/>
               </a:ext>
             </a:extLst>
           </p:cNvPr>
@@ -2099,7 +2099,7 @@
           <p:cNvPr id="3" name="Footer Placeholder 2">
             <a:extLst>
               <a:ext uri="{FF2B5EF4-FFF2-40B4-BE49-F238E27FC236}">
-                <a16:creationId xmlns="" xmlns:a16="http://schemas.microsoft.com/office/drawing/2014/main" id="{B87CBF20-9C8B-4234-B565-BB06142FC820}"/>
+                <a16:creationId xmlns:a16="http://schemas.microsoft.com/office/drawing/2014/main" xmlns="" id="{B87CBF20-9C8B-4234-B565-BB06142FC820}"/>
               </a:ext>
             </a:extLst>
           </p:cNvPr>
@@ -2124,7 +2124,7 @@
           <p:cNvPr id="4" name="Slide Number Placeholder 3">
             <a:extLst>
               <a:ext uri="{FF2B5EF4-FFF2-40B4-BE49-F238E27FC236}">
-                <a16:creationId xmlns="" xmlns:a16="http://schemas.microsoft.com/office/drawing/2014/main" id="{C6DC3AE3-E2F4-4B0A-A5D5-12EE299CAD17}"/>
+                <a16:creationId xmlns:a16="http://schemas.microsoft.com/office/drawing/2014/main" xmlns="" id="{C6DC3AE3-E2F4-4B0A-A5D5-12EE299CAD17}"/>
               </a:ext>
             </a:extLst>
           </p:cNvPr>
@@ -2183,7 +2183,7 @@
           <p:cNvPr id="2" name="Title 1">
             <a:extLst>
               <a:ext uri="{FF2B5EF4-FFF2-40B4-BE49-F238E27FC236}">
-                <a16:creationId xmlns="" xmlns:a16="http://schemas.microsoft.com/office/drawing/2014/main" id="{3FC7E2A9-6F13-48E8-A782-AB2B324288FF}"/>
+                <a16:creationId xmlns:a16="http://schemas.microsoft.com/office/drawing/2014/main" xmlns="" id="{3FC7E2A9-6F13-48E8-A782-AB2B324288FF}"/>
               </a:ext>
             </a:extLst>
           </p:cNvPr>
@@ -2220,7 +2220,7 @@
           <p:cNvPr id="3" name="Content Placeholder 2">
             <a:extLst>
               <a:ext uri="{FF2B5EF4-FFF2-40B4-BE49-F238E27FC236}">
-                <a16:creationId xmlns="" xmlns:a16="http://schemas.microsoft.com/office/drawing/2014/main" id="{93984EED-7161-45A9-A51E-3423EFEF5F71}"/>
+                <a16:creationId xmlns:a16="http://schemas.microsoft.com/office/drawing/2014/main" xmlns="" id="{93984EED-7161-45A9-A51E-3423EFEF5F71}"/>
               </a:ext>
             </a:extLst>
           </p:cNvPr>
@@ -2310,7 +2310,7 @@
           <p:cNvPr id="4" name="Text Placeholder 3">
             <a:extLst>
               <a:ext uri="{FF2B5EF4-FFF2-40B4-BE49-F238E27FC236}">
-                <a16:creationId xmlns="" xmlns:a16="http://schemas.microsoft.com/office/drawing/2014/main" id="{BC6F5B20-744F-4EB2-B2B4-9DC19289542D}"/>
+                <a16:creationId xmlns:a16="http://schemas.microsoft.com/office/drawing/2014/main" xmlns="" id="{BC6F5B20-744F-4EB2-B2B4-9DC19289542D}"/>
               </a:ext>
             </a:extLst>
           </p:cNvPr>
@@ -2381,7 +2381,7 @@
           <p:cNvPr id="5" name="Date Placeholder 4">
             <a:extLst>
               <a:ext uri="{FF2B5EF4-FFF2-40B4-BE49-F238E27FC236}">
-                <a16:creationId xmlns="" xmlns:a16="http://schemas.microsoft.com/office/drawing/2014/main" id="{8A3096BC-BD0E-4F6A-9F39-E75397836BBA}"/>
+                <a16:creationId xmlns:a16="http://schemas.microsoft.com/office/drawing/2014/main" xmlns="" id="{8A3096BC-BD0E-4F6A-9F39-E75397836BBA}"/>
               </a:ext>
             </a:extLst>
           </p:cNvPr>
@@ -2410,7 +2410,7 @@
           <p:cNvPr id="6" name="Footer Placeholder 5">
             <a:extLst>
               <a:ext uri="{FF2B5EF4-FFF2-40B4-BE49-F238E27FC236}">
-                <a16:creationId xmlns="" xmlns:a16="http://schemas.microsoft.com/office/drawing/2014/main" id="{0C250EE9-43CF-4E92-8432-CA6F914BD82E}"/>
+                <a16:creationId xmlns:a16="http://schemas.microsoft.com/office/drawing/2014/main" xmlns="" id="{0C250EE9-43CF-4E92-8432-CA6F914BD82E}"/>
               </a:ext>
             </a:extLst>
           </p:cNvPr>
@@ -2435,7 +2435,7 @@
           <p:cNvPr id="7" name="Slide Number Placeholder 6">
             <a:extLst>
               <a:ext uri="{FF2B5EF4-FFF2-40B4-BE49-F238E27FC236}">
-                <a16:creationId xmlns="" xmlns:a16="http://schemas.microsoft.com/office/drawing/2014/main" id="{D823C52A-C822-4645-85E8-9DA69C11EAAE}"/>
+                <a16:creationId xmlns:a16="http://schemas.microsoft.com/office/drawing/2014/main" xmlns="" id="{D823C52A-C822-4645-85E8-9DA69C11EAAE}"/>
               </a:ext>
             </a:extLst>
           </p:cNvPr>
@@ -2494,7 +2494,7 @@
           <p:cNvPr id="2" name="Title 1">
             <a:extLst>
               <a:ext uri="{FF2B5EF4-FFF2-40B4-BE49-F238E27FC236}">
-                <a16:creationId xmlns="" xmlns:a16="http://schemas.microsoft.com/office/drawing/2014/main" id="{3F7ABF7B-5329-47A6-9F06-D2F2D4D6C583}"/>
+                <a16:creationId xmlns:a16="http://schemas.microsoft.com/office/drawing/2014/main" xmlns="" id="{3F7ABF7B-5329-47A6-9F06-D2F2D4D6C583}"/>
               </a:ext>
             </a:extLst>
           </p:cNvPr>
@@ -2531,7 +2531,7 @@
           <p:cNvPr id="3" name="Picture Placeholder 2">
             <a:extLst>
               <a:ext uri="{FF2B5EF4-FFF2-40B4-BE49-F238E27FC236}">
-                <a16:creationId xmlns="" xmlns:a16="http://schemas.microsoft.com/office/drawing/2014/main" id="{8DDC1893-4416-4A4E-BDEF-6B4593743370}"/>
+                <a16:creationId xmlns:a16="http://schemas.microsoft.com/office/drawing/2014/main" xmlns="" id="{8DDC1893-4416-4A4E-BDEF-6B4593743370}"/>
               </a:ext>
             </a:extLst>
           </p:cNvPr>
@@ -2598,7 +2598,7 @@
           <p:cNvPr id="4" name="Text Placeholder 3">
             <a:extLst>
               <a:ext uri="{FF2B5EF4-FFF2-40B4-BE49-F238E27FC236}">
-                <a16:creationId xmlns="" xmlns:a16="http://schemas.microsoft.com/office/drawing/2014/main" id="{CCBE743D-BB5F-4443-B95D-9BE0916595C4}"/>
+                <a16:creationId xmlns:a16="http://schemas.microsoft.com/office/drawing/2014/main" xmlns="" id="{CCBE743D-BB5F-4443-B95D-9BE0916595C4}"/>
               </a:ext>
             </a:extLst>
           </p:cNvPr>
@@ -2669,7 +2669,7 @@
           <p:cNvPr id="5" name="Date Placeholder 4">
             <a:extLst>
               <a:ext uri="{FF2B5EF4-FFF2-40B4-BE49-F238E27FC236}">
-                <a16:creationId xmlns="" xmlns:a16="http://schemas.microsoft.com/office/drawing/2014/main" id="{BDB3D12F-958D-4B54-BB0D-397BD4BC8932}"/>
+                <a16:creationId xmlns:a16="http://schemas.microsoft.com/office/drawing/2014/main" xmlns="" id="{BDB3D12F-958D-4B54-BB0D-397BD4BC8932}"/>
               </a:ext>
             </a:extLst>
           </p:cNvPr>
@@ -2698,7 +2698,7 @@
           <p:cNvPr id="6" name="Footer Placeholder 5">
             <a:extLst>
               <a:ext uri="{FF2B5EF4-FFF2-40B4-BE49-F238E27FC236}">
-                <a16:creationId xmlns="" xmlns:a16="http://schemas.microsoft.com/office/drawing/2014/main" id="{06608404-954D-423E-BE89-4D6D4C164F0E}"/>
+                <a16:creationId xmlns:a16="http://schemas.microsoft.com/office/drawing/2014/main" xmlns="" id="{06608404-954D-423E-BE89-4D6D4C164F0E}"/>
               </a:ext>
             </a:extLst>
           </p:cNvPr>
@@ -2723,7 +2723,7 @@
           <p:cNvPr id="7" name="Slide Number Placeholder 6">
             <a:extLst>
               <a:ext uri="{FF2B5EF4-FFF2-40B4-BE49-F238E27FC236}">
-                <a16:creationId xmlns="" xmlns:a16="http://schemas.microsoft.com/office/drawing/2014/main" id="{1961DE06-9774-44B9-A203-1234E4B912B3}"/>
+                <a16:creationId xmlns:a16="http://schemas.microsoft.com/office/drawing/2014/main" xmlns="" id="{1961DE06-9774-44B9-A203-1234E4B912B3}"/>
               </a:ext>
             </a:extLst>
           </p:cNvPr>
@@ -2787,7 +2787,7 @@
           <p:cNvPr id="2" name="Title Placeholder 1">
             <a:extLst>
               <a:ext uri="{FF2B5EF4-FFF2-40B4-BE49-F238E27FC236}">
-                <a16:creationId xmlns="" xmlns:a16="http://schemas.microsoft.com/office/drawing/2014/main" id="{0361FDD2-72C4-4390-BADA-F61AA6A0F9EE}"/>
+                <a16:creationId xmlns:a16="http://schemas.microsoft.com/office/drawing/2014/main" xmlns="" id="{0361FDD2-72C4-4390-BADA-F61AA6A0F9EE}"/>
               </a:ext>
             </a:extLst>
           </p:cNvPr>
@@ -2825,7 +2825,7 @@
           <p:cNvPr id="3" name="Text Placeholder 2">
             <a:extLst>
               <a:ext uri="{FF2B5EF4-FFF2-40B4-BE49-F238E27FC236}">
-                <a16:creationId xmlns="" xmlns:a16="http://schemas.microsoft.com/office/drawing/2014/main" id="{28636996-A2F8-430A-AE6D-7F0ACE7D4BC5}"/>
+                <a16:creationId xmlns:a16="http://schemas.microsoft.com/office/drawing/2014/main" xmlns="" id="{28636996-A2F8-430A-AE6D-7F0ACE7D4BC5}"/>
               </a:ext>
             </a:extLst>
           </p:cNvPr>
@@ -2892,7 +2892,7 @@
           <p:cNvPr id="4" name="Date Placeholder 3">
             <a:extLst>
               <a:ext uri="{FF2B5EF4-FFF2-40B4-BE49-F238E27FC236}">
-                <a16:creationId xmlns="" xmlns:a16="http://schemas.microsoft.com/office/drawing/2014/main" id="{8882BD3D-2AC2-4F5A-8F45-63C71B296678}"/>
+                <a16:creationId xmlns:a16="http://schemas.microsoft.com/office/drawing/2014/main" xmlns="" id="{8882BD3D-2AC2-4F5A-8F45-63C71B296678}"/>
               </a:ext>
             </a:extLst>
           </p:cNvPr>
@@ -2939,7 +2939,7 @@
           <p:cNvPr id="5" name="Footer Placeholder 4">
             <a:extLst>
               <a:ext uri="{FF2B5EF4-FFF2-40B4-BE49-F238E27FC236}">
-                <a16:creationId xmlns="" xmlns:a16="http://schemas.microsoft.com/office/drawing/2014/main" id="{2BD4C1E0-F79E-4E05-B1F3-ADD397770940}"/>
+                <a16:creationId xmlns:a16="http://schemas.microsoft.com/office/drawing/2014/main" xmlns="" id="{2BD4C1E0-F79E-4E05-B1F3-ADD397770940}"/>
               </a:ext>
             </a:extLst>
           </p:cNvPr>
@@ -2982,7 +2982,7 @@
           <p:cNvPr id="6" name="Slide Number Placeholder 5">
             <a:extLst>
               <a:ext uri="{FF2B5EF4-FFF2-40B4-BE49-F238E27FC236}">
-                <a16:creationId xmlns="" xmlns:a16="http://schemas.microsoft.com/office/drawing/2014/main" id="{B8D5AA69-2CFE-4E90-BB18-13D5FD069C12}"/>
+                <a16:creationId xmlns:a16="http://schemas.microsoft.com/office/drawing/2014/main" xmlns="" id="{B8D5AA69-2CFE-4E90-BB18-13D5FD069C12}"/>
               </a:ext>
             </a:extLst>
           </p:cNvPr>
@@ -3347,7 +3347,858 @@
       </p:grpSpPr>
       <p:sp>
         <p:nvSpPr>
-          <p:cNvPr id="2" name="Title 1"/>
+          <p:cNvPr id="13" name="Rectangle: Rounded Corners 12">
+            <a:extLst>
+              <a:ext uri="{FF2B5EF4-FFF2-40B4-BE49-F238E27FC236}">
+                <a16:creationId xmlns:a16="http://schemas.microsoft.com/office/drawing/2014/main" xmlns="" id="{28D44336-B5FE-44FD-8560-3905EA48C0DE}"/>
+              </a:ext>
+            </a:extLst>
+          </p:cNvPr>
+          <p:cNvSpPr/>
+          <p:nvPr/>
+        </p:nvSpPr>
+        <p:spPr>
+          <a:xfrm>
+            <a:off x="5057912" y="1320807"/>
+            <a:ext cx="2076174" cy="659075"/>
+          </a:xfrm>
+          <a:prstGeom prst="roundRect">
+            <a:avLst/>
+          </a:prstGeom>
+        </p:spPr>
+        <p:style>
+          <a:lnRef idx="2">
+            <a:schemeClr val="accent1">
+              <a:shade val="50000"/>
+            </a:schemeClr>
+          </a:lnRef>
+          <a:fillRef idx="1">
+            <a:schemeClr val="accent1"/>
+          </a:fillRef>
+          <a:effectRef idx="0">
+            <a:schemeClr val="accent1"/>
+          </a:effectRef>
+          <a:fontRef idx="minor">
+            <a:schemeClr val="lt1"/>
+          </a:fontRef>
+        </p:style>
+        <p:txBody>
+          <a:bodyPr rtlCol="0" anchor="ctr"/>
+          <a:lstStyle/>
+          <a:p>
+            <a:pPr algn="ctr"/>
+            <a:r>
+              <a:rPr lang="en-US" dirty="0"/>
+              <a:t>Data Trimming </a:t>
+            </a:r>
+          </a:p>
+          <a:p>
+            <a:pPr algn="ctr"/>
+            <a:r>
+              <a:rPr lang="en-US" sz="1200" dirty="0"/>
+              <a:t>(Trim-Galore 0.6.5)</a:t>
+            </a:r>
+          </a:p>
+        </p:txBody>
+      </p:sp>
+      <p:sp>
+        <p:nvSpPr>
+          <p:cNvPr id="14" name="Rectangle: Rounded Corners 13">
+            <a:extLst>
+              <a:ext uri="{FF2B5EF4-FFF2-40B4-BE49-F238E27FC236}">
+                <a16:creationId xmlns:a16="http://schemas.microsoft.com/office/drawing/2014/main" xmlns="" id="{B7198503-333C-47E7-98AB-6CA43F09F73F}"/>
+              </a:ext>
+            </a:extLst>
+          </p:cNvPr>
+          <p:cNvSpPr/>
+          <p:nvPr/>
+        </p:nvSpPr>
+        <p:spPr>
+          <a:xfrm>
+            <a:off x="5057911" y="2456076"/>
+            <a:ext cx="2076174" cy="659075"/>
+          </a:xfrm>
+          <a:prstGeom prst="roundRect">
+            <a:avLst/>
+          </a:prstGeom>
+        </p:spPr>
+        <p:style>
+          <a:lnRef idx="2">
+            <a:schemeClr val="accent1">
+              <a:shade val="50000"/>
+            </a:schemeClr>
+          </a:lnRef>
+          <a:fillRef idx="1">
+            <a:schemeClr val="accent1"/>
+          </a:fillRef>
+          <a:effectRef idx="0">
+            <a:schemeClr val="accent1"/>
+          </a:effectRef>
+          <a:fontRef idx="minor">
+            <a:schemeClr val="lt1"/>
+          </a:fontRef>
+        </p:style>
+        <p:txBody>
+          <a:bodyPr rtlCol="0" anchor="ctr"/>
+          <a:lstStyle/>
+          <a:p>
+            <a:pPr algn="ctr"/>
+            <a:r>
+              <a:rPr lang="en-US" dirty="0"/>
+              <a:t>Map to Genome</a:t>
+            </a:r>
+          </a:p>
+          <a:p>
+            <a:pPr algn="ctr"/>
+            <a:r>
+              <a:rPr lang="en-US" sz="1200" dirty="0"/>
+              <a:t>(STAR 2.7.3a)</a:t>
+            </a:r>
+          </a:p>
+        </p:txBody>
+      </p:sp>
+      <p:sp>
+        <p:nvSpPr>
+          <p:cNvPr id="16" name="Rectangle: Rounded Corners 15">
+            <a:extLst>
+              <a:ext uri="{FF2B5EF4-FFF2-40B4-BE49-F238E27FC236}">
+                <a16:creationId xmlns:a16="http://schemas.microsoft.com/office/drawing/2014/main" xmlns="" id="{7701E885-D45D-47AB-9DA9-23CE1EE8B814}"/>
+              </a:ext>
+            </a:extLst>
+          </p:cNvPr>
+          <p:cNvSpPr/>
+          <p:nvPr/>
+        </p:nvSpPr>
+        <p:spPr>
+          <a:xfrm>
+            <a:off x="5057912" y="3609006"/>
+            <a:ext cx="2076174" cy="659075"/>
+          </a:xfrm>
+          <a:prstGeom prst="roundRect">
+            <a:avLst/>
+          </a:prstGeom>
+        </p:spPr>
+        <p:style>
+          <a:lnRef idx="2">
+            <a:schemeClr val="accent1">
+              <a:shade val="50000"/>
+            </a:schemeClr>
+          </a:lnRef>
+          <a:fillRef idx="1">
+            <a:schemeClr val="accent1"/>
+          </a:fillRef>
+          <a:effectRef idx="0">
+            <a:schemeClr val="accent1"/>
+          </a:effectRef>
+          <a:fontRef idx="minor">
+            <a:schemeClr val="lt1"/>
+          </a:fontRef>
+        </p:style>
+        <p:txBody>
+          <a:bodyPr rtlCol="0" anchor="ctr"/>
+          <a:lstStyle/>
+          <a:p>
+            <a:pPr algn="ctr"/>
+            <a:r>
+              <a:rPr lang="en-US" dirty="0"/>
+              <a:t>Count Reads</a:t>
+            </a:r>
+          </a:p>
+          <a:p>
+            <a:pPr algn="ctr"/>
+            <a:r>
+              <a:rPr lang="en-US" sz="1200" dirty="0"/>
+              <a:t>(</a:t>
+            </a:r>
+            <a:r>
+              <a:rPr lang="en-US" sz="1200" dirty="0" err="1"/>
+              <a:t>HTseq</a:t>
+            </a:r>
+            <a:r>
+              <a:rPr lang="en-US" sz="1200" dirty="0"/>
+              <a:t> Count 0.6.1)</a:t>
+            </a:r>
+          </a:p>
+        </p:txBody>
+      </p:sp>
+      <p:sp>
+        <p:nvSpPr>
+          <p:cNvPr id="18" name="Rectangle: Rounded Corners 17">
+            <a:extLst>
+              <a:ext uri="{FF2B5EF4-FFF2-40B4-BE49-F238E27FC236}">
+                <a16:creationId xmlns:a16="http://schemas.microsoft.com/office/drawing/2014/main" xmlns="" id="{E5ACE4CB-EC79-400E-A917-7075DEF9244F}"/>
+              </a:ext>
+            </a:extLst>
+          </p:cNvPr>
+          <p:cNvSpPr/>
+          <p:nvPr/>
+        </p:nvSpPr>
+        <p:spPr>
+          <a:xfrm>
+            <a:off x="5057911" y="5879544"/>
+            <a:ext cx="2076177" cy="659075"/>
+          </a:xfrm>
+          <a:prstGeom prst="roundRect">
+            <a:avLst/>
+          </a:prstGeom>
+        </p:spPr>
+        <p:style>
+          <a:lnRef idx="2">
+            <a:schemeClr val="accent1">
+              <a:shade val="50000"/>
+            </a:schemeClr>
+          </a:lnRef>
+          <a:fillRef idx="1">
+            <a:schemeClr val="accent1"/>
+          </a:fillRef>
+          <a:effectRef idx="0">
+            <a:schemeClr val="accent1"/>
+          </a:effectRef>
+          <a:fontRef idx="minor">
+            <a:schemeClr val="lt1"/>
+          </a:fontRef>
+        </p:style>
+        <p:txBody>
+          <a:bodyPr rtlCol="0" anchor="ctr"/>
+          <a:lstStyle/>
+          <a:p>
+            <a:pPr algn="ctr"/>
+            <a:r>
+              <a:rPr lang="en-US" dirty="0"/>
+              <a:t>Call DEGs</a:t>
+            </a:r>
+          </a:p>
+          <a:p>
+            <a:pPr algn="ctr"/>
+            <a:r>
+              <a:rPr lang="en-US" sz="1200" dirty="0"/>
+              <a:t>(Deseq2)</a:t>
+            </a:r>
+          </a:p>
+        </p:txBody>
+      </p:sp>
+      <p:sp>
+        <p:nvSpPr>
+          <p:cNvPr id="19" name="Arrow: Down 18">
+            <a:extLst>
+              <a:ext uri="{FF2B5EF4-FFF2-40B4-BE49-F238E27FC236}">
+                <a16:creationId xmlns:a16="http://schemas.microsoft.com/office/drawing/2014/main" xmlns="" id="{21A0870A-627A-4B5D-8014-DB3B11428DD4}"/>
+              </a:ext>
+            </a:extLst>
+          </p:cNvPr>
+          <p:cNvSpPr/>
+          <p:nvPr/>
+        </p:nvSpPr>
+        <p:spPr>
+          <a:xfrm>
+            <a:off x="5959055" y="2045704"/>
+            <a:ext cx="278296" cy="340139"/>
+          </a:xfrm>
+          <a:prstGeom prst="downArrow">
+            <a:avLst/>
+          </a:prstGeom>
+        </p:spPr>
+        <p:style>
+          <a:lnRef idx="2">
+            <a:schemeClr val="accent1">
+              <a:shade val="50000"/>
+            </a:schemeClr>
+          </a:lnRef>
+          <a:fillRef idx="1">
+            <a:schemeClr val="accent1"/>
+          </a:fillRef>
+          <a:effectRef idx="0">
+            <a:schemeClr val="accent1"/>
+          </a:effectRef>
+          <a:fontRef idx="minor">
+            <a:schemeClr val="lt1"/>
+          </a:fontRef>
+        </p:style>
+        <p:txBody>
+          <a:bodyPr rtlCol="0" anchor="ctr"/>
+          <a:lstStyle/>
+          <a:p>
+            <a:pPr algn="ctr"/>
+            <a:endParaRPr lang="en-US"/>
+          </a:p>
+        </p:txBody>
+      </p:sp>
+      <p:sp>
+        <p:nvSpPr>
+          <p:cNvPr id="21" name="Arrow: Down 20">
+            <a:extLst>
+              <a:ext uri="{FF2B5EF4-FFF2-40B4-BE49-F238E27FC236}">
+                <a16:creationId xmlns:a16="http://schemas.microsoft.com/office/drawing/2014/main" xmlns="" id="{6E0316CB-4D4B-4BE9-B31C-42EFD7DAEAF0}"/>
+              </a:ext>
+            </a:extLst>
+          </p:cNvPr>
+          <p:cNvSpPr/>
+          <p:nvPr/>
+        </p:nvSpPr>
+        <p:spPr>
+          <a:xfrm>
+            <a:off x="5959058" y="3192009"/>
+            <a:ext cx="278296" cy="340139"/>
+          </a:xfrm>
+          <a:prstGeom prst="downArrow">
+            <a:avLst/>
+          </a:prstGeom>
+        </p:spPr>
+        <p:style>
+          <a:lnRef idx="2">
+            <a:schemeClr val="accent1">
+              <a:shade val="50000"/>
+            </a:schemeClr>
+          </a:lnRef>
+          <a:fillRef idx="1">
+            <a:schemeClr val="accent1"/>
+          </a:fillRef>
+          <a:effectRef idx="0">
+            <a:schemeClr val="accent1"/>
+          </a:effectRef>
+          <a:fontRef idx="minor">
+            <a:schemeClr val="lt1"/>
+          </a:fontRef>
+        </p:style>
+        <p:txBody>
+          <a:bodyPr rtlCol="0" anchor="ctr"/>
+          <a:lstStyle/>
+          <a:p>
+            <a:pPr algn="ctr"/>
+            <a:endParaRPr lang="en-US"/>
+          </a:p>
+        </p:txBody>
+      </p:sp>
+      <p:sp>
+        <p:nvSpPr>
+          <p:cNvPr id="23" name="Arrow: Down 22">
+            <a:extLst>
+              <a:ext uri="{FF2B5EF4-FFF2-40B4-BE49-F238E27FC236}">
+                <a16:creationId xmlns:a16="http://schemas.microsoft.com/office/drawing/2014/main" xmlns="" id="{C73F7F9C-172E-4142-B646-FC46DC5E23A5}"/>
+              </a:ext>
+            </a:extLst>
+          </p:cNvPr>
+          <p:cNvSpPr/>
+          <p:nvPr/>
+        </p:nvSpPr>
+        <p:spPr>
+          <a:xfrm>
+            <a:off x="5959058" y="5467404"/>
+            <a:ext cx="278296" cy="340139"/>
+          </a:xfrm>
+          <a:prstGeom prst="downArrow">
+            <a:avLst/>
+          </a:prstGeom>
+        </p:spPr>
+        <p:style>
+          <a:lnRef idx="2">
+            <a:schemeClr val="accent1">
+              <a:shade val="50000"/>
+            </a:schemeClr>
+          </a:lnRef>
+          <a:fillRef idx="1">
+            <a:schemeClr val="accent1"/>
+          </a:fillRef>
+          <a:effectRef idx="0">
+            <a:schemeClr val="accent1"/>
+          </a:effectRef>
+          <a:fontRef idx="minor">
+            <a:schemeClr val="lt1"/>
+          </a:fontRef>
+        </p:style>
+        <p:txBody>
+          <a:bodyPr rtlCol="0" anchor="ctr"/>
+          <a:lstStyle/>
+          <a:p>
+            <a:pPr algn="ctr"/>
+            <a:endParaRPr lang="en-US"/>
+          </a:p>
+        </p:txBody>
+      </p:sp>
+      <p:sp>
+        <p:nvSpPr>
+          <p:cNvPr id="24" name="Rectangle: Rounded Corners 23">
+            <a:extLst>
+              <a:ext uri="{FF2B5EF4-FFF2-40B4-BE49-F238E27FC236}">
+                <a16:creationId xmlns:a16="http://schemas.microsoft.com/office/drawing/2014/main" xmlns="" id="{64DF43C6-F06C-4F77-9DA7-C500E96206D7}"/>
+              </a:ext>
+            </a:extLst>
+          </p:cNvPr>
+          <p:cNvSpPr/>
+          <p:nvPr/>
+        </p:nvSpPr>
+        <p:spPr>
+          <a:xfrm>
+            <a:off x="1789042" y="1320806"/>
+            <a:ext cx="2076174" cy="659075"/>
+          </a:xfrm>
+          <a:prstGeom prst="roundRect">
+            <a:avLst/>
+          </a:prstGeom>
+        </p:spPr>
+        <p:style>
+          <a:lnRef idx="2">
+            <a:schemeClr val="accent1">
+              <a:shade val="50000"/>
+            </a:schemeClr>
+          </a:lnRef>
+          <a:fillRef idx="1">
+            <a:schemeClr val="accent1"/>
+          </a:fillRef>
+          <a:effectRef idx="0">
+            <a:schemeClr val="accent1"/>
+          </a:effectRef>
+          <a:fontRef idx="minor">
+            <a:schemeClr val="lt1"/>
+          </a:fontRef>
+        </p:style>
+        <p:txBody>
+          <a:bodyPr rtlCol="0" anchor="ctr"/>
+          <a:lstStyle/>
+          <a:p>
+            <a:pPr algn="ctr"/>
+            <a:r>
+              <a:rPr lang="en-US" dirty="0"/>
+              <a:t>Input with </a:t>
+            </a:r>
+          </a:p>
+          <a:p>
+            <a:pPr algn="ctr"/>
+            <a:r>
+              <a:rPr lang="en-US" dirty="0"/>
+              <a:t>Raw Data</a:t>
+            </a:r>
+          </a:p>
+        </p:txBody>
+      </p:sp>
+      <p:sp>
+        <p:nvSpPr>
+          <p:cNvPr id="25" name="Arrow: Right 24">
+            <a:extLst>
+              <a:ext uri="{FF2B5EF4-FFF2-40B4-BE49-F238E27FC236}">
+                <a16:creationId xmlns:a16="http://schemas.microsoft.com/office/drawing/2014/main" xmlns="" id="{48D03535-D2F4-479A-97F6-2664A40E051B}"/>
+              </a:ext>
+            </a:extLst>
+          </p:cNvPr>
+          <p:cNvSpPr/>
+          <p:nvPr/>
+        </p:nvSpPr>
+        <p:spPr>
+          <a:xfrm>
+            <a:off x="3962397" y="1511195"/>
+            <a:ext cx="993913" cy="278295"/>
+          </a:xfrm>
+          <a:prstGeom prst="rightArrow">
+            <a:avLst/>
+          </a:prstGeom>
+        </p:spPr>
+        <p:style>
+          <a:lnRef idx="2">
+            <a:schemeClr val="accent1">
+              <a:shade val="50000"/>
+            </a:schemeClr>
+          </a:lnRef>
+          <a:fillRef idx="1">
+            <a:schemeClr val="accent1"/>
+          </a:fillRef>
+          <a:effectRef idx="0">
+            <a:schemeClr val="accent1"/>
+          </a:effectRef>
+          <a:fontRef idx="minor">
+            <a:schemeClr val="lt1"/>
+          </a:fontRef>
+        </p:style>
+        <p:txBody>
+          <a:bodyPr rtlCol="0" anchor="ctr"/>
+          <a:lstStyle/>
+          <a:p>
+            <a:pPr algn="ctr"/>
+            <a:endParaRPr lang="en-US"/>
+          </a:p>
+        </p:txBody>
+      </p:sp>
+      <p:sp>
+        <p:nvSpPr>
+          <p:cNvPr id="26" name="Arrow: Right 25">
+            <a:extLst>
+              <a:ext uri="{FF2B5EF4-FFF2-40B4-BE49-F238E27FC236}">
+                <a16:creationId xmlns:a16="http://schemas.microsoft.com/office/drawing/2014/main" xmlns="" id="{99814D6A-E535-43B2-A6F0-D0C17373064F}"/>
+              </a:ext>
+            </a:extLst>
+          </p:cNvPr>
+          <p:cNvSpPr/>
+          <p:nvPr/>
+        </p:nvSpPr>
+        <p:spPr>
+          <a:xfrm>
+            <a:off x="7231269" y="6100857"/>
+            <a:ext cx="993913" cy="278295"/>
+          </a:xfrm>
+          <a:prstGeom prst="rightArrow">
+            <a:avLst/>
+          </a:prstGeom>
+        </p:spPr>
+        <p:style>
+          <a:lnRef idx="2">
+            <a:schemeClr val="accent1">
+              <a:shade val="50000"/>
+            </a:schemeClr>
+          </a:lnRef>
+          <a:fillRef idx="1">
+            <a:schemeClr val="accent1"/>
+          </a:fillRef>
+          <a:effectRef idx="0">
+            <a:schemeClr val="accent1"/>
+          </a:effectRef>
+          <a:fontRef idx="minor">
+            <a:schemeClr val="lt1"/>
+          </a:fontRef>
+        </p:style>
+        <p:txBody>
+          <a:bodyPr rtlCol="0" anchor="ctr"/>
+          <a:lstStyle/>
+          <a:p>
+            <a:pPr algn="ctr"/>
+            <a:endParaRPr lang="en-US"/>
+          </a:p>
+        </p:txBody>
+      </p:sp>
+      <p:sp>
+        <p:nvSpPr>
+          <p:cNvPr id="27" name="Rectangle: Rounded Corners 26">
+            <a:extLst>
+              <a:ext uri="{FF2B5EF4-FFF2-40B4-BE49-F238E27FC236}">
+                <a16:creationId xmlns:a16="http://schemas.microsoft.com/office/drawing/2014/main" xmlns="" id="{2839C589-4E66-477F-A2E9-D7ABF3A4E53A}"/>
+              </a:ext>
+            </a:extLst>
+          </p:cNvPr>
+          <p:cNvSpPr/>
+          <p:nvPr/>
+        </p:nvSpPr>
+        <p:spPr>
+          <a:xfrm>
+            <a:off x="8322363" y="5879544"/>
+            <a:ext cx="2076174" cy="659075"/>
+          </a:xfrm>
+          <a:prstGeom prst="roundRect">
+            <a:avLst/>
+          </a:prstGeom>
+        </p:spPr>
+        <p:style>
+          <a:lnRef idx="2">
+            <a:schemeClr val="accent1">
+              <a:shade val="50000"/>
+            </a:schemeClr>
+          </a:lnRef>
+          <a:fillRef idx="1">
+            <a:schemeClr val="accent1"/>
+          </a:fillRef>
+          <a:effectRef idx="0">
+            <a:schemeClr val="accent1"/>
+          </a:effectRef>
+          <a:fontRef idx="minor">
+            <a:schemeClr val="lt1"/>
+          </a:fontRef>
+        </p:style>
+        <p:txBody>
+          <a:bodyPr rtlCol="0" anchor="ctr"/>
+          <a:lstStyle/>
+          <a:p>
+            <a:pPr algn="ctr"/>
+            <a:r>
+              <a:rPr lang="en-US" dirty="0"/>
+              <a:t>GO Analysis</a:t>
+            </a:r>
+          </a:p>
+          <a:p>
+            <a:pPr algn="ctr"/>
+            <a:r>
+              <a:rPr lang="en-US" sz="1200" dirty="0"/>
+              <a:t>(David 6.8)</a:t>
+            </a:r>
+          </a:p>
+        </p:txBody>
+      </p:sp>
+      <p:sp>
+        <p:nvSpPr>
+          <p:cNvPr id="28" name="Arrow: Right 27">
+            <a:extLst>
+              <a:ext uri="{FF2B5EF4-FFF2-40B4-BE49-F238E27FC236}">
+                <a16:creationId xmlns:a16="http://schemas.microsoft.com/office/drawing/2014/main" xmlns="" id="{C05564E2-4444-4FED-A460-A891B7804AFD}"/>
+              </a:ext>
+            </a:extLst>
+          </p:cNvPr>
+          <p:cNvSpPr/>
+          <p:nvPr/>
+        </p:nvSpPr>
+        <p:spPr>
+          <a:xfrm>
+            <a:off x="13764587" y="11777203"/>
+            <a:ext cx="993913" cy="278295"/>
+          </a:xfrm>
+          <a:prstGeom prst="rightArrow">
+            <a:avLst/>
+          </a:prstGeom>
+        </p:spPr>
+        <p:style>
+          <a:lnRef idx="2">
+            <a:schemeClr val="accent1">
+              <a:shade val="50000"/>
+            </a:schemeClr>
+          </a:lnRef>
+          <a:fillRef idx="1">
+            <a:schemeClr val="accent1"/>
+          </a:fillRef>
+          <a:effectRef idx="0">
+            <a:schemeClr val="accent1"/>
+          </a:effectRef>
+          <a:fontRef idx="minor">
+            <a:schemeClr val="lt1"/>
+          </a:fontRef>
+        </p:style>
+        <p:txBody>
+          <a:bodyPr rtlCol="0" anchor="ctr"/>
+          <a:lstStyle/>
+          <a:p>
+            <a:pPr algn="ctr"/>
+            <a:endParaRPr lang="en-US"/>
+          </a:p>
+        </p:txBody>
+      </p:sp>
+      <p:sp>
+        <p:nvSpPr>
+          <p:cNvPr id="29" name="Rectangle: Rounded Corners 28">
+            <a:extLst>
+              <a:ext uri="{FF2B5EF4-FFF2-40B4-BE49-F238E27FC236}">
+                <a16:creationId xmlns:a16="http://schemas.microsoft.com/office/drawing/2014/main" xmlns="" id="{F11CF14C-80D8-4321-B1E1-A99616084090}"/>
+              </a:ext>
+            </a:extLst>
+          </p:cNvPr>
+          <p:cNvSpPr/>
+          <p:nvPr/>
+        </p:nvSpPr>
+        <p:spPr>
+          <a:xfrm>
+            <a:off x="1789045" y="5879544"/>
+            <a:ext cx="2076174" cy="659075"/>
+          </a:xfrm>
+          <a:prstGeom prst="roundRect">
+            <a:avLst/>
+          </a:prstGeom>
+        </p:spPr>
+        <p:style>
+          <a:lnRef idx="2">
+            <a:schemeClr val="accent1">
+              <a:shade val="50000"/>
+            </a:schemeClr>
+          </a:lnRef>
+          <a:fillRef idx="1">
+            <a:schemeClr val="accent1"/>
+          </a:fillRef>
+          <a:effectRef idx="0">
+            <a:schemeClr val="accent1"/>
+          </a:effectRef>
+          <a:fontRef idx="minor">
+            <a:schemeClr val="lt1"/>
+          </a:fontRef>
+        </p:style>
+        <p:txBody>
+          <a:bodyPr rtlCol="0" anchor="ctr"/>
+          <a:lstStyle/>
+          <a:p>
+            <a:pPr algn="ctr"/>
+            <a:r>
+              <a:rPr lang="en-US" dirty="0"/>
+              <a:t>Plots for DEGs</a:t>
+            </a:r>
+          </a:p>
+          <a:p>
+            <a:pPr algn="ctr"/>
+            <a:r>
+              <a:rPr lang="en-US" sz="1200" dirty="0"/>
+              <a:t>(</a:t>
+            </a:r>
+            <a:r>
+              <a:rPr lang="en-US" sz="1200" dirty="0" err="1"/>
+              <a:t>Vennerable</a:t>
+            </a:r>
+            <a:r>
+              <a:rPr lang="en-US" sz="1200" dirty="0"/>
+              <a:t>, ggplot2,  </a:t>
+            </a:r>
+            <a:r>
+              <a:rPr lang="en-US" sz="1200" dirty="0" err="1"/>
+              <a:t>ComplexHeatmap</a:t>
+            </a:r>
+            <a:r>
+              <a:rPr lang="en-US" sz="1200" dirty="0"/>
+              <a:t>)</a:t>
+            </a:r>
+          </a:p>
+        </p:txBody>
+      </p:sp>
+      <p:sp>
+        <p:nvSpPr>
+          <p:cNvPr id="30" name="Arrow: Right 29">
+            <a:extLst>
+              <a:ext uri="{FF2B5EF4-FFF2-40B4-BE49-F238E27FC236}">
+                <a16:creationId xmlns:a16="http://schemas.microsoft.com/office/drawing/2014/main" xmlns="" id="{EE59FEE5-37FD-41B2-8EC3-62FF1B1CD6BB}"/>
+              </a:ext>
+            </a:extLst>
+          </p:cNvPr>
+          <p:cNvSpPr/>
+          <p:nvPr/>
+        </p:nvSpPr>
+        <p:spPr>
+          <a:xfrm rot="10800000">
+            <a:off x="3962400" y="6069933"/>
+            <a:ext cx="993913" cy="278295"/>
+          </a:xfrm>
+          <a:prstGeom prst="rightArrow">
+            <a:avLst/>
+          </a:prstGeom>
+        </p:spPr>
+        <p:style>
+          <a:lnRef idx="2">
+            <a:schemeClr val="accent1">
+              <a:shade val="50000"/>
+            </a:schemeClr>
+          </a:lnRef>
+          <a:fillRef idx="1">
+            <a:schemeClr val="accent1"/>
+          </a:fillRef>
+          <a:effectRef idx="0">
+            <a:schemeClr val="accent1"/>
+          </a:effectRef>
+          <a:fontRef idx="minor">
+            <a:schemeClr val="lt1"/>
+          </a:fontRef>
+        </p:style>
+        <p:txBody>
+          <a:bodyPr rtlCol="0" anchor="ctr"/>
+          <a:lstStyle/>
+          <a:p>
+            <a:pPr algn="ctr"/>
+            <a:endParaRPr lang="en-US"/>
+          </a:p>
+        </p:txBody>
+      </p:sp>
+      <p:sp>
+        <p:nvSpPr>
+          <p:cNvPr id="35" name="Rectangle: Rounded Corners 34">
+            <a:extLst>
+              <a:ext uri="{FF2B5EF4-FFF2-40B4-BE49-F238E27FC236}">
+                <a16:creationId xmlns:a16="http://schemas.microsoft.com/office/drawing/2014/main" xmlns="" id="{C9B274AC-2466-452C-AD33-C083A012279D}"/>
+              </a:ext>
+            </a:extLst>
+          </p:cNvPr>
+          <p:cNvSpPr/>
+          <p:nvPr/>
+        </p:nvSpPr>
+        <p:spPr>
+          <a:xfrm>
+            <a:off x="5057911" y="4761936"/>
+            <a:ext cx="2076174" cy="659075"/>
+          </a:xfrm>
+          <a:prstGeom prst="roundRect">
+            <a:avLst/>
+          </a:prstGeom>
+        </p:spPr>
+        <p:style>
+          <a:lnRef idx="2">
+            <a:schemeClr val="accent1">
+              <a:shade val="50000"/>
+            </a:schemeClr>
+          </a:lnRef>
+          <a:fillRef idx="1">
+            <a:schemeClr val="accent1"/>
+          </a:fillRef>
+          <a:effectRef idx="0">
+            <a:schemeClr val="accent1"/>
+          </a:effectRef>
+          <a:fontRef idx="minor">
+            <a:schemeClr val="lt1"/>
+          </a:fontRef>
+        </p:style>
+        <p:txBody>
+          <a:bodyPr rtlCol="0" anchor="ctr"/>
+          <a:lstStyle/>
+          <a:p>
+            <a:pPr algn="ctr"/>
+            <a:r>
+              <a:rPr lang="en-US" dirty="0"/>
+              <a:t>Extract gene counts  </a:t>
+            </a:r>
+            <a:r>
+              <a:rPr lang="en-US" sz="1200" dirty="0"/>
+              <a:t>(</a:t>
+            </a:r>
+            <a:r>
+              <a:rPr lang="en-US" sz="1200" dirty="0" err="1"/>
+              <a:t>Avg</a:t>
+            </a:r>
+            <a:r>
+              <a:rPr lang="en-US" sz="1200" dirty="0"/>
+              <a:t> counts&gt;10)</a:t>
+            </a:r>
+          </a:p>
+        </p:txBody>
+      </p:sp>
+      <p:sp>
+        <p:nvSpPr>
+          <p:cNvPr id="36" name="Arrow: Down 35">
+            <a:extLst>
+              <a:ext uri="{FF2B5EF4-FFF2-40B4-BE49-F238E27FC236}">
+                <a16:creationId xmlns:a16="http://schemas.microsoft.com/office/drawing/2014/main" xmlns="" id="{7379D9AD-6007-4CFB-AF65-9D6198B323A9}"/>
+              </a:ext>
+            </a:extLst>
+          </p:cNvPr>
+          <p:cNvSpPr/>
+          <p:nvPr/>
+        </p:nvSpPr>
+        <p:spPr>
+          <a:xfrm>
+            <a:off x="5959057" y="4344939"/>
+            <a:ext cx="278296" cy="340139"/>
+          </a:xfrm>
+          <a:prstGeom prst="downArrow">
+            <a:avLst/>
+          </a:prstGeom>
+        </p:spPr>
+        <p:style>
+          <a:lnRef idx="2">
+            <a:schemeClr val="accent1">
+              <a:shade val="50000"/>
+            </a:schemeClr>
+          </a:lnRef>
+          <a:fillRef idx="1">
+            <a:schemeClr val="accent1"/>
+          </a:fillRef>
+          <a:effectRef idx="0">
+            <a:schemeClr val="accent1"/>
+          </a:effectRef>
+          <a:fontRef idx="minor">
+            <a:schemeClr val="lt1"/>
+          </a:fontRef>
+        </p:style>
+        <p:txBody>
+          <a:bodyPr rtlCol="0" anchor="ctr"/>
+          <a:lstStyle/>
+          <a:p>
+            <a:pPr algn="ctr"/>
+            <a:endParaRPr lang="en-US"/>
+          </a:p>
+        </p:txBody>
+      </p:sp>
+      <p:sp>
+        <p:nvSpPr>
+          <p:cNvPr id="40" name="Title 1">
+            <a:extLst>
+              <a:ext uri="{FF2B5EF4-FFF2-40B4-BE49-F238E27FC236}">
+                <a16:creationId xmlns:a16="http://schemas.microsoft.com/office/drawing/2014/main" xmlns="" id="{398E1561-8AF0-4FC7-A6FC-E7B0088A35D0}"/>
+              </a:ext>
+            </a:extLst>
+          </p:cNvPr>
           <p:cNvSpPr>
             <a:spLocks noGrp="1"/>
           </p:cNvSpPr>
@@ -3355,53 +4206,40 @@
             <p:ph type="title"/>
           </p:nvPr>
         </p:nvSpPr>
-        <p:spPr/>
-        <p:txBody>
-          <a:bodyPr/>
-          <a:lstStyle/>
-          <a:p>
-            <a:pPr algn="ctr"/>
-            <a:r>
-              <a:rPr lang="en-US" b="1" dirty="0" smtClean="0"/>
-              <a:t>Example of plots</a:t>
-            </a:r>
-            <a:endParaRPr lang="en-US" b="1" dirty="0"/>
-          </a:p>
-        </p:txBody>
-      </p:sp>
-      <p:sp>
-        <p:nvSpPr>
-          <p:cNvPr id="3" name="Content Placeholder 2"/>
-          <p:cNvSpPr>
-            <a:spLocks noGrp="1"/>
-          </p:cNvSpPr>
-          <p:nvPr>
-            <p:ph idx="1"/>
-          </p:nvPr>
-        </p:nvSpPr>
-        <p:spPr/>
-        <p:txBody>
-          <a:bodyPr/>
-          <a:lstStyle/>
-          <a:p>
-            <a:r>
-              <a:rPr lang="en-US" dirty="0" smtClean="0"/>
-              <a:t>Data source is from a subset of an unpublished test dataset. </a:t>
-            </a:r>
-          </a:p>
-          <a:p>
-            <a:r>
-              <a:rPr lang="en-US" dirty="0" smtClean="0"/>
-              <a:t>Please do not use these demonstrated plots without asking for permission.</a:t>
-            </a:r>
-            <a:endParaRPr lang="en-US" dirty="0"/>
+        <p:spPr>
+          <a:xfrm>
+            <a:off x="838200" y="365126"/>
+            <a:ext cx="10515600" cy="497147"/>
+          </a:xfrm>
+        </p:spPr>
+        <p:txBody>
+          <a:bodyPr>
+            <a:normAutofit/>
+          </a:bodyPr>
+          <a:lstStyle/>
+          <a:p>
+            <a:r>
+              <a:rPr lang="en-US" sz="1800" b="1" dirty="0">
+                <a:latin typeface="AdvPSA183"/>
+              </a:rPr>
+              <a:t>Pipeline and </a:t>
+            </a:r>
+            <a:r>
+              <a:rPr lang="en-US" sz="1800" b="1" dirty="0" smtClean="0">
+                <a:latin typeface="AdvPSA183"/>
+              </a:rPr>
+              <a:t>Steps</a:t>
+            </a:r>
+            <a:endParaRPr lang="en-US" sz="1800" b="1" dirty="0">
+              <a:latin typeface="AdvPSA183"/>
+            </a:endParaRPr>
           </a:p>
         </p:txBody>
       </p:sp>
     </p:spTree>
     <p:extLst>
       <p:ext uri="{BB962C8B-B14F-4D97-AF65-F5344CB8AC3E}">
-        <p14:creationId xmlns:p14="http://schemas.microsoft.com/office/powerpoint/2010/main" val="2445611583"/>
+        <p14:creationId xmlns:p14="http://schemas.microsoft.com/office/powerpoint/2010/main" val="1039408565"/>
       </p:ext>
     </p:extLst>
   </p:cSld>
@@ -3430,888 +4268,38 @@
       </p:grpSpPr>
       <p:sp>
         <p:nvSpPr>
-          <p:cNvPr id="13" name="Rectangle: Rounded Corners 12">
-            <a:extLst>
-              <a:ext uri="{FF2B5EF4-FFF2-40B4-BE49-F238E27FC236}">
-                <a16:creationId xmlns="" xmlns:a16="http://schemas.microsoft.com/office/drawing/2014/main" id="{28D44336-B5FE-44FD-8560-3905EA48C0DE}"/>
-              </a:ext>
-            </a:extLst>
-          </p:cNvPr>
-          <p:cNvSpPr/>
-          <p:nvPr/>
+          <p:cNvPr id="2" name="Title 1">
+            <a:extLst>
+              <a:ext uri="{FF2B5EF4-FFF2-40B4-BE49-F238E27FC236}">
+                <a16:creationId xmlns:a16="http://schemas.microsoft.com/office/drawing/2014/main" xmlns="" id="{4EA3CB9E-619E-4288-9D33-73290203AB4F}"/>
+              </a:ext>
+            </a:extLst>
+          </p:cNvPr>
+          <p:cNvSpPr>
+            <a:spLocks noGrp="1"/>
+          </p:cNvSpPr>
+          <p:nvPr>
+            <p:ph type="title"/>
+          </p:nvPr>
         </p:nvSpPr>
         <p:spPr>
           <a:xfrm>
-            <a:off x="5057912" y="1320807"/>
-            <a:ext cx="2076174" cy="659075"/>
-          </a:xfrm>
-          <a:prstGeom prst="roundRect">
-            <a:avLst/>
-          </a:prstGeom>
-        </p:spPr>
-        <p:style>
-          <a:lnRef idx="2">
-            <a:schemeClr val="accent1">
-              <a:shade val="50000"/>
-            </a:schemeClr>
-          </a:lnRef>
-          <a:fillRef idx="1">
-            <a:schemeClr val="accent1"/>
-          </a:fillRef>
-          <a:effectRef idx="0">
-            <a:schemeClr val="accent1"/>
-          </a:effectRef>
-          <a:fontRef idx="minor">
-            <a:schemeClr val="lt1"/>
-          </a:fontRef>
-        </p:style>
-        <p:txBody>
-          <a:bodyPr rtlCol="0" anchor="ctr"/>
-          <a:lstStyle/>
-          <a:p>
-            <a:pPr algn="ctr"/>
-            <a:r>
-              <a:rPr lang="en-US" dirty="0"/>
-              <a:t>Data Trimming </a:t>
-            </a:r>
-          </a:p>
-          <a:p>
-            <a:pPr algn="ctr"/>
-            <a:r>
-              <a:rPr lang="en-US" sz="1200" dirty="0"/>
-              <a:t>(Trim-Galore 0.6.5)</a:t>
-            </a:r>
-          </a:p>
-        </p:txBody>
-      </p:sp>
-      <p:sp>
-        <p:nvSpPr>
-          <p:cNvPr id="14" name="Rectangle: Rounded Corners 13">
-            <a:extLst>
-              <a:ext uri="{FF2B5EF4-FFF2-40B4-BE49-F238E27FC236}">
-                <a16:creationId xmlns="" xmlns:a16="http://schemas.microsoft.com/office/drawing/2014/main" id="{B7198503-333C-47E7-98AB-6CA43F09F73F}"/>
-              </a:ext>
-            </a:extLst>
-          </p:cNvPr>
-          <p:cNvSpPr/>
-          <p:nvPr/>
-        </p:nvSpPr>
-        <p:spPr>
-          <a:xfrm>
-            <a:off x="5057911" y="2456076"/>
-            <a:ext cx="2076174" cy="659075"/>
-          </a:xfrm>
-          <a:prstGeom prst="roundRect">
-            <a:avLst/>
-          </a:prstGeom>
-        </p:spPr>
-        <p:style>
-          <a:lnRef idx="2">
-            <a:schemeClr val="accent1">
-              <a:shade val="50000"/>
-            </a:schemeClr>
-          </a:lnRef>
-          <a:fillRef idx="1">
-            <a:schemeClr val="accent1"/>
-          </a:fillRef>
-          <a:effectRef idx="0">
-            <a:schemeClr val="accent1"/>
-          </a:effectRef>
-          <a:fontRef idx="minor">
-            <a:schemeClr val="lt1"/>
-          </a:fontRef>
-        </p:style>
-        <p:txBody>
-          <a:bodyPr rtlCol="0" anchor="ctr"/>
-          <a:lstStyle/>
-          <a:p>
-            <a:pPr algn="ctr"/>
-            <a:r>
-              <a:rPr lang="en-US" dirty="0"/>
-              <a:t>Map to Genome</a:t>
-            </a:r>
-          </a:p>
-          <a:p>
-            <a:pPr algn="ctr"/>
-            <a:r>
-              <a:rPr lang="en-US" sz="1200" dirty="0"/>
-              <a:t>(STAR 2.7.3a)</a:t>
-            </a:r>
-          </a:p>
-        </p:txBody>
-      </p:sp>
-      <p:sp>
-        <p:nvSpPr>
-          <p:cNvPr id="16" name="Rectangle: Rounded Corners 15">
-            <a:extLst>
-              <a:ext uri="{FF2B5EF4-FFF2-40B4-BE49-F238E27FC236}">
-                <a16:creationId xmlns="" xmlns:a16="http://schemas.microsoft.com/office/drawing/2014/main" id="{7701E885-D45D-47AB-9DA9-23CE1EE8B814}"/>
-              </a:ext>
-            </a:extLst>
-          </p:cNvPr>
-          <p:cNvSpPr/>
-          <p:nvPr/>
-        </p:nvSpPr>
-        <p:spPr>
-          <a:xfrm>
-            <a:off x="5057912" y="3609006"/>
-            <a:ext cx="2076174" cy="659075"/>
-          </a:xfrm>
-          <a:prstGeom prst="roundRect">
-            <a:avLst/>
-          </a:prstGeom>
-        </p:spPr>
-        <p:style>
-          <a:lnRef idx="2">
-            <a:schemeClr val="accent1">
-              <a:shade val="50000"/>
-            </a:schemeClr>
-          </a:lnRef>
-          <a:fillRef idx="1">
-            <a:schemeClr val="accent1"/>
-          </a:fillRef>
-          <a:effectRef idx="0">
-            <a:schemeClr val="accent1"/>
-          </a:effectRef>
-          <a:fontRef idx="minor">
-            <a:schemeClr val="lt1"/>
-          </a:fontRef>
-        </p:style>
-        <p:txBody>
-          <a:bodyPr rtlCol="0" anchor="ctr"/>
-          <a:lstStyle/>
-          <a:p>
-            <a:pPr algn="ctr"/>
-            <a:r>
-              <a:rPr lang="en-US" dirty="0"/>
-              <a:t>Count Reads</a:t>
-            </a:r>
-          </a:p>
-          <a:p>
-            <a:pPr algn="ctr"/>
-            <a:r>
-              <a:rPr lang="en-US" sz="1200" dirty="0"/>
-              <a:t>(</a:t>
-            </a:r>
-            <a:r>
-              <a:rPr lang="en-US" sz="1200" dirty="0" err="1"/>
-              <a:t>HTseq</a:t>
-            </a:r>
-            <a:r>
-              <a:rPr lang="en-US" sz="1200" dirty="0"/>
-              <a:t> Count 0.6.1)</a:t>
-            </a:r>
-          </a:p>
-        </p:txBody>
-      </p:sp>
-      <p:sp>
-        <p:nvSpPr>
-          <p:cNvPr id="18" name="Rectangle: Rounded Corners 17">
-            <a:extLst>
-              <a:ext uri="{FF2B5EF4-FFF2-40B4-BE49-F238E27FC236}">
-                <a16:creationId xmlns="" xmlns:a16="http://schemas.microsoft.com/office/drawing/2014/main" id="{E5ACE4CB-EC79-400E-A917-7075DEF9244F}"/>
-              </a:ext>
-            </a:extLst>
-          </p:cNvPr>
-          <p:cNvSpPr/>
-          <p:nvPr/>
-        </p:nvSpPr>
-        <p:spPr>
-          <a:xfrm>
-            <a:off x="5057911" y="5879544"/>
-            <a:ext cx="2076177" cy="659075"/>
-          </a:xfrm>
-          <a:prstGeom prst="roundRect">
-            <a:avLst/>
-          </a:prstGeom>
-        </p:spPr>
-        <p:style>
-          <a:lnRef idx="2">
-            <a:schemeClr val="accent1">
-              <a:shade val="50000"/>
-            </a:schemeClr>
-          </a:lnRef>
-          <a:fillRef idx="1">
-            <a:schemeClr val="accent1"/>
-          </a:fillRef>
-          <a:effectRef idx="0">
-            <a:schemeClr val="accent1"/>
-          </a:effectRef>
-          <a:fontRef idx="minor">
-            <a:schemeClr val="lt1"/>
-          </a:fontRef>
-        </p:style>
-        <p:txBody>
-          <a:bodyPr rtlCol="0" anchor="ctr"/>
-          <a:lstStyle/>
-          <a:p>
-            <a:pPr algn="ctr"/>
-            <a:r>
-              <a:rPr lang="en-US" dirty="0"/>
-              <a:t>Call DEGs</a:t>
-            </a:r>
-          </a:p>
-          <a:p>
-            <a:pPr algn="ctr"/>
-            <a:r>
-              <a:rPr lang="en-US" sz="1200" dirty="0"/>
-              <a:t>(Deseq2)</a:t>
-            </a:r>
-          </a:p>
-        </p:txBody>
-      </p:sp>
-      <p:sp>
-        <p:nvSpPr>
-          <p:cNvPr id="19" name="Arrow: Down 18">
-            <a:extLst>
-              <a:ext uri="{FF2B5EF4-FFF2-40B4-BE49-F238E27FC236}">
-                <a16:creationId xmlns="" xmlns:a16="http://schemas.microsoft.com/office/drawing/2014/main" id="{21A0870A-627A-4B5D-8014-DB3B11428DD4}"/>
-              </a:ext>
-            </a:extLst>
-          </p:cNvPr>
-          <p:cNvSpPr/>
-          <p:nvPr/>
-        </p:nvSpPr>
-        <p:spPr>
-          <a:xfrm>
-            <a:off x="5959055" y="2045704"/>
-            <a:ext cx="278296" cy="340139"/>
-          </a:xfrm>
-          <a:prstGeom prst="downArrow">
-            <a:avLst/>
-          </a:prstGeom>
-        </p:spPr>
-        <p:style>
-          <a:lnRef idx="2">
-            <a:schemeClr val="accent1">
-              <a:shade val="50000"/>
-            </a:schemeClr>
-          </a:lnRef>
-          <a:fillRef idx="1">
-            <a:schemeClr val="accent1"/>
-          </a:fillRef>
-          <a:effectRef idx="0">
-            <a:schemeClr val="accent1"/>
-          </a:effectRef>
-          <a:fontRef idx="minor">
-            <a:schemeClr val="lt1"/>
-          </a:fontRef>
-        </p:style>
-        <p:txBody>
-          <a:bodyPr rtlCol="0" anchor="ctr"/>
-          <a:lstStyle/>
-          <a:p>
-            <a:pPr algn="ctr"/>
-            <a:endParaRPr lang="en-US"/>
-          </a:p>
-        </p:txBody>
-      </p:sp>
-      <p:sp>
-        <p:nvSpPr>
-          <p:cNvPr id="21" name="Arrow: Down 20">
-            <a:extLst>
-              <a:ext uri="{FF2B5EF4-FFF2-40B4-BE49-F238E27FC236}">
-                <a16:creationId xmlns="" xmlns:a16="http://schemas.microsoft.com/office/drawing/2014/main" id="{6E0316CB-4D4B-4BE9-B31C-42EFD7DAEAF0}"/>
-              </a:ext>
-            </a:extLst>
-          </p:cNvPr>
-          <p:cNvSpPr/>
-          <p:nvPr/>
-        </p:nvSpPr>
-        <p:spPr>
-          <a:xfrm>
-            <a:off x="5959058" y="3192009"/>
-            <a:ext cx="278296" cy="340139"/>
-          </a:xfrm>
-          <a:prstGeom prst="downArrow">
-            <a:avLst/>
-          </a:prstGeom>
-        </p:spPr>
-        <p:style>
-          <a:lnRef idx="2">
-            <a:schemeClr val="accent1">
-              <a:shade val="50000"/>
-            </a:schemeClr>
-          </a:lnRef>
-          <a:fillRef idx="1">
-            <a:schemeClr val="accent1"/>
-          </a:fillRef>
-          <a:effectRef idx="0">
-            <a:schemeClr val="accent1"/>
-          </a:effectRef>
-          <a:fontRef idx="minor">
-            <a:schemeClr val="lt1"/>
-          </a:fontRef>
-        </p:style>
-        <p:txBody>
-          <a:bodyPr rtlCol="0" anchor="ctr"/>
-          <a:lstStyle/>
-          <a:p>
-            <a:pPr algn="ctr"/>
-            <a:endParaRPr lang="en-US"/>
-          </a:p>
-        </p:txBody>
-      </p:sp>
-      <p:sp>
-        <p:nvSpPr>
-          <p:cNvPr id="23" name="Arrow: Down 22">
-            <a:extLst>
-              <a:ext uri="{FF2B5EF4-FFF2-40B4-BE49-F238E27FC236}">
-                <a16:creationId xmlns="" xmlns:a16="http://schemas.microsoft.com/office/drawing/2014/main" id="{C73F7F9C-172E-4142-B646-FC46DC5E23A5}"/>
-              </a:ext>
-            </a:extLst>
-          </p:cNvPr>
-          <p:cNvSpPr/>
-          <p:nvPr/>
-        </p:nvSpPr>
-        <p:spPr>
-          <a:xfrm>
-            <a:off x="5959058" y="5467404"/>
-            <a:ext cx="278296" cy="340139"/>
-          </a:xfrm>
-          <a:prstGeom prst="downArrow">
-            <a:avLst/>
-          </a:prstGeom>
-        </p:spPr>
-        <p:style>
-          <a:lnRef idx="2">
-            <a:schemeClr val="accent1">
-              <a:shade val="50000"/>
-            </a:schemeClr>
-          </a:lnRef>
-          <a:fillRef idx="1">
-            <a:schemeClr val="accent1"/>
-          </a:fillRef>
-          <a:effectRef idx="0">
-            <a:schemeClr val="accent1"/>
-          </a:effectRef>
-          <a:fontRef idx="minor">
-            <a:schemeClr val="lt1"/>
-          </a:fontRef>
-        </p:style>
-        <p:txBody>
-          <a:bodyPr rtlCol="0" anchor="ctr"/>
-          <a:lstStyle/>
-          <a:p>
-            <a:pPr algn="ctr"/>
-            <a:endParaRPr lang="en-US"/>
-          </a:p>
-        </p:txBody>
-      </p:sp>
-      <p:sp>
-        <p:nvSpPr>
-          <p:cNvPr id="24" name="Rectangle: Rounded Corners 23">
-            <a:extLst>
-              <a:ext uri="{FF2B5EF4-FFF2-40B4-BE49-F238E27FC236}">
-                <a16:creationId xmlns="" xmlns:a16="http://schemas.microsoft.com/office/drawing/2014/main" id="{64DF43C6-F06C-4F77-9DA7-C500E96206D7}"/>
-              </a:ext>
-            </a:extLst>
-          </p:cNvPr>
-          <p:cNvSpPr/>
-          <p:nvPr/>
-        </p:nvSpPr>
-        <p:spPr>
-          <a:xfrm>
-            <a:off x="1789042" y="1320806"/>
-            <a:ext cx="2076174" cy="659075"/>
-          </a:xfrm>
-          <a:prstGeom prst="roundRect">
-            <a:avLst/>
-          </a:prstGeom>
-        </p:spPr>
-        <p:style>
-          <a:lnRef idx="2">
-            <a:schemeClr val="accent1">
-              <a:shade val="50000"/>
-            </a:schemeClr>
-          </a:lnRef>
-          <a:fillRef idx="1">
-            <a:schemeClr val="accent1"/>
-          </a:fillRef>
-          <a:effectRef idx="0">
-            <a:schemeClr val="accent1"/>
-          </a:effectRef>
-          <a:fontRef idx="minor">
-            <a:schemeClr val="lt1"/>
-          </a:fontRef>
-        </p:style>
-        <p:txBody>
-          <a:bodyPr rtlCol="0" anchor="ctr"/>
-          <a:lstStyle/>
-          <a:p>
-            <a:pPr algn="ctr"/>
-            <a:r>
-              <a:rPr lang="en-US" dirty="0"/>
-              <a:t>Input with </a:t>
-            </a:r>
-          </a:p>
-          <a:p>
-            <a:pPr algn="ctr"/>
-            <a:r>
-              <a:rPr lang="en-US" dirty="0"/>
-              <a:t>Raw Data</a:t>
-            </a:r>
-          </a:p>
-        </p:txBody>
-      </p:sp>
-      <p:sp>
-        <p:nvSpPr>
-          <p:cNvPr id="25" name="Arrow: Right 24">
-            <a:extLst>
-              <a:ext uri="{FF2B5EF4-FFF2-40B4-BE49-F238E27FC236}">
-                <a16:creationId xmlns="" xmlns:a16="http://schemas.microsoft.com/office/drawing/2014/main" id="{48D03535-D2F4-479A-97F6-2664A40E051B}"/>
-              </a:ext>
-            </a:extLst>
-          </p:cNvPr>
-          <p:cNvSpPr/>
-          <p:nvPr/>
-        </p:nvSpPr>
-        <p:spPr>
-          <a:xfrm>
-            <a:off x="3962397" y="1511195"/>
-            <a:ext cx="993913" cy="278295"/>
-          </a:xfrm>
-          <a:prstGeom prst="rightArrow">
-            <a:avLst/>
-          </a:prstGeom>
-        </p:spPr>
-        <p:style>
-          <a:lnRef idx="2">
-            <a:schemeClr val="accent1">
-              <a:shade val="50000"/>
-            </a:schemeClr>
-          </a:lnRef>
-          <a:fillRef idx="1">
-            <a:schemeClr val="accent1"/>
-          </a:fillRef>
-          <a:effectRef idx="0">
-            <a:schemeClr val="accent1"/>
-          </a:effectRef>
-          <a:fontRef idx="minor">
-            <a:schemeClr val="lt1"/>
-          </a:fontRef>
-        </p:style>
-        <p:txBody>
-          <a:bodyPr rtlCol="0" anchor="ctr"/>
-          <a:lstStyle/>
-          <a:p>
-            <a:pPr algn="ctr"/>
-            <a:endParaRPr lang="en-US"/>
-          </a:p>
-        </p:txBody>
-      </p:sp>
-      <p:sp>
-        <p:nvSpPr>
-          <p:cNvPr id="26" name="Arrow: Right 25">
-            <a:extLst>
-              <a:ext uri="{FF2B5EF4-FFF2-40B4-BE49-F238E27FC236}">
-                <a16:creationId xmlns="" xmlns:a16="http://schemas.microsoft.com/office/drawing/2014/main" id="{99814D6A-E535-43B2-A6F0-D0C17373064F}"/>
-              </a:ext>
-            </a:extLst>
-          </p:cNvPr>
-          <p:cNvSpPr/>
-          <p:nvPr/>
-        </p:nvSpPr>
-        <p:spPr>
-          <a:xfrm>
-            <a:off x="7231269" y="6100857"/>
-            <a:ext cx="993913" cy="278295"/>
-          </a:xfrm>
-          <a:prstGeom prst="rightArrow">
-            <a:avLst/>
-          </a:prstGeom>
-        </p:spPr>
-        <p:style>
-          <a:lnRef idx="2">
-            <a:schemeClr val="accent1">
-              <a:shade val="50000"/>
-            </a:schemeClr>
-          </a:lnRef>
-          <a:fillRef idx="1">
-            <a:schemeClr val="accent1"/>
-          </a:fillRef>
-          <a:effectRef idx="0">
-            <a:schemeClr val="accent1"/>
-          </a:effectRef>
-          <a:fontRef idx="minor">
-            <a:schemeClr val="lt1"/>
-          </a:fontRef>
-        </p:style>
-        <p:txBody>
-          <a:bodyPr rtlCol="0" anchor="ctr"/>
-          <a:lstStyle/>
-          <a:p>
-            <a:pPr algn="ctr"/>
-            <a:endParaRPr lang="en-US"/>
-          </a:p>
-        </p:txBody>
-      </p:sp>
-      <p:sp>
-        <p:nvSpPr>
-          <p:cNvPr id="27" name="Rectangle: Rounded Corners 26">
-            <a:extLst>
-              <a:ext uri="{FF2B5EF4-FFF2-40B4-BE49-F238E27FC236}">
-                <a16:creationId xmlns="" xmlns:a16="http://schemas.microsoft.com/office/drawing/2014/main" id="{2839C589-4E66-477F-A2E9-D7ABF3A4E53A}"/>
-              </a:ext>
-            </a:extLst>
-          </p:cNvPr>
-          <p:cNvSpPr/>
-          <p:nvPr/>
-        </p:nvSpPr>
-        <p:spPr>
-          <a:xfrm>
-            <a:off x="8322363" y="5879544"/>
-            <a:ext cx="2076174" cy="659075"/>
-          </a:xfrm>
-          <a:prstGeom prst="roundRect">
-            <a:avLst/>
-          </a:prstGeom>
-        </p:spPr>
-        <p:style>
-          <a:lnRef idx="2">
-            <a:schemeClr val="accent1">
-              <a:shade val="50000"/>
-            </a:schemeClr>
-          </a:lnRef>
-          <a:fillRef idx="1">
-            <a:schemeClr val="accent1"/>
-          </a:fillRef>
-          <a:effectRef idx="0">
-            <a:schemeClr val="accent1"/>
-          </a:effectRef>
-          <a:fontRef idx="minor">
-            <a:schemeClr val="lt1"/>
-          </a:fontRef>
-        </p:style>
-        <p:txBody>
-          <a:bodyPr rtlCol="0" anchor="ctr"/>
-          <a:lstStyle/>
-          <a:p>
-            <a:pPr algn="ctr"/>
-            <a:r>
-              <a:rPr lang="en-US" dirty="0"/>
-              <a:t>GO Analysis</a:t>
-            </a:r>
-          </a:p>
-          <a:p>
-            <a:pPr algn="ctr"/>
-            <a:r>
-              <a:rPr lang="en-US" sz="1200" dirty="0"/>
-              <a:t>(David 6.8)</a:t>
-            </a:r>
-          </a:p>
-        </p:txBody>
-      </p:sp>
-      <p:sp>
-        <p:nvSpPr>
-          <p:cNvPr id="28" name="Arrow: Right 27">
-            <a:extLst>
-              <a:ext uri="{FF2B5EF4-FFF2-40B4-BE49-F238E27FC236}">
-                <a16:creationId xmlns="" xmlns:a16="http://schemas.microsoft.com/office/drawing/2014/main" id="{C05564E2-4444-4FED-A460-A891B7804AFD}"/>
-              </a:ext>
-            </a:extLst>
-          </p:cNvPr>
-          <p:cNvSpPr/>
-          <p:nvPr/>
-        </p:nvSpPr>
-        <p:spPr>
-          <a:xfrm>
-            <a:off x="13764587" y="11777203"/>
-            <a:ext cx="993913" cy="278295"/>
-          </a:xfrm>
-          <a:prstGeom prst="rightArrow">
-            <a:avLst/>
-          </a:prstGeom>
-        </p:spPr>
-        <p:style>
-          <a:lnRef idx="2">
-            <a:schemeClr val="accent1">
-              <a:shade val="50000"/>
-            </a:schemeClr>
-          </a:lnRef>
-          <a:fillRef idx="1">
-            <a:schemeClr val="accent1"/>
-          </a:fillRef>
-          <a:effectRef idx="0">
-            <a:schemeClr val="accent1"/>
-          </a:effectRef>
-          <a:fontRef idx="minor">
-            <a:schemeClr val="lt1"/>
-          </a:fontRef>
-        </p:style>
-        <p:txBody>
-          <a:bodyPr rtlCol="0" anchor="ctr"/>
-          <a:lstStyle/>
-          <a:p>
-            <a:pPr algn="ctr"/>
-            <a:endParaRPr lang="en-US"/>
-          </a:p>
-        </p:txBody>
-      </p:sp>
-      <p:sp>
-        <p:nvSpPr>
-          <p:cNvPr id="29" name="Rectangle: Rounded Corners 28">
-            <a:extLst>
-              <a:ext uri="{FF2B5EF4-FFF2-40B4-BE49-F238E27FC236}">
-                <a16:creationId xmlns="" xmlns:a16="http://schemas.microsoft.com/office/drawing/2014/main" id="{F11CF14C-80D8-4321-B1E1-A99616084090}"/>
-              </a:ext>
-            </a:extLst>
-          </p:cNvPr>
-          <p:cNvSpPr/>
-          <p:nvPr/>
-        </p:nvSpPr>
-        <p:spPr>
-          <a:xfrm>
-            <a:off x="1789045" y="5879544"/>
-            <a:ext cx="2076174" cy="659075"/>
-          </a:xfrm>
-          <a:prstGeom prst="roundRect">
-            <a:avLst/>
-          </a:prstGeom>
-        </p:spPr>
-        <p:style>
-          <a:lnRef idx="2">
-            <a:schemeClr val="accent1">
-              <a:shade val="50000"/>
-            </a:schemeClr>
-          </a:lnRef>
-          <a:fillRef idx="1">
-            <a:schemeClr val="accent1"/>
-          </a:fillRef>
-          <a:effectRef idx="0">
-            <a:schemeClr val="accent1"/>
-          </a:effectRef>
-          <a:fontRef idx="minor">
-            <a:schemeClr val="lt1"/>
-          </a:fontRef>
-        </p:style>
-        <p:txBody>
-          <a:bodyPr rtlCol="0" anchor="ctr"/>
-          <a:lstStyle/>
-          <a:p>
-            <a:pPr algn="ctr"/>
-            <a:r>
-              <a:rPr lang="en-US" dirty="0"/>
-              <a:t>Plots for DEGs</a:t>
-            </a:r>
-          </a:p>
-          <a:p>
-            <a:pPr algn="ctr"/>
-            <a:r>
-              <a:rPr lang="en-US" sz="1200" dirty="0"/>
-              <a:t>(</a:t>
-            </a:r>
-            <a:r>
-              <a:rPr lang="en-US" sz="1200" dirty="0" err="1"/>
-              <a:t>Vennerable</a:t>
-            </a:r>
-            <a:r>
-              <a:rPr lang="en-US" sz="1200" dirty="0"/>
-              <a:t>, ggplot2,  </a:t>
-            </a:r>
-            <a:r>
-              <a:rPr lang="en-US" sz="1200" dirty="0" err="1"/>
-              <a:t>ComplexHeatmap</a:t>
-            </a:r>
-            <a:r>
-              <a:rPr lang="en-US" sz="1200" dirty="0"/>
-              <a:t>)</a:t>
-            </a:r>
-          </a:p>
-        </p:txBody>
-      </p:sp>
-      <p:sp>
-        <p:nvSpPr>
-          <p:cNvPr id="30" name="Arrow: Right 29">
-            <a:extLst>
-              <a:ext uri="{FF2B5EF4-FFF2-40B4-BE49-F238E27FC236}">
-                <a16:creationId xmlns="" xmlns:a16="http://schemas.microsoft.com/office/drawing/2014/main" id="{EE59FEE5-37FD-41B2-8EC3-62FF1B1CD6BB}"/>
-              </a:ext>
-            </a:extLst>
-          </p:cNvPr>
-          <p:cNvSpPr/>
-          <p:nvPr/>
-        </p:nvSpPr>
-        <p:spPr>
-          <a:xfrm rot="10800000">
-            <a:off x="3962400" y="6069933"/>
-            <a:ext cx="993913" cy="278295"/>
-          </a:xfrm>
-          <a:prstGeom prst="rightArrow">
-            <a:avLst/>
-          </a:prstGeom>
-        </p:spPr>
-        <p:style>
-          <a:lnRef idx="2">
-            <a:schemeClr val="accent1">
-              <a:shade val="50000"/>
-            </a:schemeClr>
-          </a:lnRef>
-          <a:fillRef idx="1">
-            <a:schemeClr val="accent1"/>
-          </a:fillRef>
-          <a:effectRef idx="0">
-            <a:schemeClr val="accent1"/>
-          </a:effectRef>
-          <a:fontRef idx="minor">
-            <a:schemeClr val="lt1"/>
-          </a:fontRef>
-        </p:style>
-        <p:txBody>
-          <a:bodyPr rtlCol="0" anchor="ctr"/>
-          <a:lstStyle/>
-          <a:p>
-            <a:pPr algn="ctr"/>
-            <a:endParaRPr lang="en-US"/>
-          </a:p>
-        </p:txBody>
-      </p:sp>
-      <p:sp>
-        <p:nvSpPr>
-          <p:cNvPr id="35" name="Rectangle: Rounded Corners 34">
-            <a:extLst>
-              <a:ext uri="{FF2B5EF4-FFF2-40B4-BE49-F238E27FC236}">
-                <a16:creationId xmlns="" xmlns:a16="http://schemas.microsoft.com/office/drawing/2014/main" id="{C9B274AC-2466-452C-AD33-C083A012279D}"/>
-              </a:ext>
-            </a:extLst>
-          </p:cNvPr>
-          <p:cNvSpPr/>
-          <p:nvPr/>
-        </p:nvSpPr>
-        <p:spPr>
-          <a:xfrm>
-            <a:off x="5057911" y="4761936"/>
-            <a:ext cx="2076174" cy="659075"/>
-          </a:xfrm>
-          <a:prstGeom prst="roundRect">
-            <a:avLst/>
-          </a:prstGeom>
-        </p:spPr>
-        <p:style>
-          <a:lnRef idx="2">
-            <a:schemeClr val="accent1">
-              <a:shade val="50000"/>
-            </a:schemeClr>
-          </a:lnRef>
-          <a:fillRef idx="1">
-            <a:schemeClr val="accent1"/>
-          </a:fillRef>
-          <a:effectRef idx="0">
-            <a:schemeClr val="accent1"/>
-          </a:effectRef>
-          <a:fontRef idx="minor">
-            <a:schemeClr val="lt1"/>
-          </a:fontRef>
-        </p:style>
-        <p:txBody>
-          <a:bodyPr rtlCol="0" anchor="ctr"/>
-          <a:lstStyle/>
-          <a:p>
-            <a:pPr algn="ctr"/>
-            <a:r>
-              <a:rPr lang="en-US" dirty="0"/>
-              <a:t>Extract gene counts  </a:t>
-            </a:r>
-            <a:r>
-              <a:rPr lang="en-US" sz="1200" dirty="0"/>
-              <a:t>(</a:t>
-            </a:r>
-            <a:r>
-              <a:rPr lang="en-US" sz="1200" dirty="0" err="1"/>
-              <a:t>Avg</a:t>
-            </a:r>
-            <a:r>
-              <a:rPr lang="en-US" sz="1200" dirty="0"/>
-              <a:t> counts&gt;10)</a:t>
-            </a:r>
-          </a:p>
-        </p:txBody>
-      </p:sp>
-      <p:sp>
-        <p:nvSpPr>
-          <p:cNvPr id="36" name="Arrow: Down 35">
-            <a:extLst>
-              <a:ext uri="{FF2B5EF4-FFF2-40B4-BE49-F238E27FC236}">
-                <a16:creationId xmlns="" xmlns:a16="http://schemas.microsoft.com/office/drawing/2014/main" id="{7379D9AD-6007-4CFB-AF65-9D6198B323A9}"/>
-              </a:ext>
-            </a:extLst>
-          </p:cNvPr>
-          <p:cNvSpPr/>
-          <p:nvPr/>
-        </p:nvSpPr>
-        <p:spPr>
-          <a:xfrm>
-            <a:off x="5959057" y="4344939"/>
-            <a:ext cx="278296" cy="340139"/>
-          </a:xfrm>
-          <a:prstGeom prst="downArrow">
-            <a:avLst/>
-          </a:prstGeom>
-        </p:spPr>
-        <p:style>
-          <a:lnRef idx="2">
-            <a:schemeClr val="accent1">
-              <a:shade val="50000"/>
-            </a:schemeClr>
-          </a:lnRef>
-          <a:fillRef idx="1">
-            <a:schemeClr val="accent1"/>
-          </a:fillRef>
-          <a:effectRef idx="0">
-            <a:schemeClr val="accent1"/>
-          </a:effectRef>
-          <a:fontRef idx="minor">
-            <a:schemeClr val="lt1"/>
-          </a:fontRef>
-        </p:style>
-        <p:txBody>
-          <a:bodyPr rtlCol="0" anchor="ctr"/>
-          <a:lstStyle/>
-          <a:p>
-            <a:pPr algn="ctr"/>
-            <a:endParaRPr lang="en-US"/>
-          </a:p>
-        </p:txBody>
-      </p:sp>
-      <p:sp>
-        <p:nvSpPr>
-          <p:cNvPr id="40" name="Title 1">
-            <a:extLst>
-              <a:ext uri="{FF2B5EF4-FFF2-40B4-BE49-F238E27FC236}">
-                <a16:creationId xmlns="" xmlns:a16="http://schemas.microsoft.com/office/drawing/2014/main" id="{398E1561-8AF0-4FC7-A6FC-E7B0088A35D0}"/>
-              </a:ext>
-            </a:extLst>
-          </p:cNvPr>
-          <p:cNvSpPr>
-            <a:spLocks noGrp="1"/>
-          </p:cNvSpPr>
-          <p:nvPr>
-            <p:ph type="title"/>
-          </p:nvPr>
-        </p:nvSpPr>
-        <p:spPr>
-          <a:xfrm>
-            <a:off x="838200" y="365126"/>
-            <a:ext cx="10515600" cy="497147"/>
+            <a:off x="1708920" y="353401"/>
+            <a:ext cx="3281824" cy="575779"/>
           </a:xfrm>
         </p:spPr>
         <p:txBody>
           <a:bodyPr>
-            <a:normAutofit/>
+            <a:noAutofit/>
           </a:bodyPr>
           <a:lstStyle/>
           <a:p>
             <a:r>
-              <a:rPr lang="en-US" sz="1800" b="1" dirty="0">
+              <a:rPr lang="en-US" sz="1800" b="1" i="0" dirty="0">
+                <a:effectLst/>
                 <a:latin typeface="AdvPSA183"/>
               </a:rPr>
-              <a:t>Pipeline and </a:t>
-            </a:r>
-            <a:r>
-              <a:rPr lang="en-US" sz="1800" b="1" dirty="0" smtClean="0">
-                <a:latin typeface="AdvPSA183"/>
-              </a:rPr>
-              <a:t>Steps</a:t>
+              <a:t>PCA Analysis of Samples</a:t>
             </a:r>
             <a:endParaRPr lang="en-US" sz="1800" b="1" dirty="0">
               <a:latin typeface="AdvPSA183"/>
@@ -4319,10 +4307,64 @@
           </a:p>
         </p:txBody>
       </p:sp>
+      <p:pic>
+        <p:nvPicPr>
+          <p:cNvPr id="2052" name="Picture 4"/>
+          <p:cNvPicPr>
+            <a:picLocks noChangeAspect="1" noChangeArrowheads="1"/>
+          </p:cNvPicPr>
+          <p:nvPr/>
+        </p:nvPicPr>
+        <p:blipFill>
+          <a:blip r:embed="rId2">
+            <a:extLst>
+              <a:ext uri="{28A0092B-C50C-407E-A947-70E740481C1C}">
+                <a14:useLocalDpi xmlns:a14="http://schemas.microsoft.com/office/drawing/2010/main" val="0"/>
+              </a:ext>
+            </a:extLst>
+          </a:blip>
+          <a:srcRect/>
+          <a:stretch>
+            <a:fillRect/>
+          </a:stretch>
+        </p:blipFill>
+        <p:spPr bwMode="auto">
+          <a:xfrm>
+            <a:off x="2535119" y="1991171"/>
+            <a:ext cx="7921624" cy="2963274"/>
+          </a:xfrm>
+          <a:prstGeom prst="rect">
+            <a:avLst/>
+          </a:prstGeom>
+          <a:noFill/>
+          <a:ln>
+            <a:noFill/>
+          </a:ln>
+          <a:extLst>
+            <a:ext uri="{909E8E84-426E-40DD-AFC4-6F175D3DCCD1}">
+              <a14:hiddenFill xmlns:a14="http://schemas.microsoft.com/office/drawing/2010/main">
+                <a:solidFill>
+                  <a:schemeClr val="accent1"/>
+                </a:solidFill>
+              </a14:hiddenFill>
+            </a:ext>
+            <a:ext uri="{91240B29-F687-4F45-9708-019B960494DF}">
+              <a14:hiddenLine xmlns:a14="http://schemas.microsoft.com/office/drawing/2010/main" w="9525">
+                <a:solidFill>
+                  <a:schemeClr val="tx1"/>
+                </a:solidFill>
+                <a:miter lim="800000"/>
+                <a:headEnd/>
+                <a:tailEnd/>
+              </a14:hiddenLine>
+            </a:ext>
+          </a:extLst>
+        </p:spPr>
+      </p:pic>
     </p:spTree>
     <p:extLst>
       <p:ext uri="{BB962C8B-B14F-4D97-AF65-F5344CB8AC3E}">
-        <p14:creationId xmlns:p14="http://schemas.microsoft.com/office/powerpoint/2010/main" val="1039408565"/>
+        <p14:creationId xmlns:p14="http://schemas.microsoft.com/office/powerpoint/2010/main" val="2785417126"/>
       </p:ext>
     </p:extLst>
   </p:cSld>
@@ -4351,51 +4393,10 @@
       </p:grpSpPr>
       <p:sp>
         <p:nvSpPr>
-          <p:cNvPr id="2" name="Title 1">
-            <a:extLst>
-              <a:ext uri="{FF2B5EF4-FFF2-40B4-BE49-F238E27FC236}">
-                <a16:creationId xmlns="" xmlns:a16="http://schemas.microsoft.com/office/drawing/2014/main" id="{4EA3CB9E-619E-4288-9D33-73290203AB4F}"/>
-              </a:ext>
-            </a:extLst>
-          </p:cNvPr>
-          <p:cNvSpPr>
-            <a:spLocks noGrp="1"/>
-          </p:cNvSpPr>
-          <p:nvPr>
-            <p:ph type="title"/>
-          </p:nvPr>
-        </p:nvSpPr>
-        <p:spPr>
-          <a:xfrm>
-            <a:off x="1708920" y="353401"/>
-            <a:ext cx="3281824" cy="575779"/>
-          </a:xfrm>
-        </p:spPr>
-        <p:txBody>
-          <a:bodyPr>
-            <a:noAutofit/>
-          </a:bodyPr>
-          <a:lstStyle/>
-          <a:p>
-            <a:r>
-              <a:rPr lang="en-US" sz="1800" b="1" i="0" dirty="0">
-                <a:effectLst/>
-                <a:latin typeface="AdvPSA183"/>
-              </a:rPr>
-              <a:t>PCA Analysis of Samples</a:t>
-            </a:r>
-            <a:endParaRPr lang="en-US" sz="1800" b="1" dirty="0">
-              <a:latin typeface="AdvPSA183"/>
-            </a:endParaRPr>
-          </a:p>
-        </p:txBody>
-      </p:sp>
-      <p:sp>
-        <p:nvSpPr>
           <p:cNvPr id="7" name="Title 1">
             <a:extLst>
               <a:ext uri="{FF2B5EF4-FFF2-40B4-BE49-F238E27FC236}">
-                <a16:creationId xmlns="" xmlns:a16="http://schemas.microsoft.com/office/drawing/2014/main" id="{B0994368-9E16-7442-9049-7EF3FAAD3475}"/>
+                <a16:creationId xmlns:a16="http://schemas.microsoft.com/office/drawing/2014/main" xmlns="" id="{B0994368-9E16-7442-9049-7EF3FAAD3475}"/>
               </a:ext>
             </a:extLst>
           </p:cNvPr>
@@ -4406,7 +4407,7 @@
         </p:nvSpPr>
         <p:spPr>
           <a:xfrm>
-            <a:off x="7218240" y="353401"/>
+            <a:off x="3748648" y="353401"/>
             <a:ext cx="3985296" cy="575779"/>
           </a:xfrm>
           <a:prstGeom prst="rect">
@@ -4448,14 +4449,14 @@
       </p:sp>
       <p:pic>
         <p:nvPicPr>
-          <p:cNvPr id="1026" name="Picture 2"/>
+          <p:cNvPr id="2051" name="Picture 3"/>
           <p:cNvPicPr>
             <a:picLocks noChangeAspect="1" noChangeArrowheads="1"/>
           </p:cNvPicPr>
           <p:nvPr/>
         </p:nvPicPr>
         <p:blipFill>
-          <a:blip r:embed="rId2" cstate="print">
+          <a:blip r:embed="rId2">
             <a:extLst>
               <a:ext uri="{28A0092B-C50C-407E-A947-70E740481C1C}">
                 <a14:useLocalDpi xmlns:a14="http://schemas.microsoft.com/office/drawing/2010/main" val="0"/>
@@ -4469,8 +4470,8 @@
         </p:blipFill>
         <p:spPr bwMode="auto">
           <a:xfrm>
-            <a:off x="482486" y="2085173"/>
-            <a:ext cx="5815763" cy="2225126"/>
+            <a:off x="3039217" y="1084306"/>
+            <a:ext cx="5156200" cy="5137150"/>
           </a:xfrm>
           <a:prstGeom prst="rect">
             <a:avLst/>
@@ -4500,64 +4501,10 @@
           </a:extLst>
         </p:spPr>
       </p:pic>
-      <p:pic>
-        <p:nvPicPr>
-          <p:cNvPr id="1027" name="Picture 3"/>
-          <p:cNvPicPr>
-            <a:picLocks noChangeAspect="1" noChangeArrowheads="1"/>
-          </p:cNvPicPr>
-          <p:nvPr/>
-        </p:nvPicPr>
-        <p:blipFill>
-          <a:blip r:embed="rId3">
-            <a:extLst>
-              <a:ext uri="{28A0092B-C50C-407E-A947-70E740481C1C}">
-                <a14:useLocalDpi xmlns:a14="http://schemas.microsoft.com/office/drawing/2010/main" val="0"/>
-              </a:ext>
-            </a:extLst>
-          </a:blip>
-          <a:srcRect/>
-          <a:stretch>
-            <a:fillRect/>
-          </a:stretch>
-        </p:blipFill>
-        <p:spPr bwMode="auto">
-          <a:xfrm>
-            <a:off x="6548481" y="1076265"/>
-            <a:ext cx="5162550" cy="5149850"/>
-          </a:xfrm>
-          <a:prstGeom prst="rect">
-            <a:avLst/>
-          </a:prstGeom>
-          <a:noFill/>
-          <a:ln>
-            <a:noFill/>
-          </a:ln>
-          <a:extLst>
-            <a:ext uri="{909E8E84-426E-40DD-AFC4-6F175D3DCCD1}">
-              <a14:hiddenFill xmlns:a14="http://schemas.microsoft.com/office/drawing/2010/main">
-                <a:solidFill>
-                  <a:schemeClr val="accent1"/>
-                </a:solidFill>
-              </a14:hiddenFill>
-            </a:ext>
-            <a:ext uri="{91240B29-F687-4F45-9708-019B960494DF}">
-              <a14:hiddenLine xmlns:a14="http://schemas.microsoft.com/office/drawing/2010/main" w="9525">
-                <a:solidFill>
-                  <a:schemeClr val="tx1"/>
-                </a:solidFill>
-                <a:miter lim="800000"/>
-                <a:headEnd/>
-                <a:tailEnd/>
-              </a14:hiddenLine>
-            </a:ext>
-          </a:extLst>
-        </p:spPr>
-      </p:pic>
     </p:spTree>
     <p:extLst>
       <p:ext uri="{BB962C8B-B14F-4D97-AF65-F5344CB8AC3E}">
-        <p14:creationId xmlns:p14="http://schemas.microsoft.com/office/powerpoint/2010/main" val="2785417126"/>
+        <p14:creationId xmlns:p14="http://schemas.microsoft.com/office/powerpoint/2010/main" val="2566387104"/>
       </p:ext>
     </p:extLst>
   </p:cSld>
@@ -4586,7 +4533,7 @@
       </p:grpSpPr>
       <p:pic>
         <p:nvPicPr>
-          <p:cNvPr id="5123" name="Picture 3"/>
+          <p:cNvPr id="1027" name="Picture 3"/>
           <p:cNvPicPr>
             <a:picLocks noChangeAspect="1" noChangeArrowheads="1"/>
           </p:cNvPicPr>
@@ -4607,8 +4554,8 @@
         </p:blipFill>
         <p:spPr bwMode="auto">
           <a:xfrm>
-            <a:off x="3438258" y="1227686"/>
-            <a:ext cx="4711700" cy="4864100"/>
+            <a:off x="3466252" y="1378029"/>
+            <a:ext cx="5370097" cy="4539444"/>
           </a:xfrm>
           <a:prstGeom prst="rect">
             <a:avLst/>
@@ -4638,6 +4585,114 @@
           </a:extLst>
         </p:spPr>
       </p:pic>
+      <p:sp>
+        <p:nvSpPr>
+          <p:cNvPr id="2" name="TextBox 1"/>
+          <p:cNvSpPr txBox="1"/>
+          <p:nvPr/>
+        </p:nvSpPr>
+        <p:spPr>
+          <a:xfrm>
+            <a:off x="4530789" y="1020291"/>
+            <a:ext cx="1126206" cy="369332"/>
+          </a:xfrm>
+          <a:prstGeom prst="rect">
+            <a:avLst/>
+          </a:prstGeom>
+          <a:noFill/>
+        </p:spPr>
+        <p:txBody>
+          <a:bodyPr wrap="none" rtlCol="0">
+            <a:spAutoFit/>
+          </a:bodyPr>
+          <a:lstStyle/>
+          <a:p>
+            <a:r>
+              <a:rPr lang="en-US" dirty="0" err="1" smtClean="0"/>
+              <a:t>A_Control</a:t>
+            </a:r>
+            <a:endParaRPr lang="en-US" dirty="0"/>
+          </a:p>
+        </p:txBody>
+      </p:sp>
+      <p:sp>
+        <p:nvSpPr>
+          <p:cNvPr id="6" name="TextBox 5"/>
+          <p:cNvSpPr txBox="1"/>
+          <p:nvPr/>
+        </p:nvSpPr>
+        <p:spPr>
+          <a:xfrm>
+            <a:off x="6607417" y="1008697"/>
+            <a:ext cx="1405449" cy="369332"/>
+          </a:xfrm>
+          <a:prstGeom prst="rect">
+            <a:avLst/>
+          </a:prstGeom>
+          <a:noFill/>
+        </p:spPr>
+        <p:txBody>
+          <a:bodyPr wrap="none" rtlCol="0">
+            <a:spAutoFit/>
+          </a:bodyPr>
+          <a:lstStyle/>
+          <a:p>
+            <a:r>
+              <a:rPr lang="en-US" dirty="0" err="1" smtClean="0"/>
+              <a:t>A_Treatment</a:t>
+            </a:r>
+            <a:endParaRPr lang="en-US" dirty="0"/>
+          </a:p>
+        </p:txBody>
+      </p:sp>
+      <p:sp>
+        <p:nvSpPr>
+          <p:cNvPr id="7" name="Title 1">
+            <a:extLst>
+              <a:ext uri="{FF2B5EF4-FFF2-40B4-BE49-F238E27FC236}">
+                <a16:creationId xmlns:a16="http://schemas.microsoft.com/office/drawing/2014/main" xmlns="" id="{4EA3CB9E-619E-4288-9D33-73290203AB4F}"/>
+              </a:ext>
+            </a:extLst>
+          </p:cNvPr>
+          <p:cNvSpPr>
+            <a:spLocks noGrp="1"/>
+          </p:cNvSpPr>
+          <p:nvPr>
+            <p:ph type="title"/>
+          </p:nvPr>
+        </p:nvSpPr>
+        <p:spPr>
+          <a:xfrm>
+            <a:off x="838200" y="365125"/>
+            <a:ext cx="10515600" cy="575779"/>
+          </a:xfrm>
+        </p:spPr>
+        <p:txBody>
+          <a:bodyPr>
+            <a:noAutofit/>
+          </a:bodyPr>
+          <a:lstStyle/>
+          <a:p>
+            <a:r>
+              <a:rPr lang="en-US" sz="1800" b="1" i="0" dirty="0" err="1" smtClean="0">
+                <a:effectLst/>
+                <a:latin typeface="AdvPSA183"/>
+              </a:rPr>
+              <a:t>Heatmap</a:t>
+            </a:r>
+            <a:r>
+              <a:rPr lang="en-US" sz="1800" b="1" i="0" dirty="0" smtClean="0">
+                <a:effectLst/>
+                <a:latin typeface="AdvPSA183"/>
+              </a:rPr>
+              <a:t> for all DEGs</a:t>
+            </a:r>
+            <a:endParaRPr lang="en-US" sz="1800" b="1" dirty="0">
+              <a:latin typeface="AdvPSA183"/>
+            </a:endParaRPr>
+          </a:p>
+        </p:txBody>
+      </p:sp>
     </p:spTree>
     <p:extLst>
       <p:ext uri="{BB962C8B-B14F-4D97-AF65-F5344CB8AC3E}">
@@ -4673,7 +4728,7 @@
           <p:cNvPr id="2" name="Title 1">
             <a:extLst>
               <a:ext uri="{FF2B5EF4-FFF2-40B4-BE49-F238E27FC236}">
-                <a16:creationId xmlns="" xmlns:a16="http://schemas.microsoft.com/office/drawing/2014/main" id="{4EA3CB9E-619E-4288-9D33-73290203AB4F}"/>
+                <a16:creationId xmlns:a16="http://schemas.microsoft.com/office/drawing/2014/main" xmlns="" id="{4EA3CB9E-619E-4288-9D33-73290203AB4F}"/>
               </a:ext>
             </a:extLst>
           </p:cNvPr>
@@ -4711,7 +4766,7 @@
       </p:sp>
       <p:pic>
         <p:nvPicPr>
-          <p:cNvPr id="2051" name="Picture 3"/>
+          <p:cNvPr id="3074" name="Picture 2"/>
           <p:cNvPicPr>
             <a:picLocks noChangeAspect="1" noChangeArrowheads="1"/>
           </p:cNvPicPr>
@@ -4732,8 +4787,8 @@
         </p:blipFill>
         <p:spPr bwMode="auto">
           <a:xfrm>
-            <a:off x="2948478" y="928073"/>
-            <a:ext cx="5372100" cy="5194300"/>
+            <a:off x="3295680" y="1102912"/>
+            <a:ext cx="5378450" cy="4908550"/>
           </a:xfrm>
           <a:prstGeom prst="rect">
             <a:avLst/>
@@ -4798,7 +4853,7 @@
           <p:cNvPr id="2" name="Title 1">
             <a:extLst>
               <a:ext uri="{FF2B5EF4-FFF2-40B4-BE49-F238E27FC236}">
-                <a16:creationId xmlns="" xmlns:a16="http://schemas.microsoft.com/office/drawing/2014/main" id="{4EA3CB9E-619E-4288-9D33-73290203AB4F}"/>
+                <a16:creationId xmlns:a16="http://schemas.microsoft.com/office/drawing/2014/main" xmlns="" id="{4EA3CB9E-619E-4288-9D33-73290203AB4F}"/>
               </a:ext>
             </a:extLst>
           </p:cNvPr>
@@ -4857,7 +4912,7 @@
         </p:blipFill>
         <p:spPr bwMode="auto">
           <a:xfrm>
-            <a:off x="3005152" y="1527267"/>
+            <a:off x="3184614" y="1527267"/>
             <a:ext cx="4925346" cy="4636950"/>
           </a:xfrm>
           <a:prstGeom prst="rect">
@@ -4918,9 +4973,50 @@
           <a:chExt cx="0" cy="0"/>
         </a:xfrm>
       </p:grpSpPr>
+      <p:sp>
+        <p:nvSpPr>
+          <p:cNvPr id="13" name="Title 1">
+            <a:extLst>
+              <a:ext uri="{FF2B5EF4-FFF2-40B4-BE49-F238E27FC236}">
+                <a16:creationId xmlns:a16="http://schemas.microsoft.com/office/drawing/2014/main" xmlns="" id="{4EA3CB9E-619E-4288-9D33-73290203AB4F}"/>
+              </a:ext>
+            </a:extLst>
+          </p:cNvPr>
+          <p:cNvSpPr>
+            <a:spLocks noGrp="1"/>
+          </p:cNvSpPr>
+          <p:nvPr>
+            <p:ph type="title"/>
+          </p:nvPr>
+        </p:nvSpPr>
+        <p:spPr>
+          <a:xfrm>
+            <a:off x="838200" y="365125"/>
+            <a:ext cx="10515600" cy="575779"/>
+          </a:xfrm>
+        </p:spPr>
+        <p:txBody>
+          <a:bodyPr>
+            <a:noAutofit/>
+          </a:bodyPr>
+          <a:lstStyle/>
+          <a:p>
+            <a:r>
+              <a:rPr lang="en-US" sz="1800" b="1" i="0" dirty="0" smtClean="0">
+                <a:effectLst/>
+                <a:latin typeface="AdvPSA183"/>
+              </a:rPr>
+              <a:t>Venn Diagram</a:t>
+            </a:r>
+            <a:endParaRPr lang="en-US" sz="1800" b="1" dirty="0">
+              <a:latin typeface="AdvPSA183"/>
+            </a:endParaRPr>
+          </a:p>
+        </p:txBody>
+      </p:sp>
       <p:pic>
         <p:nvPicPr>
-          <p:cNvPr id="4098" name="Picture 2"/>
+          <p:cNvPr id="4" name="Picture 2"/>
           <p:cNvPicPr>
             <a:picLocks noChangeAspect="1" noChangeArrowheads="1"/>
           </p:cNvPicPr>
@@ -4941,7 +5037,7 @@
         </p:blipFill>
         <p:spPr bwMode="auto">
           <a:xfrm>
-            <a:off x="3700330" y="1742353"/>
+            <a:off x="3973795" y="1595540"/>
             <a:ext cx="4095389" cy="3101867"/>
           </a:xfrm>
           <a:prstGeom prst="rect">
@@ -4974,45 +5070,126 @@
       </p:pic>
       <p:sp>
         <p:nvSpPr>
-          <p:cNvPr id="13" name="Title 1">
-            <a:extLst>
-              <a:ext uri="{FF2B5EF4-FFF2-40B4-BE49-F238E27FC236}">
-                <a16:creationId xmlns="" xmlns:a16="http://schemas.microsoft.com/office/drawing/2014/main" id="{4EA3CB9E-619E-4288-9D33-73290203AB4F}"/>
-              </a:ext>
-            </a:extLst>
-          </p:cNvPr>
-          <p:cNvSpPr>
-            <a:spLocks noGrp="1"/>
-          </p:cNvSpPr>
-          <p:nvPr>
-            <p:ph type="title"/>
-          </p:nvPr>
+          <p:cNvPr id="5" name="TextBox 4"/>
+          <p:cNvSpPr txBox="1"/>
+          <p:nvPr/>
         </p:nvSpPr>
         <p:spPr>
           <a:xfrm>
-            <a:off x="838200" y="365125"/>
-            <a:ext cx="10515600" cy="575779"/>
-          </a:xfrm>
-        </p:spPr>
-        <p:txBody>
-          <a:bodyPr>
-            <a:noAutofit/>
+            <a:off x="6277868" y="1290844"/>
+            <a:ext cx="644937" cy="369332"/>
+          </a:xfrm>
+          <a:prstGeom prst="rect">
+            <a:avLst/>
+          </a:prstGeom>
+          <a:noFill/>
+        </p:spPr>
+        <p:txBody>
+          <a:bodyPr wrap="square" rtlCol="0">
+            <a:spAutoFit/>
           </a:bodyPr>
           <a:lstStyle/>
           <a:p>
             <a:r>
-              <a:rPr lang="en-US" sz="1800" b="1" i="0" dirty="0" smtClean="0">
-                <a:effectLst/>
-                <a:latin typeface="AdvPSA183"/>
-              </a:rPr>
-              <a:t>Venn Diagram</a:t>
-            </a:r>
-            <a:endParaRPr lang="en-US" sz="1800" b="1" dirty="0">
-              <a:latin typeface="AdvPSA183"/>
-            </a:endParaRPr>
-          </a:p>
-        </p:txBody>
-      </p:sp>
+              <a:rPr lang="en-US" dirty="0" smtClean="0"/>
+              <a:t>B</a:t>
+            </a:r>
+            <a:endParaRPr lang="en-US" dirty="0"/>
+          </a:p>
+        </p:txBody>
+      </p:sp>
+      <p:sp>
+        <p:nvSpPr>
+          <p:cNvPr id="6" name="TextBox 5"/>
+          <p:cNvSpPr txBox="1"/>
+          <p:nvPr/>
+        </p:nvSpPr>
+        <p:spPr>
+          <a:xfrm>
+            <a:off x="4554913" y="2058906"/>
+            <a:ext cx="764848" cy="369332"/>
+          </a:xfrm>
+          <a:prstGeom prst="rect">
+            <a:avLst/>
+          </a:prstGeom>
+          <a:noFill/>
+        </p:spPr>
+        <p:txBody>
+          <a:bodyPr wrap="square" rtlCol="0">
+            <a:spAutoFit/>
+          </a:bodyPr>
+          <a:lstStyle/>
+          <a:p>
+            <a:r>
+              <a:rPr lang="en-US" dirty="0" smtClean="0"/>
+              <a:t>A</a:t>
+            </a:r>
+            <a:endParaRPr lang="en-US" dirty="0"/>
+          </a:p>
+        </p:txBody>
+      </p:sp>
+      <p:sp>
+        <p:nvSpPr>
+          <p:cNvPr id="7" name="TextBox 6"/>
+          <p:cNvSpPr txBox="1"/>
+          <p:nvPr/>
+        </p:nvSpPr>
+        <p:spPr>
+          <a:xfrm>
+            <a:off x="5759864" y="5715602"/>
+            <a:ext cx="1813125" cy="369332"/>
+          </a:xfrm>
+          <a:prstGeom prst="rect">
+            <a:avLst/>
+          </a:prstGeom>
+          <a:noFill/>
+        </p:spPr>
+        <p:txBody>
+          <a:bodyPr wrap="none" rtlCol="0">
+            <a:spAutoFit/>
+          </a:bodyPr>
+          <a:lstStyle/>
+          <a:p>
+            <a:r>
+              <a:rPr lang="en-US" dirty="0"/>
+              <a:t>GO Term Analysis</a:t>
+            </a:r>
+          </a:p>
+        </p:txBody>
+      </p:sp>
+      <p:cxnSp>
+        <p:nvCxnSpPr>
+          <p:cNvPr id="8" name="Straight Arrow Connector 7"/>
+          <p:cNvCxnSpPr/>
+          <p:nvPr/>
+        </p:nvCxnSpPr>
+        <p:spPr>
+          <a:xfrm>
+            <a:off x="6666427" y="3271246"/>
+            <a:ext cx="1" cy="2367443"/>
+          </a:xfrm>
+          <a:prstGeom prst="straightConnector1">
+            <a:avLst/>
+          </a:prstGeom>
+          <a:ln>
+            <a:tailEnd type="arrow"/>
+          </a:ln>
+        </p:spPr>
+        <p:style>
+          <a:lnRef idx="1">
+            <a:schemeClr val="accent1"/>
+          </a:lnRef>
+          <a:fillRef idx="0">
+            <a:schemeClr val="accent1"/>
+          </a:fillRef>
+          <a:effectRef idx="0">
+            <a:schemeClr val="accent1"/>
+          </a:effectRef>
+          <a:fontRef idx="minor">
+            <a:schemeClr val="tx1"/>
+          </a:fontRef>
+        </p:style>
+      </p:cxnSp>
     </p:spTree>
     <p:extLst>
       <p:ext uri="{BB962C8B-B14F-4D97-AF65-F5344CB8AC3E}">
@@ -5188,7 +5365,7 @@
           <p:cNvPr id="8" name="Title 1">
             <a:extLst>
               <a:ext uri="{FF2B5EF4-FFF2-40B4-BE49-F238E27FC236}">
-                <a16:creationId xmlns="" xmlns:a16="http://schemas.microsoft.com/office/drawing/2014/main" id="{4EA3CB9E-619E-4288-9D33-73290203AB4F}"/>
+                <a16:creationId xmlns:a16="http://schemas.microsoft.com/office/drawing/2014/main" xmlns="" id="{4EA3CB9E-619E-4288-9D33-73290203AB4F}"/>
               </a:ext>
             </a:extLst>
           </p:cNvPr>
@@ -5254,9 +5431,50 @@
           <a:chExt cx="0" cy="0"/>
         </a:xfrm>
       </p:grpSpPr>
+      <p:sp>
+        <p:nvSpPr>
+          <p:cNvPr id="5" name="Title 1">
+            <a:extLst>
+              <a:ext uri="{FF2B5EF4-FFF2-40B4-BE49-F238E27FC236}">
+                <a16:creationId xmlns:a16="http://schemas.microsoft.com/office/drawing/2014/main" xmlns="" id="{4EA3CB9E-619E-4288-9D33-73290203AB4F}"/>
+              </a:ext>
+            </a:extLst>
+          </p:cNvPr>
+          <p:cNvSpPr>
+            <a:spLocks noGrp="1"/>
+          </p:cNvSpPr>
+          <p:nvPr>
+            <p:ph type="title"/>
+          </p:nvPr>
+        </p:nvSpPr>
+        <p:spPr>
+          <a:xfrm>
+            <a:off x="838200" y="365125"/>
+            <a:ext cx="10515600" cy="575779"/>
+          </a:xfrm>
+        </p:spPr>
+        <p:txBody>
+          <a:bodyPr>
+            <a:noAutofit/>
+          </a:bodyPr>
+          <a:lstStyle/>
+          <a:p>
+            <a:r>
+              <a:rPr lang="en-US" sz="1800" b="1" i="0" dirty="0" err="1" smtClean="0">
+                <a:effectLst/>
+                <a:latin typeface="AdvPSA183"/>
+              </a:rPr>
+              <a:t>BarPlot</a:t>
+            </a:r>
+            <a:endParaRPr lang="en-US" sz="1800" b="1" dirty="0">
+              <a:latin typeface="AdvPSA183"/>
+            </a:endParaRPr>
+          </a:p>
+        </p:txBody>
+      </p:sp>
       <p:pic>
         <p:nvPicPr>
-          <p:cNvPr id="6146" name="Picture 2"/>
+          <p:cNvPr id="4098" name="Picture 2"/>
           <p:cNvPicPr>
             <a:picLocks noChangeAspect="1" noChangeArrowheads="1"/>
           </p:cNvPicPr>
@@ -5277,8 +5495,8 @@
         </p:blipFill>
         <p:spPr bwMode="auto">
           <a:xfrm>
-            <a:off x="3782362" y="1349701"/>
-            <a:ext cx="3608862" cy="4811816"/>
+            <a:off x="4119563" y="849996"/>
+            <a:ext cx="3952875" cy="5534025"/>
           </a:xfrm>
           <a:prstGeom prst="rect">
             <a:avLst/>
@@ -5308,47 +5526,6 @@
           </a:extLst>
         </p:spPr>
       </p:pic>
-      <p:sp>
-        <p:nvSpPr>
-          <p:cNvPr id="5" name="Title 1">
-            <a:extLst>
-              <a:ext uri="{FF2B5EF4-FFF2-40B4-BE49-F238E27FC236}">
-                <a16:creationId xmlns="" xmlns:a16="http://schemas.microsoft.com/office/drawing/2014/main" id="{4EA3CB9E-619E-4288-9D33-73290203AB4F}"/>
-              </a:ext>
-            </a:extLst>
-          </p:cNvPr>
-          <p:cNvSpPr>
-            <a:spLocks noGrp="1"/>
-          </p:cNvSpPr>
-          <p:nvPr>
-            <p:ph type="title"/>
-          </p:nvPr>
-        </p:nvSpPr>
-        <p:spPr>
-          <a:xfrm>
-            <a:off x="838200" y="365125"/>
-            <a:ext cx="10515600" cy="575779"/>
-          </a:xfrm>
-        </p:spPr>
-        <p:txBody>
-          <a:bodyPr>
-            <a:noAutofit/>
-          </a:bodyPr>
-          <a:lstStyle/>
-          <a:p>
-            <a:r>
-              <a:rPr lang="en-US" sz="1800" b="1" i="0" dirty="0" err="1" smtClean="0">
-                <a:effectLst/>
-                <a:latin typeface="AdvPSA183"/>
-              </a:rPr>
-              <a:t>BarPlot</a:t>
-            </a:r>
-            <a:endParaRPr lang="en-US" sz="1800" b="1" dirty="0">
-              <a:latin typeface="AdvPSA183"/>
-            </a:endParaRPr>
-          </a:p>
-        </p:txBody>
-      </p:sp>
     </p:spTree>
     <p:extLst>
       <p:ext uri="{BB962C8B-B14F-4D97-AF65-F5344CB8AC3E}">
@@ -5651,28 +5828,13 @@
   <a:extraClrSchemeLst/>
   <a:extLst>
     <a:ext uri="{05A4C25C-085E-4340-85A3-A5531E510DB2}">
-      <thm15:themeFamily xmlns="" xmlns:thm15="http://schemas.microsoft.com/office/thememl/2012/main" name="Office Theme" id="{62F939B6-93AF-4DB8-9C6B-D6C7DFDC589F}" vid="{4A3C46E8-61CC-4603-A589-7422A47A8E4A}"/>
+      <thm15:themeFamily xmlns:thm15="http://schemas.microsoft.com/office/thememl/2012/main" xmlns="" name="Office Theme" id="{62F939B6-93AF-4DB8-9C6B-D6C7DFDC589F}" vid="{4A3C46E8-61CC-4603-A589-7422A47A8E4A}"/>
     </a:ext>
   </a:extLst>
 </a:theme>
 </file>
 
 <file path=customXml/item1.xml><?xml version="1.0" encoding="utf-8"?>
-<p:properties xmlns:p="http://schemas.microsoft.com/office/2006/metadata/properties" xmlns:xsi="http://www.w3.org/2001/XMLSchema-instance" xmlns:pc="http://schemas.microsoft.com/office/infopath/2007/PartnerControls">
-  <documentManagement/>
-</p:properties>
-</file>
-
-<file path=customXml/item2.xml><?xml version="1.0" encoding="utf-8"?>
-<?mso-contentType ?>
-<FormTemplates xmlns="http://schemas.microsoft.com/sharepoint/v3/contenttype/forms">
-  <Display>DocumentLibraryForm</Display>
-  <Edit>DocumentLibraryForm</Edit>
-  <New>DocumentLibraryForm</New>
-</FormTemplates>
-</file>
-
-<file path=customXml/item3.xml><?xml version="1.0" encoding="utf-8"?>
 <ct:contentTypeSchema xmlns:ct="http://schemas.microsoft.com/office/2006/metadata/contentType" xmlns:ma="http://schemas.microsoft.com/office/2006/metadata/properties/metaAttributes" ct:_="" ma:_="" ma:contentTypeName="Document" ma:contentTypeID="0x010100510A9F56C5C7DB40A6D5FA625A26C59B" ma:contentTypeVersion="0" ma:contentTypeDescription="Create a new document." ma:contentTypeScope="" ma:versionID="30314e3a4c46119540c28cf1f2eba749">
   <xsd:schema xmlns:xsd="http://www.w3.org/2001/XMLSchema" xmlns:xs="http://www.w3.org/2001/XMLSchema" xmlns:p="http://schemas.microsoft.com/office/2006/metadata/properties" targetNamespace="http://schemas.microsoft.com/office/2006/metadata/properties" ma:root="true" ma:fieldsID="e24b8defeb99a9f6421f7a034d7af481">
     <xsd:element name="properties">
@@ -5786,17 +5948,33 @@
 </ct:contentTypeSchema>
 </file>
 
+<file path=customXml/item2.xml><?xml version="1.0" encoding="utf-8"?>
+<?mso-contentType ?>
+<FormTemplates xmlns="http://schemas.microsoft.com/sharepoint/v3/contenttype/forms">
+  <Display>DocumentLibraryForm</Display>
+  <Edit>DocumentLibraryForm</Edit>
+  <New>DocumentLibraryForm</New>
+</FormTemplates>
+</file>
+
+<file path=customXml/item3.xml><?xml version="1.0" encoding="utf-8"?>
+<p:properties xmlns:p="http://schemas.microsoft.com/office/2006/metadata/properties" xmlns:xsi="http://www.w3.org/2001/XMLSchema-instance" xmlns:pc="http://schemas.microsoft.com/office/infopath/2007/PartnerControls">
+  <documentManagement/>
+</p:properties>
+</file>
+
 <file path=customXml/itemProps1.xml><?xml version="1.0" encoding="utf-8"?>
-<ds:datastoreItem xmlns:ds="http://schemas.openxmlformats.org/officeDocument/2006/customXml" ds:itemID="{BD5F8EFF-0F12-4289-B513-E298FA73B1BC}">
+<ds:datastoreItem xmlns:ds="http://schemas.openxmlformats.org/officeDocument/2006/customXml" ds:itemID="{3128AD8D-C324-4694-A088-A063F01683D2}">
   <ds:schemaRefs>
-    <ds:schemaRef ds:uri="http://purl.org/dc/dcmitype/"/>
+    <ds:schemaRef ds:uri="http://schemas.microsoft.com/office/2006/metadata/contentType"/>
+    <ds:schemaRef ds:uri="http://schemas.microsoft.com/office/2006/metadata/properties/metaAttributes"/>
+    <ds:schemaRef ds:uri="http://www.w3.org/2001/XMLSchema"/>
+    <ds:schemaRef ds:uri="http://schemas.microsoft.com/office/2006/metadata/properties"/>
+    <ds:schemaRef ds:uri="http://schemas.openxmlformats.org/package/2006/metadata/core-properties"/>
     <ds:schemaRef ds:uri="http://purl.org/dc/elements/1.1/"/>
+    <ds:schemaRef ds:uri="http://purl.org/dc/terms/"/>
+    <ds:schemaRef ds:uri="http://schemas.microsoft.com/internal/obd"/>
     <ds:schemaRef ds:uri="http://schemas.microsoft.com/office/infopath/2007/PartnerControls"/>
-    <ds:schemaRef ds:uri="http://www.w3.org/XML/1998/namespace"/>
-    <ds:schemaRef ds:uri="http://schemas.microsoft.com/office/2006/documentManagement/types"/>
-    <ds:schemaRef ds:uri="http://schemas.openxmlformats.org/package/2006/metadata/core-properties"/>
-    <ds:schemaRef ds:uri="http://schemas.microsoft.com/office/2006/metadata/properties"/>
-    <ds:schemaRef ds:uri="http://purl.org/dc/terms/"/>
   </ds:schemaRefs>
 </ds:datastoreItem>
 </file>
@@ -5810,17 +5988,16 @@
 </file>
 
 <file path=customXml/itemProps3.xml><?xml version="1.0" encoding="utf-8"?>
-<ds:datastoreItem xmlns:ds="http://schemas.openxmlformats.org/officeDocument/2006/customXml" ds:itemID="{3128AD8D-C324-4694-A088-A063F01683D2}">
+<ds:datastoreItem xmlns:ds="http://schemas.openxmlformats.org/officeDocument/2006/customXml" ds:itemID="{BD5F8EFF-0F12-4289-B513-E298FA73B1BC}">
   <ds:schemaRefs>
-    <ds:schemaRef ds:uri="http://schemas.microsoft.com/office/2006/metadata/contentType"/>
-    <ds:schemaRef ds:uri="http://schemas.microsoft.com/office/2006/metadata/properties/metaAttributes"/>
-    <ds:schemaRef ds:uri="http://www.w3.org/2001/XMLSchema"/>
+    <ds:schemaRef ds:uri="http://purl.org/dc/dcmitype/"/>
+    <ds:schemaRef ds:uri="http://purl.org/dc/elements/1.1/"/>
+    <ds:schemaRef ds:uri="http://schemas.microsoft.com/office/infopath/2007/PartnerControls"/>
+    <ds:schemaRef ds:uri="http://www.w3.org/XML/1998/namespace"/>
+    <ds:schemaRef ds:uri="http://schemas.microsoft.com/office/2006/documentManagement/types"/>
+    <ds:schemaRef ds:uri="http://schemas.openxmlformats.org/package/2006/metadata/core-properties"/>
     <ds:schemaRef ds:uri="http://schemas.microsoft.com/office/2006/metadata/properties"/>
-    <ds:schemaRef ds:uri="http://schemas.openxmlformats.org/package/2006/metadata/core-properties"/>
-    <ds:schemaRef ds:uri="http://purl.org/dc/elements/1.1/"/>
     <ds:schemaRef ds:uri="http://purl.org/dc/terms/"/>
-    <ds:schemaRef ds:uri="http://schemas.microsoft.com/internal/obd"/>
-    <ds:schemaRef ds:uri="http://schemas.microsoft.com/office/infopath/2007/PartnerControls"/>
   </ds:schemaRefs>
 </ds:datastoreItem>
 </file>
</xml_diff>

<commit_message>
Updated example of plots.
</commit_message>
<xml_diff>
--- a/Example of Plots.pptx
+++ b/Example of Plots.pptx
@@ -278,7 +278,7 @@
           <a:p>
             <a:fld id="{ED377316-76EC-4E2D-B799-824BA439A770}" type="datetimeFigureOut">
               <a:rPr lang="en-US" smtClean="0"/>
-              <a:t>4/13/2021</a:t>
+              <a:t>4/14/2021</a:t>
             </a:fld>
             <a:endParaRPr lang="en-US"/>
           </a:p>
@@ -476,7 +476,7 @@
           <a:p>
             <a:fld id="{ED377316-76EC-4E2D-B799-824BA439A770}" type="datetimeFigureOut">
               <a:rPr lang="en-US" smtClean="0"/>
-              <a:t>4/13/2021</a:t>
+              <a:t>4/14/2021</a:t>
             </a:fld>
             <a:endParaRPr lang="en-US"/>
           </a:p>
@@ -684,7 +684,7 @@
           <a:p>
             <a:fld id="{ED377316-76EC-4E2D-B799-824BA439A770}" type="datetimeFigureOut">
               <a:rPr lang="en-US" smtClean="0"/>
-              <a:t>4/13/2021</a:t>
+              <a:t>4/14/2021</a:t>
             </a:fld>
             <a:endParaRPr lang="en-US"/>
           </a:p>
@@ -882,7 +882,7 @@
           <a:p>
             <a:fld id="{ED377316-76EC-4E2D-B799-824BA439A770}" type="datetimeFigureOut">
               <a:rPr lang="en-US" smtClean="0"/>
-              <a:t>4/13/2021</a:t>
+              <a:t>4/14/2021</a:t>
             </a:fld>
             <a:endParaRPr lang="en-US"/>
           </a:p>
@@ -1157,7 +1157,7 @@
           <a:p>
             <a:fld id="{ED377316-76EC-4E2D-B799-824BA439A770}" type="datetimeFigureOut">
               <a:rPr lang="en-US" smtClean="0"/>
-              <a:t>4/13/2021</a:t>
+              <a:t>4/14/2021</a:t>
             </a:fld>
             <a:endParaRPr lang="en-US"/>
           </a:p>
@@ -1422,7 +1422,7 @@
           <a:p>
             <a:fld id="{ED377316-76EC-4E2D-B799-824BA439A770}" type="datetimeFigureOut">
               <a:rPr lang="en-US" smtClean="0"/>
-              <a:t>4/13/2021</a:t>
+              <a:t>4/14/2021</a:t>
             </a:fld>
             <a:endParaRPr lang="en-US"/>
           </a:p>
@@ -1834,7 +1834,7 @@
           <a:p>
             <a:fld id="{ED377316-76EC-4E2D-B799-824BA439A770}" type="datetimeFigureOut">
               <a:rPr lang="en-US" smtClean="0"/>
-              <a:t>4/13/2021</a:t>
+              <a:t>4/14/2021</a:t>
             </a:fld>
             <a:endParaRPr lang="en-US"/>
           </a:p>
@@ -1975,7 +1975,7 @@
           <a:p>
             <a:fld id="{ED377316-76EC-4E2D-B799-824BA439A770}" type="datetimeFigureOut">
               <a:rPr lang="en-US" smtClean="0"/>
-              <a:t>4/13/2021</a:t>
+              <a:t>4/14/2021</a:t>
             </a:fld>
             <a:endParaRPr lang="en-US"/>
           </a:p>
@@ -2088,7 +2088,7 @@
           <a:p>
             <a:fld id="{ED377316-76EC-4E2D-B799-824BA439A770}" type="datetimeFigureOut">
               <a:rPr lang="en-US" smtClean="0"/>
-              <a:t>4/13/2021</a:t>
+              <a:t>4/14/2021</a:t>
             </a:fld>
             <a:endParaRPr lang="en-US"/>
           </a:p>
@@ -2399,7 +2399,7 @@
           <a:p>
             <a:fld id="{ED377316-76EC-4E2D-B799-824BA439A770}" type="datetimeFigureOut">
               <a:rPr lang="en-US" smtClean="0"/>
-              <a:t>4/13/2021</a:t>
+              <a:t>4/14/2021</a:t>
             </a:fld>
             <a:endParaRPr lang="en-US"/>
           </a:p>
@@ -2687,7 +2687,7 @@
           <a:p>
             <a:fld id="{ED377316-76EC-4E2D-B799-824BA439A770}" type="datetimeFigureOut">
               <a:rPr lang="en-US" smtClean="0"/>
-              <a:t>4/13/2021</a:t>
+              <a:t>4/14/2021</a:t>
             </a:fld>
             <a:endParaRPr lang="en-US"/>
           </a:p>
@@ -2928,7 +2928,7 @@
           <a:p>
             <a:fld id="{ED377316-76EC-4E2D-B799-824BA439A770}" type="datetimeFigureOut">
               <a:rPr lang="en-US" smtClean="0"/>
-              <a:t>4/13/2021</a:t>
+              <a:t>4/14/2021</a:t>
             </a:fld>
             <a:endParaRPr lang="en-US"/>
           </a:p>

</xml_diff>

<commit_message>
Added RSeQC results for genebody coverage.
</commit_message>
<xml_diff>
--- a/Example of Plots.pptx
+++ b/Example of Plots.pptx
@@ -8,12 +8,13 @@
     <p:sldId id="277" r:id="rId5"/>
     <p:sldId id="268" r:id="rId6"/>
     <p:sldId id="289" r:id="rId7"/>
-    <p:sldId id="258" r:id="rId8"/>
-    <p:sldId id="262" r:id="rId9"/>
-    <p:sldId id="279" r:id="rId10"/>
-    <p:sldId id="288" r:id="rId11"/>
-    <p:sldId id="287" r:id="rId12"/>
-    <p:sldId id="283" r:id="rId13"/>
+    <p:sldId id="290" r:id="rId8"/>
+    <p:sldId id="258" r:id="rId9"/>
+    <p:sldId id="262" r:id="rId10"/>
+    <p:sldId id="279" r:id="rId11"/>
+    <p:sldId id="288" r:id="rId12"/>
+    <p:sldId id="287" r:id="rId13"/>
+    <p:sldId id="283" r:id="rId14"/>
   </p:sldIdLst>
   <p:sldSz cx="12192000" cy="6858000"/>
   <p:notesSz cx="6858000" cy="9144000"/>
@@ -114,7 +115,7 @@
   </p:defaultTextStyle>
   <p:extLst>
     <p:ext uri="{EFAFB233-063F-42B5-8137-9DF3F51BA10A}">
-      <p15:sldGuideLst xmlns:p15="http://schemas.microsoft.com/office/powerpoint/2012/main" xmlns="">
+      <p15:sldGuideLst xmlns="" xmlns:p15="http://schemas.microsoft.com/office/powerpoint/2012/main">
         <p15:guide id="1" orient="horz" pos="2160">
           <p15:clr>
             <a:srgbClr val="A4A3A4"/>
@@ -153,7 +154,7 @@
           <p:cNvPr id="2" name="Title 1">
             <a:extLst>
               <a:ext uri="{FF2B5EF4-FFF2-40B4-BE49-F238E27FC236}">
-                <a16:creationId xmlns:a16="http://schemas.microsoft.com/office/drawing/2014/main" xmlns="" id="{A6A9EB63-D83E-4BBE-A32E-51DE95FC5140}"/>
+                <a16:creationId xmlns="" xmlns:a16="http://schemas.microsoft.com/office/drawing/2014/main" id="{A6A9EB63-D83E-4BBE-A32E-51DE95FC5140}"/>
               </a:ext>
             </a:extLst>
           </p:cNvPr>
@@ -190,7 +191,7 @@
           <p:cNvPr id="3" name="Subtitle 2">
             <a:extLst>
               <a:ext uri="{FF2B5EF4-FFF2-40B4-BE49-F238E27FC236}">
-                <a16:creationId xmlns:a16="http://schemas.microsoft.com/office/drawing/2014/main" xmlns="" id="{5FDB88B7-6B23-4EE4-840D-D0771304AF2B}"/>
+                <a16:creationId xmlns="" xmlns:a16="http://schemas.microsoft.com/office/drawing/2014/main" id="{5FDB88B7-6B23-4EE4-840D-D0771304AF2B}"/>
               </a:ext>
             </a:extLst>
           </p:cNvPr>
@@ -260,7 +261,7 @@
           <p:cNvPr id="4" name="Date Placeholder 3">
             <a:extLst>
               <a:ext uri="{FF2B5EF4-FFF2-40B4-BE49-F238E27FC236}">
-                <a16:creationId xmlns:a16="http://schemas.microsoft.com/office/drawing/2014/main" xmlns="" id="{C602DBE8-5777-420D-8763-81354F7B6008}"/>
+                <a16:creationId xmlns="" xmlns:a16="http://schemas.microsoft.com/office/drawing/2014/main" id="{C602DBE8-5777-420D-8763-81354F7B6008}"/>
               </a:ext>
             </a:extLst>
           </p:cNvPr>
@@ -289,7 +290,7 @@
           <p:cNvPr id="5" name="Footer Placeholder 4">
             <a:extLst>
               <a:ext uri="{FF2B5EF4-FFF2-40B4-BE49-F238E27FC236}">
-                <a16:creationId xmlns:a16="http://schemas.microsoft.com/office/drawing/2014/main" xmlns="" id="{5311775A-EC16-448B-A1CD-9753C624847E}"/>
+                <a16:creationId xmlns="" xmlns:a16="http://schemas.microsoft.com/office/drawing/2014/main" id="{5311775A-EC16-448B-A1CD-9753C624847E}"/>
               </a:ext>
             </a:extLst>
           </p:cNvPr>
@@ -314,7 +315,7 @@
           <p:cNvPr id="6" name="Slide Number Placeholder 5">
             <a:extLst>
               <a:ext uri="{FF2B5EF4-FFF2-40B4-BE49-F238E27FC236}">
-                <a16:creationId xmlns:a16="http://schemas.microsoft.com/office/drawing/2014/main" xmlns="" id="{90672EDC-D87B-4BCF-B801-F2EBF148B7F0}"/>
+                <a16:creationId xmlns="" xmlns:a16="http://schemas.microsoft.com/office/drawing/2014/main" id="{90672EDC-D87B-4BCF-B801-F2EBF148B7F0}"/>
               </a:ext>
             </a:extLst>
           </p:cNvPr>
@@ -373,7 +374,7 @@
           <p:cNvPr id="2" name="Title 1">
             <a:extLst>
               <a:ext uri="{FF2B5EF4-FFF2-40B4-BE49-F238E27FC236}">
-                <a16:creationId xmlns:a16="http://schemas.microsoft.com/office/drawing/2014/main" xmlns="" id="{2CEAC356-DF8B-4DB4-B4E3-A0AB03600CF2}"/>
+                <a16:creationId xmlns="" xmlns:a16="http://schemas.microsoft.com/office/drawing/2014/main" id="{2CEAC356-DF8B-4DB4-B4E3-A0AB03600CF2}"/>
               </a:ext>
             </a:extLst>
           </p:cNvPr>
@@ -401,7 +402,7 @@
           <p:cNvPr id="3" name="Vertical Text Placeholder 2">
             <a:extLst>
               <a:ext uri="{FF2B5EF4-FFF2-40B4-BE49-F238E27FC236}">
-                <a16:creationId xmlns:a16="http://schemas.microsoft.com/office/drawing/2014/main" xmlns="" id="{920DEB07-B21D-418D-AD57-E9877DE671D0}"/>
+                <a16:creationId xmlns="" xmlns:a16="http://schemas.microsoft.com/office/drawing/2014/main" id="{920DEB07-B21D-418D-AD57-E9877DE671D0}"/>
               </a:ext>
             </a:extLst>
           </p:cNvPr>
@@ -458,7 +459,7 @@
           <p:cNvPr id="4" name="Date Placeholder 3">
             <a:extLst>
               <a:ext uri="{FF2B5EF4-FFF2-40B4-BE49-F238E27FC236}">
-                <a16:creationId xmlns:a16="http://schemas.microsoft.com/office/drawing/2014/main" xmlns="" id="{31254DBB-28BD-4EF4-A444-0F1379FE3807}"/>
+                <a16:creationId xmlns="" xmlns:a16="http://schemas.microsoft.com/office/drawing/2014/main" id="{31254DBB-28BD-4EF4-A444-0F1379FE3807}"/>
               </a:ext>
             </a:extLst>
           </p:cNvPr>
@@ -487,7 +488,7 @@
           <p:cNvPr id="5" name="Footer Placeholder 4">
             <a:extLst>
               <a:ext uri="{FF2B5EF4-FFF2-40B4-BE49-F238E27FC236}">
-                <a16:creationId xmlns:a16="http://schemas.microsoft.com/office/drawing/2014/main" xmlns="" id="{54E955E4-8D70-49F8-84B3-7FA09A64D747}"/>
+                <a16:creationId xmlns="" xmlns:a16="http://schemas.microsoft.com/office/drawing/2014/main" id="{54E955E4-8D70-49F8-84B3-7FA09A64D747}"/>
               </a:ext>
             </a:extLst>
           </p:cNvPr>
@@ -512,7 +513,7 @@
           <p:cNvPr id="6" name="Slide Number Placeholder 5">
             <a:extLst>
               <a:ext uri="{FF2B5EF4-FFF2-40B4-BE49-F238E27FC236}">
-                <a16:creationId xmlns:a16="http://schemas.microsoft.com/office/drawing/2014/main" xmlns="" id="{23E937B4-C1A6-41B3-8C7F-3DB5A24E93E8}"/>
+                <a16:creationId xmlns="" xmlns:a16="http://schemas.microsoft.com/office/drawing/2014/main" id="{23E937B4-C1A6-41B3-8C7F-3DB5A24E93E8}"/>
               </a:ext>
             </a:extLst>
           </p:cNvPr>
@@ -571,7 +572,7 @@
           <p:cNvPr id="2" name="Vertical Title 1">
             <a:extLst>
               <a:ext uri="{FF2B5EF4-FFF2-40B4-BE49-F238E27FC236}">
-                <a16:creationId xmlns:a16="http://schemas.microsoft.com/office/drawing/2014/main" xmlns="" id="{10A4DA98-F63C-42D3-860B-1E34F0240C7F}"/>
+                <a16:creationId xmlns="" xmlns:a16="http://schemas.microsoft.com/office/drawing/2014/main" id="{10A4DA98-F63C-42D3-860B-1E34F0240C7F}"/>
               </a:ext>
             </a:extLst>
           </p:cNvPr>
@@ -604,7 +605,7 @@
           <p:cNvPr id="3" name="Vertical Text Placeholder 2">
             <a:extLst>
               <a:ext uri="{FF2B5EF4-FFF2-40B4-BE49-F238E27FC236}">
-                <a16:creationId xmlns:a16="http://schemas.microsoft.com/office/drawing/2014/main" xmlns="" id="{B8262034-1578-4088-BD25-EA672F0ED406}"/>
+                <a16:creationId xmlns="" xmlns:a16="http://schemas.microsoft.com/office/drawing/2014/main" id="{B8262034-1578-4088-BD25-EA672F0ED406}"/>
               </a:ext>
             </a:extLst>
           </p:cNvPr>
@@ -666,7 +667,7 @@
           <p:cNvPr id="4" name="Date Placeholder 3">
             <a:extLst>
               <a:ext uri="{FF2B5EF4-FFF2-40B4-BE49-F238E27FC236}">
-                <a16:creationId xmlns:a16="http://schemas.microsoft.com/office/drawing/2014/main" xmlns="" id="{754FB790-CE9E-4D67-8A88-BDBE6A23DB98}"/>
+                <a16:creationId xmlns="" xmlns:a16="http://schemas.microsoft.com/office/drawing/2014/main" id="{754FB790-CE9E-4D67-8A88-BDBE6A23DB98}"/>
               </a:ext>
             </a:extLst>
           </p:cNvPr>
@@ -695,7 +696,7 @@
           <p:cNvPr id="5" name="Footer Placeholder 4">
             <a:extLst>
               <a:ext uri="{FF2B5EF4-FFF2-40B4-BE49-F238E27FC236}">
-                <a16:creationId xmlns:a16="http://schemas.microsoft.com/office/drawing/2014/main" xmlns="" id="{3615FF90-C6A7-40EE-984A-B0BD216101F1}"/>
+                <a16:creationId xmlns="" xmlns:a16="http://schemas.microsoft.com/office/drawing/2014/main" id="{3615FF90-C6A7-40EE-984A-B0BD216101F1}"/>
               </a:ext>
             </a:extLst>
           </p:cNvPr>
@@ -720,7 +721,7 @@
           <p:cNvPr id="6" name="Slide Number Placeholder 5">
             <a:extLst>
               <a:ext uri="{FF2B5EF4-FFF2-40B4-BE49-F238E27FC236}">
-                <a16:creationId xmlns:a16="http://schemas.microsoft.com/office/drawing/2014/main" xmlns="" id="{2F0CF9C6-A466-4CFD-AF8E-49B9880521EF}"/>
+                <a16:creationId xmlns="" xmlns:a16="http://schemas.microsoft.com/office/drawing/2014/main" id="{2F0CF9C6-A466-4CFD-AF8E-49B9880521EF}"/>
               </a:ext>
             </a:extLst>
           </p:cNvPr>
@@ -779,7 +780,7 @@
           <p:cNvPr id="2" name="Title 1">
             <a:extLst>
               <a:ext uri="{FF2B5EF4-FFF2-40B4-BE49-F238E27FC236}">
-                <a16:creationId xmlns:a16="http://schemas.microsoft.com/office/drawing/2014/main" xmlns="" id="{F0DCE27D-3425-4B69-8EFF-040E29DBC6A9}"/>
+                <a16:creationId xmlns="" xmlns:a16="http://schemas.microsoft.com/office/drawing/2014/main" id="{F0DCE27D-3425-4B69-8EFF-040E29DBC6A9}"/>
               </a:ext>
             </a:extLst>
           </p:cNvPr>
@@ -807,7 +808,7 @@
           <p:cNvPr id="3" name="Content Placeholder 2">
             <a:extLst>
               <a:ext uri="{FF2B5EF4-FFF2-40B4-BE49-F238E27FC236}">
-                <a16:creationId xmlns:a16="http://schemas.microsoft.com/office/drawing/2014/main" xmlns="" id="{80F8839B-D0D7-42F4-BD94-D1C51A9A3EDF}"/>
+                <a16:creationId xmlns="" xmlns:a16="http://schemas.microsoft.com/office/drawing/2014/main" id="{80F8839B-D0D7-42F4-BD94-D1C51A9A3EDF}"/>
               </a:ext>
             </a:extLst>
           </p:cNvPr>
@@ -864,7 +865,7 @@
           <p:cNvPr id="4" name="Date Placeholder 3">
             <a:extLst>
               <a:ext uri="{FF2B5EF4-FFF2-40B4-BE49-F238E27FC236}">
-                <a16:creationId xmlns:a16="http://schemas.microsoft.com/office/drawing/2014/main" xmlns="" id="{4EBF3CF4-B92C-489F-B22E-CA76199DD3DD}"/>
+                <a16:creationId xmlns="" xmlns:a16="http://schemas.microsoft.com/office/drawing/2014/main" id="{4EBF3CF4-B92C-489F-B22E-CA76199DD3DD}"/>
               </a:ext>
             </a:extLst>
           </p:cNvPr>
@@ -893,7 +894,7 @@
           <p:cNvPr id="5" name="Footer Placeholder 4">
             <a:extLst>
               <a:ext uri="{FF2B5EF4-FFF2-40B4-BE49-F238E27FC236}">
-                <a16:creationId xmlns:a16="http://schemas.microsoft.com/office/drawing/2014/main" xmlns="" id="{1FE73743-E822-42DD-897B-716F9E44DC16}"/>
+                <a16:creationId xmlns="" xmlns:a16="http://schemas.microsoft.com/office/drawing/2014/main" id="{1FE73743-E822-42DD-897B-716F9E44DC16}"/>
               </a:ext>
             </a:extLst>
           </p:cNvPr>
@@ -918,7 +919,7 @@
           <p:cNvPr id="6" name="Slide Number Placeholder 5">
             <a:extLst>
               <a:ext uri="{FF2B5EF4-FFF2-40B4-BE49-F238E27FC236}">
-                <a16:creationId xmlns:a16="http://schemas.microsoft.com/office/drawing/2014/main" xmlns="" id="{42AB6D90-8E16-4335-BEAE-895207192178}"/>
+                <a16:creationId xmlns="" xmlns:a16="http://schemas.microsoft.com/office/drawing/2014/main" id="{42AB6D90-8E16-4335-BEAE-895207192178}"/>
               </a:ext>
             </a:extLst>
           </p:cNvPr>
@@ -977,7 +978,7 @@
           <p:cNvPr id="2" name="Title 1">
             <a:extLst>
               <a:ext uri="{FF2B5EF4-FFF2-40B4-BE49-F238E27FC236}">
-                <a16:creationId xmlns:a16="http://schemas.microsoft.com/office/drawing/2014/main" xmlns="" id="{B5AACE50-5F96-4C46-A5AC-81E60B9C2D81}"/>
+                <a16:creationId xmlns="" xmlns:a16="http://schemas.microsoft.com/office/drawing/2014/main" id="{B5AACE50-5F96-4C46-A5AC-81E60B9C2D81}"/>
               </a:ext>
             </a:extLst>
           </p:cNvPr>
@@ -1014,7 +1015,7 @@
           <p:cNvPr id="3" name="Text Placeholder 2">
             <a:extLst>
               <a:ext uri="{FF2B5EF4-FFF2-40B4-BE49-F238E27FC236}">
-                <a16:creationId xmlns:a16="http://schemas.microsoft.com/office/drawing/2014/main" xmlns="" id="{246BFC54-8A5B-47AB-9896-6BFA75D95D40}"/>
+                <a16:creationId xmlns="" xmlns:a16="http://schemas.microsoft.com/office/drawing/2014/main" id="{246BFC54-8A5B-47AB-9896-6BFA75D95D40}"/>
               </a:ext>
             </a:extLst>
           </p:cNvPr>
@@ -1139,7 +1140,7 @@
           <p:cNvPr id="4" name="Date Placeholder 3">
             <a:extLst>
               <a:ext uri="{FF2B5EF4-FFF2-40B4-BE49-F238E27FC236}">
-                <a16:creationId xmlns:a16="http://schemas.microsoft.com/office/drawing/2014/main" xmlns="" id="{3F5D8255-5EB8-4E15-A570-BB44F4F1B0E9}"/>
+                <a16:creationId xmlns="" xmlns:a16="http://schemas.microsoft.com/office/drawing/2014/main" id="{3F5D8255-5EB8-4E15-A570-BB44F4F1B0E9}"/>
               </a:ext>
             </a:extLst>
           </p:cNvPr>
@@ -1168,7 +1169,7 @@
           <p:cNvPr id="5" name="Footer Placeholder 4">
             <a:extLst>
               <a:ext uri="{FF2B5EF4-FFF2-40B4-BE49-F238E27FC236}">
-                <a16:creationId xmlns:a16="http://schemas.microsoft.com/office/drawing/2014/main" xmlns="" id="{ED55DE8E-E74F-47CB-BAD2-6BBC45BB838F}"/>
+                <a16:creationId xmlns="" xmlns:a16="http://schemas.microsoft.com/office/drawing/2014/main" id="{ED55DE8E-E74F-47CB-BAD2-6BBC45BB838F}"/>
               </a:ext>
             </a:extLst>
           </p:cNvPr>
@@ -1193,7 +1194,7 @@
           <p:cNvPr id="6" name="Slide Number Placeholder 5">
             <a:extLst>
               <a:ext uri="{FF2B5EF4-FFF2-40B4-BE49-F238E27FC236}">
-                <a16:creationId xmlns:a16="http://schemas.microsoft.com/office/drawing/2014/main" xmlns="" id="{729368FE-420A-46BA-86FD-189097B8097B}"/>
+                <a16:creationId xmlns="" xmlns:a16="http://schemas.microsoft.com/office/drawing/2014/main" id="{729368FE-420A-46BA-86FD-189097B8097B}"/>
               </a:ext>
             </a:extLst>
           </p:cNvPr>
@@ -1252,7 +1253,7 @@
           <p:cNvPr id="2" name="Title 1">
             <a:extLst>
               <a:ext uri="{FF2B5EF4-FFF2-40B4-BE49-F238E27FC236}">
-                <a16:creationId xmlns:a16="http://schemas.microsoft.com/office/drawing/2014/main" xmlns="" id="{ECB6CD3E-E5D8-47E1-AF0D-864BF275DE03}"/>
+                <a16:creationId xmlns="" xmlns:a16="http://schemas.microsoft.com/office/drawing/2014/main" id="{ECB6CD3E-E5D8-47E1-AF0D-864BF275DE03}"/>
               </a:ext>
             </a:extLst>
           </p:cNvPr>
@@ -1280,7 +1281,7 @@
           <p:cNvPr id="3" name="Content Placeholder 2">
             <a:extLst>
               <a:ext uri="{FF2B5EF4-FFF2-40B4-BE49-F238E27FC236}">
-                <a16:creationId xmlns:a16="http://schemas.microsoft.com/office/drawing/2014/main" xmlns="" id="{F5625D72-C62A-43A0-953C-EF5D4DE8A80D}"/>
+                <a16:creationId xmlns="" xmlns:a16="http://schemas.microsoft.com/office/drawing/2014/main" id="{F5625D72-C62A-43A0-953C-EF5D4DE8A80D}"/>
               </a:ext>
             </a:extLst>
           </p:cNvPr>
@@ -1342,7 +1343,7 @@
           <p:cNvPr id="4" name="Content Placeholder 3">
             <a:extLst>
               <a:ext uri="{FF2B5EF4-FFF2-40B4-BE49-F238E27FC236}">
-                <a16:creationId xmlns:a16="http://schemas.microsoft.com/office/drawing/2014/main" xmlns="" id="{26159A55-F831-409E-814C-0FF7B4675F03}"/>
+                <a16:creationId xmlns="" xmlns:a16="http://schemas.microsoft.com/office/drawing/2014/main" id="{26159A55-F831-409E-814C-0FF7B4675F03}"/>
               </a:ext>
             </a:extLst>
           </p:cNvPr>
@@ -1404,7 +1405,7 @@
           <p:cNvPr id="5" name="Date Placeholder 4">
             <a:extLst>
               <a:ext uri="{FF2B5EF4-FFF2-40B4-BE49-F238E27FC236}">
-                <a16:creationId xmlns:a16="http://schemas.microsoft.com/office/drawing/2014/main" xmlns="" id="{67A8054E-238C-408A-9038-7B4BAEC155E8}"/>
+                <a16:creationId xmlns="" xmlns:a16="http://schemas.microsoft.com/office/drawing/2014/main" id="{67A8054E-238C-408A-9038-7B4BAEC155E8}"/>
               </a:ext>
             </a:extLst>
           </p:cNvPr>
@@ -1433,7 +1434,7 @@
           <p:cNvPr id="6" name="Footer Placeholder 5">
             <a:extLst>
               <a:ext uri="{FF2B5EF4-FFF2-40B4-BE49-F238E27FC236}">
-                <a16:creationId xmlns:a16="http://schemas.microsoft.com/office/drawing/2014/main" xmlns="" id="{19FD3C0A-2B8E-4C2F-90D8-63E43D271C7E}"/>
+                <a16:creationId xmlns="" xmlns:a16="http://schemas.microsoft.com/office/drawing/2014/main" id="{19FD3C0A-2B8E-4C2F-90D8-63E43D271C7E}"/>
               </a:ext>
             </a:extLst>
           </p:cNvPr>
@@ -1458,7 +1459,7 @@
           <p:cNvPr id="7" name="Slide Number Placeholder 6">
             <a:extLst>
               <a:ext uri="{FF2B5EF4-FFF2-40B4-BE49-F238E27FC236}">
-                <a16:creationId xmlns:a16="http://schemas.microsoft.com/office/drawing/2014/main" xmlns="" id="{834471DE-B516-45E4-A8E9-B1F6E59E0B7A}"/>
+                <a16:creationId xmlns="" xmlns:a16="http://schemas.microsoft.com/office/drawing/2014/main" id="{834471DE-B516-45E4-A8E9-B1F6E59E0B7A}"/>
               </a:ext>
             </a:extLst>
           </p:cNvPr>
@@ -1517,7 +1518,7 @@
           <p:cNvPr id="2" name="Title 1">
             <a:extLst>
               <a:ext uri="{FF2B5EF4-FFF2-40B4-BE49-F238E27FC236}">
-                <a16:creationId xmlns:a16="http://schemas.microsoft.com/office/drawing/2014/main" xmlns="" id="{23C03818-DBC5-4587-9BC0-5126E283974F}"/>
+                <a16:creationId xmlns="" xmlns:a16="http://schemas.microsoft.com/office/drawing/2014/main" id="{23C03818-DBC5-4587-9BC0-5126E283974F}"/>
               </a:ext>
             </a:extLst>
           </p:cNvPr>
@@ -1550,7 +1551,7 @@
           <p:cNvPr id="3" name="Text Placeholder 2">
             <a:extLst>
               <a:ext uri="{FF2B5EF4-FFF2-40B4-BE49-F238E27FC236}">
-                <a16:creationId xmlns:a16="http://schemas.microsoft.com/office/drawing/2014/main" xmlns="" id="{6A72DF4B-7260-448B-9048-413E4EF9882E}"/>
+                <a16:creationId xmlns="" xmlns:a16="http://schemas.microsoft.com/office/drawing/2014/main" id="{6A72DF4B-7260-448B-9048-413E4EF9882E}"/>
               </a:ext>
             </a:extLst>
           </p:cNvPr>
@@ -1621,7 +1622,7 @@
           <p:cNvPr id="4" name="Content Placeholder 3">
             <a:extLst>
               <a:ext uri="{FF2B5EF4-FFF2-40B4-BE49-F238E27FC236}">
-                <a16:creationId xmlns:a16="http://schemas.microsoft.com/office/drawing/2014/main" xmlns="" id="{1E7A18BF-58B1-4636-9E50-90DD7162ED91}"/>
+                <a16:creationId xmlns="" xmlns:a16="http://schemas.microsoft.com/office/drawing/2014/main" id="{1E7A18BF-58B1-4636-9E50-90DD7162ED91}"/>
               </a:ext>
             </a:extLst>
           </p:cNvPr>
@@ -1683,7 +1684,7 @@
           <p:cNvPr id="5" name="Text Placeholder 4">
             <a:extLst>
               <a:ext uri="{FF2B5EF4-FFF2-40B4-BE49-F238E27FC236}">
-                <a16:creationId xmlns:a16="http://schemas.microsoft.com/office/drawing/2014/main" xmlns="" id="{F30D738C-3AD0-44D1-A772-7F35A6DCB164}"/>
+                <a16:creationId xmlns="" xmlns:a16="http://schemas.microsoft.com/office/drawing/2014/main" id="{F30D738C-3AD0-44D1-A772-7F35A6DCB164}"/>
               </a:ext>
             </a:extLst>
           </p:cNvPr>
@@ -1754,7 +1755,7 @@
           <p:cNvPr id="6" name="Content Placeholder 5">
             <a:extLst>
               <a:ext uri="{FF2B5EF4-FFF2-40B4-BE49-F238E27FC236}">
-                <a16:creationId xmlns:a16="http://schemas.microsoft.com/office/drawing/2014/main" xmlns="" id="{F095DB52-63A5-4196-8067-9E9B0D16FE84}"/>
+                <a16:creationId xmlns="" xmlns:a16="http://schemas.microsoft.com/office/drawing/2014/main" id="{F095DB52-63A5-4196-8067-9E9B0D16FE84}"/>
               </a:ext>
             </a:extLst>
           </p:cNvPr>
@@ -1816,7 +1817,7 @@
           <p:cNvPr id="7" name="Date Placeholder 6">
             <a:extLst>
               <a:ext uri="{FF2B5EF4-FFF2-40B4-BE49-F238E27FC236}">
-                <a16:creationId xmlns:a16="http://schemas.microsoft.com/office/drawing/2014/main" xmlns="" id="{086BC6DC-7C74-40E4-8B89-F4FA730A24C1}"/>
+                <a16:creationId xmlns="" xmlns:a16="http://schemas.microsoft.com/office/drawing/2014/main" id="{086BC6DC-7C74-40E4-8B89-F4FA730A24C1}"/>
               </a:ext>
             </a:extLst>
           </p:cNvPr>
@@ -1845,7 +1846,7 @@
           <p:cNvPr id="8" name="Footer Placeholder 7">
             <a:extLst>
               <a:ext uri="{FF2B5EF4-FFF2-40B4-BE49-F238E27FC236}">
-                <a16:creationId xmlns:a16="http://schemas.microsoft.com/office/drawing/2014/main" xmlns="" id="{03C8E4CA-47BC-42B7-AF0C-B2455E07D71F}"/>
+                <a16:creationId xmlns="" xmlns:a16="http://schemas.microsoft.com/office/drawing/2014/main" id="{03C8E4CA-47BC-42B7-AF0C-B2455E07D71F}"/>
               </a:ext>
             </a:extLst>
           </p:cNvPr>
@@ -1870,7 +1871,7 @@
           <p:cNvPr id="9" name="Slide Number Placeholder 8">
             <a:extLst>
               <a:ext uri="{FF2B5EF4-FFF2-40B4-BE49-F238E27FC236}">
-                <a16:creationId xmlns:a16="http://schemas.microsoft.com/office/drawing/2014/main" xmlns="" id="{640CD4AC-B513-41ED-8047-51722D10EC70}"/>
+                <a16:creationId xmlns="" xmlns:a16="http://schemas.microsoft.com/office/drawing/2014/main" id="{640CD4AC-B513-41ED-8047-51722D10EC70}"/>
               </a:ext>
             </a:extLst>
           </p:cNvPr>
@@ -1929,7 +1930,7 @@
           <p:cNvPr id="2" name="Title 1">
             <a:extLst>
               <a:ext uri="{FF2B5EF4-FFF2-40B4-BE49-F238E27FC236}">
-                <a16:creationId xmlns:a16="http://schemas.microsoft.com/office/drawing/2014/main" xmlns="" id="{08FF5E3F-3FC3-49F8-ADB1-F0A571B09957}"/>
+                <a16:creationId xmlns="" xmlns:a16="http://schemas.microsoft.com/office/drawing/2014/main" id="{08FF5E3F-3FC3-49F8-ADB1-F0A571B09957}"/>
               </a:ext>
             </a:extLst>
           </p:cNvPr>
@@ -1957,7 +1958,7 @@
           <p:cNvPr id="3" name="Date Placeholder 2">
             <a:extLst>
               <a:ext uri="{FF2B5EF4-FFF2-40B4-BE49-F238E27FC236}">
-                <a16:creationId xmlns:a16="http://schemas.microsoft.com/office/drawing/2014/main" xmlns="" id="{BE162ABE-9627-48FC-BACD-4D7D6F0E3B1B}"/>
+                <a16:creationId xmlns="" xmlns:a16="http://schemas.microsoft.com/office/drawing/2014/main" id="{BE162ABE-9627-48FC-BACD-4D7D6F0E3B1B}"/>
               </a:ext>
             </a:extLst>
           </p:cNvPr>
@@ -1986,7 +1987,7 @@
           <p:cNvPr id="4" name="Footer Placeholder 3">
             <a:extLst>
               <a:ext uri="{FF2B5EF4-FFF2-40B4-BE49-F238E27FC236}">
-                <a16:creationId xmlns:a16="http://schemas.microsoft.com/office/drawing/2014/main" xmlns="" id="{B75D0162-EA0D-444E-A0DA-228314AA3C05}"/>
+                <a16:creationId xmlns="" xmlns:a16="http://schemas.microsoft.com/office/drawing/2014/main" id="{B75D0162-EA0D-444E-A0DA-228314AA3C05}"/>
               </a:ext>
             </a:extLst>
           </p:cNvPr>
@@ -2011,7 +2012,7 @@
           <p:cNvPr id="5" name="Slide Number Placeholder 4">
             <a:extLst>
               <a:ext uri="{FF2B5EF4-FFF2-40B4-BE49-F238E27FC236}">
-                <a16:creationId xmlns:a16="http://schemas.microsoft.com/office/drawing/2014/main" xmlns="" id="{F1161FB8-E235-434C-ABDE-32E6FB652CDF}"/>
+                <a16:creationId xmlns="" xmlns:a16="http://schemas.microsoft.com/office/drawing/2014/main" id="{F1161FB8-E235-434C-ABDE-32E6FB652CDF}"/>
               </a:ext>
             </a:extLst>
           </p:cNvPr>
@@ -2070,7 +2071,7 @@
           <p:cNvPr id="2" name="Date Placeholder 1">
             <a:extLst>
               <a:ext uri="{FF2B5EF4-FFF2-40B4-BE49-F238E27FC236}">
-                <a16:creationId xmlns:a16="http://schemas.microsoft.com/office/drawing/2014/main" xmlns="" id="{89602BF0-7BAB-442F-A174-62D25C2C1EB9}"/>
+                <a16:creationId xmlns="" xmlns:a16="http://schemas.microsoft.com/office/drawing/2014/main" id="{89602BF0-7BAB-442F-A174-62D25C2C1EB9}"/>
               </a:ext>
             </a:extLst>
           </p:cNvPr>
@@ -2099,7 +2100,7 @@
           <p:cNvPr id="3" name="Footer Placeholder 2">
             <a:extLst>
               <a:ext uri="{FF2B5EF4-FFF2-40B4-BE49-F238E27FC236}">
-                <a16:creationId xmlns:a16="http://schemas.microsoft.com/office/drawing/2014/main" xmlns="" id="{B87CBF20-9C8B-4234-B565-BB06142FC820}"/>
+                <a16:creationId xmlns="" xmlns:a16="http://schemas.microsoft.com/office/drawing/2014/main" id="{B87CBF20-9C8B-4234-B565-BB06142FC820}"/>
               </a:ext>
             </a:extLst>
           </p:cNvPr>
@@ -2124,7 +2125,7 @@
           <p:cNvPr id="4" name="Slide Number Placeholder 3">
             <a:extLst>
               <a:ext uri="{FF2B5EF4-FFF2-40B4-BE49-F238E27FC236}">
-                <a16:creationId xmlns:a16="http://schemas.microsoft.com/office/drawing/2014/main" xmlns="" id="{C6DC3AE3-E2F4-4B0A-A5D5-12EE299CAD17}"/>
+                <a16:creationId xmlns="" xmlns:a16="http://schemas.microsoft.com/office/drawing/2014/main" id="{C6DC3AE3-E2F4-4B0A-A5D5-12EE299CAD17}"/>
               </a:ext>
             </a:extLst>
           </p:cNvPr>
@@ -2183,7 +2184,7 @@
           <p:cNvPr id="2" name="Title 1">
             <a:extLst>
               <a:ext uri="{FF2B5EF4-FFF2-40B4-BE49-F238E27FC236}">
-                <a16:creationId xmlns:a16="http://schemas.microsoft.com/office/drawing/2014/main" xmlns="" id="{3FC7E2A9-6F13-48E8-A782-AB2B324288FF}"/>
+                <a16:creationId xmlns="" xmlns:a16="http://schemas.microsoft.com/office/drawing/2014/main" id="{3FC7E2A9-6F13-48E8-A782-AB2B324288FF}"/>
               </a:ext>
             </a:extLst>
           </p:cNvPr>
@@ -2220,7 +2221,7 @@
           <p:cNvPr id="3" name="Content Placeholder 2">
             <a:extLst>
               <a:ext uri="{FF2B5EF4-FFF2-40B4-BE49-F238E27FC236}">
-                <a16:creationId xmlns:a16="http://schemas.microsoft.com/office/drawing/2014/main" xmlns="" id="{93984EED-7161-45A9-A51E-3423EFEF5F71}"/>
+                <a16:creationId xmlns="" xmlns:a16="http://schemas.microsoft.com/office/drawing/2014/main" id="{93984EED-7161-45A9-A51E-3423EFEF5F71}"/>
               </a:ext>
             </a:extLst>
           </p:cNvPr>
@@ -2310,7 +2311,7 @@
           <p:cNvPr id="4" name="Text Placeholder 3">
             <a:extLst>
               <a:ext uri="{FF2B5EF4-FFF2-40B4-BE49-F238E27FC236}">
-                <a16:creationId xmlns:a16="http://schemas.microsoft.com/office/drawing/2014/main" xmlns="" id="{BC6F5B20-744F-4EB2-B2B4-9DC19289542D}"/>
+                <a16:creationId xmlns="" xmlns:a16="http://schemas.microsoft.com/office/drawing/2014/main" id="{BC6F5B20-744F-4EB2-B2B4-9DC19289542D}"/>
               </a:ext>
             </a:extLst>
           </p:cNvPr>
@@ -2381,7 +2382,7 @@
           <p:cNvPr id="5" name="Date Placeholder 4">
             <a:extLst>
               <a:ext uri="{FF2B5EF4-FFF2-40B4-BE49-F238E27FC236}">
-                <a16:creationId xmlns:a16="http://schemas.microsoft.com/office/drawing/2014/main" xmlns="" id="{8A3096BC-BD0E-4F6A-9F39-E75397836BBA}"/>
+                <a16:creationId xmlns="" xmlns:a16="http://schemas.microsoft.com/office/drawing/2014/main" id="{8A3096BC-BD0E-4F6A-9F39-E75397836BBA}"/>
               </a:ext>
             </a:extLst>
           </p:cNvPr>
@@ -2410,7 +2411,7 @@
           <p:cNvPr id="6" name="Footer Placeholder 5">
             <a:extLst>
               <a:ext uri="{FF2B5EF4-FFF2-40B4-BE49-F238E27FC236}">
-                <a16:creationId xmlns:a16="http://schemas.microsoft.com/office/drawing/2014/main" xmlns="" id="{0C250EE9-43CF-4E92-8432-CA6F914BD82E}"/>
+                <a16:creationId xmlns="" xmlns:a16="http://schemas.microsoft.com/office/drawing/2014/main" id="{0C250EE9-43CF-4E92-8432-CA6F914BD82E}"/>
               </a:ext>
             </a:extLst>
           </p:cNvPr>
@@ -2435,7 +2436,7 @@
           <p:cNvPr id="7" name="Slide Number Placeholder 6">
             <a:extLst>
               <a:ext uri="{FF2B5EF4-FFF2-40B4-BE49-F238E27FC236}">
-                <a16:creationId xmlns:a16="http://schemas.microsoft.com/office/drawing/2014/main" xmlns="" id="{D823C52A-C822-4645-85E8-9DA69C11EAAE}"/>
+                <a16:creationId xmlns="" xmlns:a16="http://schemas.microsoft.com/office/drawing/2014/main" id="{D823C52A-C822-4645-85E8-9DA69C11EAAE}"/>
               </a:ext>
             </a:extLst>
           </p:cNvPr>
@@ -2494,7 +2495,7 @@
           <p:cNvPr id="2" name="Title 1">
             <a:extLst>
               <a:ext uri="{FF2B5EF4-FFF2-40B4-BE49-F238E27FC236}">
-                <a16:creationId xmlns:a16="http://schemas.microsoft.com/office/drawing/2014/main" xmlns="" id="{3F7ABF7B-5329-47A6-9F06-D2F2D4D6C583}"/>
+                <a16:creationId xmlns="" xmlns:a16="http://schemas.microsoft.com/office/drawing/2014/main" id="{3F7ABF7B-5329-47A6-9F06-D2F2D4D6C583}"/>
               </a:ext>
             </a:extLst>
           </p:cNvPr>
@@ -2531,7 +2532,7 @@
           <p:cNvPr id="3" name="Picture Placeholder 2">
             <a:extLst>
               <a:ext uri="{FF2B5EF4-FFF2-40B4-BE49-F238E27FC236}">
-                <a16:creationId xmlns:a16="http://schemas.microsoft.com/office/drawing/2014/main" xmlns="" id="{8DDC1893-4416-4A4E-BDEF-6B4593743370}"/>
+                <a16:creationId xmlns="" xmlns:a16="http://schemas.microsoft.com/office/drawing/2014/main" id="{8DDC1893-4416-4A4E-BDEF-6B4593743370}"/>
               </a:ext>
             </a:extLst>
           </p:cNvPr>
@@ -2598,7 +2599,7 @@
           <p:cNvPr id="4" name="Text Placeholder 3">
             <a:extLst>
               <a:ext uri="{FF2B5EF4-FFF2-40B4-BE49-F238E27FC236}">
-                <a16:creationId xmlns:a16="http://schemas.microsoft.com/office/drawing/2014/main" xmlns="" id="{CCBE743D-BB5F-4443-B95D-9BE0916595C4}"/>
+                <a16:creationId xmlns="" xmlns:a16="http://schemas.microsoft.com/office/drawing/2014/main" id="{CCBE743D-BB5F-4443-B95D-9BE0916595C4}"/>
               </a:ext>
             </a:extLst>
           </p:cNvPr>
@@ -2669,7 +2670,7 @@
           <p:cNvPr id="5" name="Date Placeholder 4">
             <a:extLst>
               <a:ext uri="{FF2B5EF4-FFF2-40B4-BE49-F238E27FC236}">
-                <a16:creationId xmlns:a16="http://schemas.microsoft.com/office/drawing/2014/main" xmlns="" id="{BDB3D12F-958D-4B54-BB0D-397BD4BC8932}"/>
+                <a16:creationId xmlns="" xmlns:a16="http://schemas.microsoft.com/office/drawing/2014/main" id="{BDB3D12F-958D-4B54-BB0D-397BD4BC8932}"/>
               </a:ext>
             </a:extLst>
           </p:cNvPr>
@@ -2698,7 +2699,7 @@
           <p:cNvPr id="6" name="Footer Placeholder 5">
             <a:extLst>
               <a:ext uri="{FF2B5EF4-FFF2-40B4-BE49-F238E27FC236}">
-                <a16:creationId xmlns:a16="http://schemas.microsoft.com/office/drawing/2014/main" xmlns="" id="{06608404-954D-423E-BE89-4D6D4C164F0E}"/>
+                <a16:creationId xmlns="" xmlns:a16="http://schemas.microsoft.com/office/drawing/2014/main" id="{06608404-954D-423E-BE89-4D6D4C164F0E}"/>
               </a:ext>
             </a:extLst>
           </p:cNvPr>
@@ -2723,7 +2724,7 @@
           <p:cNvPr id="7" name="Slide Number Placeholder 6">
             <a:extLst>
               <a:ext uri="{FF2B5EF4-FFF2-40B4-BE49-F238E27FC236}">
-                <a16:creationId xmlns:a16="http://schemas.microsoft.com/office/drawing/2014/main" xmlns="" id="{1961DE06-9774-44B9-A203-1234E4B912B3}"/>
+                <a16:creationId xmlns="" xmlns:a16="http://schemas.microsoft.com/office/drawing/2014/main" id="{1961DE06-9774-44B9-A203-1234E4B912B3}"/>
               </a:ext>
             </a:extLst>
           </p:cNvPr>
@@ -2787,7 +2788,7 @@
           <p:cNvPr id="2" name="Title Placeholder 1">
             <a:extLst>
               <a:ext uri="{FF2B5EF4-FFF2-40B4-BE49-F238E27FC236}">
-                <a16:creationId xmlns:a16="http://schemas.microsoft.com/office/drawing/2014/main" xmlns="" id="{0361FDD2-72C4-4390-BADA-F61AA6A0F9EE}"/>
+                <a16:creationId xmlns="" xmlns:a16="http://schemas.microsoft.com/office/drawing/2014/main" id="{0361FDD2-72C4-4390-BADA-F61AA6A0F9EE}"/>
               </a:ext>
             </a:extLst>
           </p:cNvPr>
@@ -2825,7 +2826,7 @@
           <p:cNvPr id="3" name="Text Placeholder 2">
             <a:extLst>
               <a:ext uri="{FF2B5EF4-FFF2-40B4-BE49-F238E27FC236}">
-                <a16:creationId xmlns:a16="http://schemas.microsoft.com/office/drawing/2014/main" xmlns="" id="{28636996-A2F8-430A-AE6D-7F0ACE7D4BC5}"/>
+                <a16:creationId xmlns="" xmlns:a16="http://schemas.microsoft.com/office/drawing/2014/main" id="{28636996-A2F8-430A-AE6D-7F0ACE7D4BC5}"/>
               </a:ext>
             </a:extLst>
           </p:cNvPr>
@@ -2892,7 +2893,7 @@
           <p:cNvPr id="4" name="Date Placeholder 3">
             <a:extLst>
               <a:ext uri="{FF2B5EF4-FFF2-40B4-BE49-F238E27FC236}">
-                <a16:creationId xmlns:a16="http://schemas.microsoft.com/office/drawing/2014/main" xmlns="" id="{8882BD3D-2AC2-4F5A-8F45-63C71B296678}"/>
+                <a16:creationId xmlns="" xmlns:a16="http://schemas.microsoft.com/office/drawing/2014/main" id="{8882BD3D-2AC2-4F5A-8F45-63C71B296678}"/>
               </a:ext>
             </a:extLst>
           </p:cNvPr>
@@ -2939,7 +2940,7 @@
           <p:cNvPr id="5" name="Footer Placeholder 4">
             <a:extLst>
               <a:ext uri="{FF2B5EF4-FFF2-40B4-BE49-F238E27FC236}">
-                <a16:creationId xmlns:a16="http://schemas.microsoft.com/office/drawing/2014/main" xmlns="" id="{2BD4C1E0-F79E-4E05-B1F3-ADD397770940}"/>
+                <a16:creationId xmlns="" xmlns:a16="http://schemas.microsoft.com/office/drawing/2014/main" id="{2BD4C1E0-F79E-4E05-B1F3-ADD397770940}"/>
               </a:ext>
             </a:extLst>
           </p:cNvPr>
@@ -2982,7 +2983,7 @@
           <p:cNvPr id="6" name="Slide Number Placeholder 5">
             <a:extLst>
               <a:ext uri="{FF2B5EF4-FFF2-40B4-BE49-F238E27FC236}">
-                <a16:creationId xmlns:a16="http://schemas.microsoft.com/office/drawing/2014/main" xmlns="" id="{B8D5AA69-2CFE-4E90-BB18-13D5FD069C12}"/>
+                <a16:creationId xmlns="" xmlns:a16="http://schemas.microsoft.com/office/drawing/2014/main" id="{B8D5AA69-2CFE-4E90-BB18-13D5FD069C12}"/>
               </a:ext>
             </a:extLst>
           </p:cNvPr>
@@ -3350,7 +3351,7 @@
           <p:cNvPr id="13" name="Rectangle: Rounded Corners 12">
             <a:extLst>
               <a:ext uri="{FF2B5EF4-FFF2-40B4-BE49-F238E27FC236}">
-                <a16:creationId xmlns:a16="http://schemas.microsoft.com/office/drawing/2014/main" xmlns="" id="{28D44336-B5FE-44FD-8560-3905EA48C0DE}"/>
+                <a16:creationId xmlns="" xmlns:a16="http://schemas.microsoft.com/office/drawing/2014/main" id="{28D44336-B5FE-44FD-8560-3905EA48C0DE}"/>
               </a:ext>
             </a:extLst>
           </p:cNvPr>
@@ -3406,7 +3407,7 @@
           <p:cNvPr id="14" name="Rectangle: Rounded Corners 13">
             <a:extLst>
               <a:ext uri="{FF2B5EF4-FFF2-40B4-BE49-F238E27FC236}">
-                <a16:creationId xmlns:a16="http://schemas.microsoft.com/office/drawing/2014/main" xmlns="" id="{B7198503-333C-47E7-98AB-6CA43F09F73F}"/>
+                <a16:creationId xmlns="" xmlns:a16="http://schemas.microsoft.com/office/drawing/2014/main" id="{B7198503-333C-47E7-98AB-6CA43F09F73F}"/>
               </a:ext>
             </a:extLst>
           </p:cNvPr>
@@ -3462,7 +3463,7 @@
           <p:cNvPr id="16" name="Rectangle: Rounded Corners 15">
             <a:extLst>
               <a:ext uri="{FF2B5EF4-FFF2-40B4-BE49-F238E27FC236}">
-                <a16:creationId xmlns:a16="http://schemas.microsoft.com/office/drawing/2014/main" xmlns="" id="{7701E885-D45D-47AB-9DA9-23CE1EE8B814}"/>
+                <a16:creationId xmlns="" xmlns:a16="http://schemas.microsoft.com/office/drawing/2014/main" id="{7701E885-D45D-47AB-9DA9-23CE1EE8B814}"/>
               </a:ext>
             </a:extLst>
           </p:cNvPr>
@@ -3526,7 +3527,7 @@
           <p:cNvPr id="18" name="Rectangle: Rounded Corners 17">
             <a:extLst>
               <a:ext uri="{FF2B5EF4-FFF2-40B4-BE49-F238E27FC236}">
-                <a16:creationId xmlns:a16="http://schemas.microsoft.com/office/drawing/2014/main" xmlns="" id="{E5ACE4CB-EC79-400E-A917-7075DEF9244F}"/>
+                <a16:creationId xmlns="" xmlns:a16="http://schemas.microsoft.com/office/drawing/2014/main" id="{E5ACE4CB-EC79-400E-A917-7075DEF9244F}"/>
               </a:ext>
             </a:extLst>
           </p:cNvPr>
@@ -3582,7 +3583,7 @@
           <p:cNvPr id="19" name="Arrow: Down 18">
             <a:extLst>
               <a:ext uri="{FF2B5EF4-FFF2-40B4-BE49-F238E27FC236}">
-                <a16:creationId xmlns:a16="http://schemas.microsoft.com/office/drawing/2014/main" xmlns="" id="{21A0870A-627A-4B5D-8014-DB3B11428DD4}"/>
+                <a16:creationId xmlns="" xmlns:a16="http://schemas.microsoft.com/office/drawing/2014/main" id="{21A0870A-627A-4B5D-8014-DB3B11428DD4}"/>
               </a:ext>
             </a:extLst>
           </p:cNvPr>
@@ -3628,7 +3629,7 @@
           <p:cNvPr id="21" name="Arrow: Down 20">
             <a:extLst>
               <a:ext uri="{FF2B5EF4-FFF2-40B4-BE49-F238E27FC236}">
-                <a16:creationId xmlns:a16="http://schemas.microsoft.com/office/drawing/2014/main" xmlns="" id="{6E0316CB-4D4B-4BE9-B31C-42EFD7DAEAF0}"/>
+                <a16:creationId xmlns="" xmlns:a16="http://schemas.microsoft.com/office/drawing/2014/main" id="{6E0316CB-4D4B-4BE9-B31C-42EFD7DAEAF0}"/>
               </a:ext>
             </a:extLst>
           </p:cNvPr>
@@ -3674,7 +3675,7 @@
           <p:cNvPr id="23" name="Arrow: Down 22">
             <a:extLst>
               <a:ext uri="{FF2B5EF4-FFF2-40B4-BE49-F238E27FC236}">
-                <a16:creationId xmlns:a16="http://schemas.microsoft.com/office/drawing/2014/main" xmlns="" id="{C73F7F9C-172E-4142-B646-FC46DC5E23A5}"/>
+                <a16:creationId xmlns="" xmlns:a16="http://schemas.microsoft.com/office/drawing/2014/main" id="{C73F7F9C-172E-4142-B646-FC46DC5E23A5}"/>
               </a:ext>
             </a:extLst>
           </p:cNvPr>
@@ -3720,7 +3721,7 @@
           <p:cNvPr id="24" name="Rectangle: Rounded Corners 23">
             <a:extLst>
               <a:ext uri="{FF2B5EF4-FFF2-40B4-BE49-F238E27FC236}">
-                <a16:creationId xmlns:a16="http://schemas.microsoft.com/office/drawing/2014/main" xmlns="" id="{64DF43C6-F06C-4F77-9DA7-C500E96206D7}"/>
+                <a16:creationId xmlns="" xmlns:a16="http://schemas.microsoft.com/office/drawing/2014/main" id="{64DF43C6-F06C-4F77-9DA7-C500E96206D7}"/>
               </a:ext>
             </a:extLst>
           </p:cNvPr>
@@ -3776,7 +3777,7 @@
           <p:cNvPr id="25" name="Arrow: Right 24">
             <a:extLst>
               <a:ext uri="{FF2B5EF4-FFF2-40B4-BE49-F238E27FC236}">
-                <a16:creationId xmlns:a16="http://schemas.microsoft.com/office/drawing/2014/main" xmlns="" id="{48D03535-D2F4-479A-97F6-2664A40E051B}"/>
+                <a16:creationId xmlns="" xmlns:a16="http://schemas.microsoft.com/office/drawing/2014/main" id="{48D03535-D2F4-479A-97F6-2664A40E051B}"/>
               </a:ext>
             </a:extLst>
           </p:cNvPr>
@@ -3822,7 +3823,7 @@
           <p:cNvPr id="26" name="Arrow: Right 25">
             <a:extLst>
               <a:ext uri="{FF2B5EF4-FFF2-40B4-BE49-F238E27FC236}">
-                <a16:creationId xmlns:a16="http://schemas.microsoft.com/office/drawing/2014/main" xmlns="" id="{99814D6A-E535-43B2-A6F0-D0C17373064F}"/>
+                <a16:creationId xmlns="" xmlns:a16="http://schemas.microsoft.com/office/drawing/2014/main" id="{99814D6A-E535-43B2-A6F0-D0C17373064F}"/>
               </a:ext>
             </a:extLst>
           </p:cNvPr>
@@ -3868,7 +3869,7 @@
           <p:cNvPr id="27" name="Rectangle: Rounded Corners 26">
             <a:extLst>
               <a:ext uri="{FF2B5EF4-FFF2-40B4-BE49-F238E27FC236}">
-                <a16:creationId xmlns:a16="http://schemas.microsoft.com/office/drawing/2014/main" xmlns="" id="{2839C589-4E66-477F-A2E9-D7ABF3A4E53A}"/>
+                <a16:creationId xmlns="" xmlns:a16="http://schemas.microsoft.com/office/drawing/2014/main" id="{2839C589-4E66-477F-A2E9-D7ABF3A4E53A}"/>
               </a:ext>
             </a:extLst>
           </p:cNvPr>
@@ -3924,7 +3925,7 @@
           <p:cNvPr id="28" name="Arrow: Right 27">
             <a:extLst>
               <a:ext uri="{FF2B5EF4-FFF2-40B4-BE49-F238E27FC236}">
-                <a16:creationId xmlns:a16="http://schemas.microsoft.com/office/drawing/2014/main" xmlns="" id="{C05564E2-4444-4FED-A460-A891B7804AFD}"/>
+                <a16:creationId xmlns="" xmlns:a16="http://schemas.microsoft.com/office/drawing/2014/main" id="{C05564E2-4444-4FED-A460-A891B7804AFD}"/>
               </a:ext>
             </a:extLst>
           </p:cNvPr>
@@ -3970,7 +3971,7 @@
           <p:cNvPr id="29" name="Rectangle: Rounded Corners 28">
             <a:extLst>
               <a:ext uri="{FF2B5EF4-FFF2-40B4-BE49-F238E27FC236}">
-                <a16:creationId xmlns:a16="http://schemas.microsoft.com/office/drawing/2014/main" xmlns="" id="{F11CF14C-80D8-4321-B1E1-A99616084090}"/>
+                <a16:creationId xmlns="" xmlns:a16="http://schemas.microsoft.com/office/drawing/2014/main" id="{F11CF14C-80D8-4321-B1E1-A99616084090}"/>
               </a:ext>
             </a:extLst>
           </p:cNvPr>
@@ -4042,7 +4043,7 @@
           <p:cNvPr id="30" name="Arrow: Right 29">
             <a:extLst>
               <a:ext uri="{FF2B5EF4-FFF2-40B4-BE49-F238E27FC236}">
-                <a16:creationId xmlns:a16="http://schemas.microsoft.com/office/drawing/2014/main" xmlns="" id="{EE59FEE5-37FD-41B2-8EC3-62FF1B1CD6BB}"/>
+                <a16:creationId xmlns="" xmlns:a16="http://schemas.microsoft.com/office/drawing/2014/main" id="{EE59FEE5-37FD-41B2-8EC3-62FF1B1CD6BB}"/>
               </a:ext>
             </a:extLst>
           </p:cNvPr>
@@ -4088,7 +4089,7 @@
           <p:cNvPr id="35" name="Rectangle: Rounded Corners 34">
             <a:extLst>
               <a:ext uri="{FF2B5EF4-FFF2-40B4-BE49-F238E27FC236}">
-                <a16:creationId xmlns:a16="http://schemas.microsoft.com/office/drawing/2014/main" xmlns="" id="{C9B274AC-2466-452C-AD33-C083A012279D}"/>
+                <a16:creationId xmlns="" xmlns:a16="http://schemas.microsoft.com/office/drawing/2014/main" id="{C9B274AC-2466-452C-AD33-C083A012279D}"/>
               </a:ext>
             </a:extLst>
           </p:cNvPr>
@@ -4149,7 +4150,7 @@
           <p:cNvPr id="36" name="Arrow: Down 35">
             <a:extLst>
               <a:ext uri="{FF2B5EF4-FFF2-40B4-BE49-F238E27FC236}">
-                <a16:creationId xmlns:a16="http://schemas.microsoft.com/office/drawing/2014/main" xmlns="" id="{7379D9AD-6007-4CFB-AF65-9D6198B323A9}"/>
+                <a16:creationId xmlns="" xmlns:a16="http://schemas.microsoft.com/office/drawing/2014/main" id="{7379D9AD-6007-4CFB-AF65-9D6198B323A9}"/>
               </a:ext>
             </a:extLst>
           </p:cNvPr>
@@ -4195,7 +4196,7 @@
           <p:cNvPr id="40" name="Title 1">
             <a:extLst>
               <a:ext uri="{FF2B5EF4-FFF2-40B4-BE49-F238E27FC236}">
-                <a16:creationId xmlns:a16="http://schemas.microsoft.com/office/drawing/2014/main" xmlns="" id="{398E1561-8AF0-4FC7-A6FC-E7B0088A35D0}"/>
+                <a16:creationId xmlns="" xmlns:a16="http://schemas.microsoft.com/office/drawing/2014/main" id="{398E1561-8AF0-4FC7-A6FC-E7B0088A35D0}"/>
               </a:ext>
             </a:extLst>
           </p:cNvPr>
@@ -4240,6 +4241,131 @@
     <p:extLst>
       <p:ext uri="{BB962C8B-B14F-4D97-AF65-F5344CB8AC3E}">
         <p14:creationId xmlns:p14="http://schemas.microsoft.com/office/powerpoint/2010/main" val="1039408565"/>
+      </p:ext>
+    </p:extLst>
+  </p:cSld>
+  <p:clrMapOvr>
+    <a:masterClrMapping/>
+  </p:clrMapOvr>
+</p:sld>
+</file>
+
+<file path=ppt/slides/slide10.xml><?xml version="1.0" encoding="utf-8"?>
+<p:sld xmlns:a="http://schemas.openxmlformats.org/drawingml/2006/main" xmlns:r="http://schemas.openxmlformats.org/officeDocument/2006/relationships" xmlns:p="http://schemas.openxmlformats.org/presentationml/2006/main">
+  <p:cSld>
+    <p:spTree>
+      <p:nvGrpSpPr>
+        <p:cNvPr id="1" name=""/>
+        <p:cNvGrpSpPr/>
+        <p:nvPr/>
+      </p:nvGrpSpPr>
+      <p:grpSpPr>
+        <a:xfrm>
+          <a:off x="0" y="0"/>
+          <a:ext cx="0" cy="0"/>
+          <a:chOff x="0" y="0"/>
+          <a:chExt cx="0" cy="0"/>
+        </a:xfrm>
+      </p:grpSpPr>
+      <p:sp>
+        <p:nvSpPr>
+          <p:cNvPr id="5" name="Title 1">
+            <a:extLst>
+              <a:ext uri="{FF2B5EF4-FFF2-40B4-BE49-F238E27FC236}">
+                <a16:creationId xmlns="" xmlns:a16="http://schemas.microsoft.com/office/drawing/2014/main" id="{4EA3CB9E-619E-4288-9D33-73290203AB4F}"/>
+              </a:ext>
+            </a:extLst>
+          </p:cNvPr>
+          <p:cNvSpPr>
+            <a:spLocks noGrp="1"/>
+          </p:cNvSpPr>
+          <p:nvPr>
+            <p:ph type="title"/>
+          </p:nvPr>
+        </p:nvSpPr>
+        <p:spPr>
+          <a:xfrm>
+            <a:off x="838200" y="365125"/>
+            <a:ext cx="10515600" cy="575779"/>
+          </a:xfrm>
+        </p:spPr>
+        <p:txBody>
+          <a:bodyPr>
+            <a:noAutofit/>
+          </a:bodyPr>
+          <a:lstStyle/>
+          <a:p>
+            <a:r>
+              <a:rPr lang="en-US" sz="1800" b="1" i="0" dirty="0" err="1" smtClean="0">
+                <a:effectLst/>
+                <a:latin typeface="AdvPSA183"/>
+              </a:rPr>
+              <a:t>BarPlot</a:t>
+            </a:r>
+            <a:endParaRPr lang="en-US" sz="1800" b="1" dirty="0">
+              <a:latin typeface="AdvPSA183"/>
+            </a:endParaRPr>
+          </a:p>
+        </p:txBody>
+      </p:sp>
+      <p:pic>
+        <p:nvPicPr>
+          <p:cNvPr id="4098" name="Picture 2"/>
+          <p:cNvPicPr>
+            <a:picLocks noChangeAspect="1" noChangeArrowheads="1"/>
+          </p:cNvPicPr>
+          <p:nvPr/>
+        </p:nvPicPr>
+        <p:blipFill>
+          <a:blip r:embed="rId2">
+            <a:extLst>
+              <a:ext uri="{28A0092B-C50C-407E-A947-70E740481C1C}">
+                <a14:useLocalDpi xmlns:a14="http://schemas.microsoft.com/office/drawing/2010/main" val="0"/>
+              </a:ext>
+            </a:extLst>
+          </a:blip>
+          <a:srcRect/>
+          <a:stretch>
+            <a:fillRect/>
+          </a:stretch>
+        </p:blipFill>
+        <p:spPr bwMode="auto">
+          <a:xfrm>
+            <a:off x="4119563" y="849996"/>
+            <a:ext cx="3952875" cy="5534025"/>
+          </a:xfrm>
+          <a:prstGeom prst="rect">
+            <a:avLst/>
+          </a:prstGeom>
+          <a:noFill/>
+          <a:ln>
+            <a:noFill/>
+          </a:ln>
+          <a:extLst>
+            <a:ext uri="{909E8E84-426E-40DD-AFC4-6F175D3DCCD1}">
+              <a14:hiddenFill xmlns:a14="http://schemas.microsoft.com/office/drawing/2010/main">
+                <a:solidFill>
+                  <a:schemeClr val="accent1"/>
+                </a:solidFill>
+              </a14:hiddenFill>
+            </a:ext>
+            <a:ext uri="{91240B29-F687-4F45-9708-019B960494DF}">
+              <a14:hiddenLine xmlns:a14="http://schemas.microsoft.com/office/drawing/2010/main" w="9525">
+                <a:solidFill>
+                  <a:schemeClr val="tx1"/>
+                </a:solidFill>
+                <a:miter lim="800000"/>
+                <a:headEnd/>
+                <a:tailEnd/>
+              </a14:hiddenLine>
+            </a:ext>
+          </a:extLst>
+        </p:spPr>
+      </p:pic>
+    </p:spTree>
+    <p:extLst>
+      <p:ext uri="{BB962C8B-B14F-4D97-AF65-F5344CB8AC3E}">
+        <p14:creationId xmlns:p14="http://schemas.microsoft.com/office/powerpoint/2010/main" val="3753259725"/>
       </p:ext>
     </p:extLst>
   </p:cSld>
@@ -4271,7 +4397,7 @@
           <p:cNvPr id="2" name="Title 1">
             <a:extLst>
               <a:ext uri="{FF2B5EF4-FFF2-40B4-BE49-F238E27FC236}">
-                <a16:creationId xmlns:a16="http://schemas.microsoft.com/office/drawing/2014/main" xmlns="" id="{4EA3CB9E-619E-4288-9D33-73290203AB4F}"/>
+                <a16:creationId xmlns="" xmlns:a16="http://schemas.microsoft.com/office/drawing/2014/main" id="{4EA3CB9E-619E-4288-9D33-73290203AB4F}"/>
               </a:ext>
             </a:extLst>
           </p:cNvPr>
@@ -4396,7 +4522,7 @@
           <p:cNvPr id="7" name="Title 1">
             <a:extLst>
               <a:ext uri="{FF2B5EF4-FFF2-40B4-BE49-F238E27FC236}">
-                <a16:creationId xmlns:a16="http://schemas.microsoft.com/office/drawing/2014/main" xmlns="" id="{B0994368-9E16-7442-9049-7EF3FAAD3475}"/>
+                <a16:creationId xmlns="" xmlns:a16="http://schemas.microsoft.com/office/drawing/2014/main" id="{B0994368-9E16-7442-9049-7EF3FAAD3475}"/>
               </a:ext>
             </a:extLst>
           </p:cNvPr>
@@ -4407,7 +4533,7 @@
         </p:nvSpPr>
         <p:spPr>
           <a:xfrm>
-            <a:off x="3748648" y="353401"/>
+            <a:off x="672162" y="382062"/>
             <a:ext cx="3985296" cy="575779"/>
           </a:xfrm>
           <a:prstGeom prst="rect">
@@ -4442,8 +4568,29 @@
               <a:rPr lang="en-US" sz="1800" b="1" dirty="0">
                 <a:latin typeface="AdvPSA183"/>
               </a:rPr>
-              <a:t>Sample Distance Heatmap Plots</a:t>
-            </a:r>
+              <a:t>Sample Distance </a:t>
+            </a:r>
+            <a:r>
+              <a:rPr lang="en-US" sz="1800" b="1" dirty="0" err="1">
+                <a:latin typeface="AdvPSA183"/>
+              </a:rPr>
+              <a:t>Heatmap</a:t>
+            </a:r>
+            <a:r>
+              <a:rPr lang="en-US" sz="1800" b="1" dirty="0">
+                <a:latin typeface="AdvPSA183"/>
+              </a:rPr>
+              <a:t> </a:t>
+            </a:r>
+            <a:r>
+              <a:rPr lang="en-US" sz="1800" b="1" dirty="0" smtClean="0">
+                <a:latin typeface="AdvPSA183"/>
+              </a:rPr>
+              <a:t>Plot</a:t>
+            </a:r>
+            <a:endParaRPr lang="en-US" sz="1800" b="1" dirty="0">
+              <a:latin typeface="AdvPSA183"/>
+            </a:endParaRPr>
           </a:p>
         </p:txBody>
       </p:sp>
@@ -4531,6 +4678,83 @@
           <a:chExt cx="0" cy="0"/>
         </a:xfrm>
       </p:grpSpPr>
+      <p:sp>
+        <p:nvSpPr>
+          <p:cNvPr id="5" name="Title 1">
+            <a:extLst>
+              <a:ext uri="{FF2B5EF4-FFF2-40B4-BE49-F238E27FC236}">
+                <a16:creationId xmlns="" xmlns:a16="http://schemas.microsoft.com/office/drawing/2014/main" id="{B0994368-9E16-7442-9049-7EF3FAAD3475}"/>
+              </a:ext>
+            </a:extLst>
+          </p:cNvPr>
+          <p:cNvSpPr txBox="1">
+            <a:spLocks/>
+          </p:cNvSpPr>
+          <p:nvPr/>
+        </p:nvSpPr>
+        <p:spPr>
+          <a:xfrm>
+            <a:off x="672162" y="382062"/>
+            <a:ext cx="3985296" cy="575779"/>
+          </a:xfrm>
+          <a:prstGeom prst="rect">
+            <a:avLst/>
+          </a:prstGeom>
+        </p:spPr>
+        <p:txBody>
+          <a:bodyPr vert="horz" lIns="91440" tIns="45720" rIns="91440" bIns="45720" rtlCol="0" anchor="ctr">
+            <a:noAutofit/>
+          </a:bodyPr>
+          <a:lstStyle>
+            <a:lvl1pPr algn="l" defTabSz="914400" rtl="0" eaLnBrk="1" latinLnBrk="0" hangingPunct="1">
+              <a:lnSpc>
+                <a:spcPct val="90000"/>
+              </a:lnSpc>
+              <a:spcBef>
+                <a:spcPct val="0"/>
+              </a:spcBef>
+              <a:buNone/>
+              <a:defRPr sz="4400" kern="1200">
+                <a:solidFill>
+                  <a:schemeClr val="tx1"/>
+                </a:solidFill>
+                <a:latin typeface="+mj-lt"/>
+                <a:ea typeface="+mj-ea"/>
+                <a:cs typeface="+mj-cs"/>
+              </a:defRPr>
+            </a:lvl1pPr>
+          </a:lstStyle>
+          <a:p>
+            <a:r>
+              <a:rPr lang="en-US" sz="1800" b="1" dirty="0" err="1" smtClean="0">
+                <a:latin typeface="AdvPSA183"/>
+              </a:rPr>
+              <a:t>RSeQC</a:t>
+            </a:r>
+            <a:r>
+              <a:rPr lang="en-US" sz="1800" b="1" dirty="0" smtClean="0">
+                <a:latin typeface="AdvPSA183"/>
+              </a:rPr>
+              <a:t> </a:t>
+            </a:r>
+            <a:r>
+              <a:rPr lang="en-US" sz="1800" b="1" dirty="0" err="1" smtClean="0">
+                <a:latin typeface="AdvPSA183"/>
+              </a:rPr>
+              <a:t>Genbody</a:t>
+            </a:r>
+            <a:r>
+              <a:rPr lang="en-US" sz="1800" b="1" dirty="0" smtClean="0">
+                <a:latin typeface="AdvPSA183"/>
+              </a:rPr>
+              <a:t> Coverage Plot</a:t>
+            </a:r>
+            <a:endParaRPr lang="en-US" sz="1800" b="1" dirty="0">
+              <a:latin typeface="AdvPSA183"/>
+            </a:endParaRPr>
+          </a:p>
+        </p:txBody>
+      </p:sp>
       <p:pic>
         <p:nvPicPr>
           <p:cNvPr id="1027" name="Picture 3"/>
@@ -4554,8 +4778,8 @@
         </p:blipFill>
         <p:spPr bwMode="auto">
           <a:xfrm>
-            <a:off x="3466252" y="1378029"/>
-            <a:ext cx="5370097" cy="4539444"/>
+            <a:off x="3164776" y="1003300"/>
+            <a:ext cx="5477574" cy="5218038"/>
           </a:xfrm>
           <a:prstGeom prst="rect">
             <a:avLst/>
@@ -4585,118 +4809,10 @@
           </a:extLst>
         </p:spPr>
       </p:pic>
-      <p:sp>
-        <p:nvSpPr>
-          <p:cNvPr id="2" name="TextBox 1"/>
-          <p:cNvSpPr txBox="1"/>
-          <p:nvPr/>
-        </p:nvSpPr>
-        <p:spPr>
-          <a:xfrm>
-            <a:off x="4530789" y="1020291"/>
-            <a:ext cx="1126206" cy="369332"/>
-          </a:xfrm>
-          <a:prstGeom prst="rect">
-            <a:avLst/>
-          </a:prstGeom>
-          <a:noFill/>
-        </p:spPr>
-        <p:txBody>
-          <a:bodyPr wrap="none" rtlCol="0">
-            <a:spAutoFit/>
-          </a:bodyPr>
-          <a:lstStyle/>
-          <a:p>
-            <a:r>
-              <a:rPr lang="en-US" dirty="0" err="1" smtClean="0"/>
-              <a:t>A_Control</a:t>
-            </a:r>
-            <a:endParaRPr lang="en-US" dirty="0"/>
-          </a:p>
-        </p:txBody>
-      </p:sp>
-      <p:sp>
-        <p:nvSpPr>
-          <p:cNvPr id="6" name="TextBox 5"/>
-          <p:cNvSpPr txBox="1"/>
-          <p:nvPr/>
-        </p:nvSpPr>
-        <p:spPr>
-          <a:xfrm>
-            <a:off x="6607417" y="1008697"/>
-            <a:ext cx="1405449" cy="369332"/>
-          </a:xfrm>
-          <a:prstGeom prst="rect">
-            <a:avLst/>
-          </a:prstGeom>
-          <a:noFill/>
-        </p:spPr>
-        <p:txBody>
-          <a:bodyPr wrap="none" rtlCol="0">
-            <a:spAutoFit/>
-          </a:bodyPr>
-          <a:lstStyle/>
-          <a:p>
-            <a:r>
-              <a:rPr lang="en-US" dirty="0" err="1" smtClean="0"/>
-              <a:t>A_Treatment</a:t>
-            </a:r>
-            <a:endParaRPr lang="en-US" dirty="0"/>
-          </a:p>
-        </p:txBody>
-      </p:sp>
-      <p:sp>
-        <p:nvSpPr>
-          <p:cNvPr id="7" name="Title 1">
-            <a:extLst>
-              <a:ext uri="{FF2B5EF4-FFF2-40B4-BE49-F238E27FC236}">
-                <a16:creationId xmlns:a16="http://schemas.microsoft.com/office/drawing/2014/main" xmlns="" id="{4EA3CB9E-619E-4288-9D33-73290203AB4F}"/>
-              </a:ext>
-            </a:extLst>
-          </p:cNvPr>
-          <p:cNvSpPr>
-            <a:spLocks noGrp="1"/>
-          </p:cNvSpPr>
-          <p:nvPr>
-            <p:ph type="title"/>
-          </p:nvPr>
-        </p:nvSpPr>
-        <p:spPr>
-          <a:xfrm>
-            <a:off x="838200" y="365125"/>
-            <a:ext cx="10515600" cy="575779"/>
-          </a:xfrm>
-        </p:spPr>
-        <p:txBody>
-          <a:bodyPr>
-            <a:noAutofit/>
-          </a:bodyPr>
-          <a:lstStyle/>
-          <a:p>
-            <a:r>
-              <a:rPr lang="en-US" sz="1800" b="1" i="0" dirty="0" err="1" smtClean="0">
-                <a:effectLst/>
-                <a:latin typeface="AdvPSA183"/>
-              </a:rPr>
-              <a:t>Heatmap</a:t>
-            </a:r>
-            <a:r>
-              <a:rPr lang="en-US" sz="1800" b="1" i="0" dirty="0" smtClean="0">
-                <a:effectLst/>
-                <a:latin typeface="AdvPSA183"/>
-              </a:rPr>
-              <a:t> for all DEGs</a:t>
-            </a:r>
-            <a:endParaRPr lang="en-US" sz="1800" b="1" dirty="0">
-              <a:latin typeface="AdvPSA183"/>
-            </a:endParaRPr>
-          </a:p>
-        </p:txBody>
-      </p:sp>
     </p:spTree>
     <p:extLst>
       <p:ext uri="{BB962C8B-B14F-4D97-AF65-F5344CB8AC3E}">
-        <p14:creationId xmlns:p14="http://schemas.microsoft.com/office/powerpoint/2010/main" val="1955646064"/>
+        <p14:creationId xmlns:p14="http://schemas.microsoft.com/office/powerpoint/2010/main" val="1749010221"/>
       </p:ext>
     </p:extLst>
   </p:cSld>
@@ -4723,50 +4839,9 @@
           <a:chExt cx="0" cy="0"/>
         </a:xfrm>
       </p:grpSpPr>
-      <p:sp>
-        <p:nvSpPr>
-          <p:cNvPr id="2" name="Title 1">
-            <a:extLst>
-              <a:ext uri="{FF2B5EF4-FFF2-40B4-BE49-F238E27FC236}">
-                <a16:creationId xmlns:a16="http://schemas.microsoft.com/office/drawing/2014/main" xmlns="" id="{4EA3CB9E-619E-4288-9D33-73290203AB4F}"/>
-              </a:ext>
-            </a:extLst>
-          </p:cNvPr>
-          <p:cNvSpPr>
-            <a:spLocks noGrp="1"/>
-          </p:cNvSpPr>
-          <p:nvPr>
-            <p:ph type="title"/>
-          </p:nvPr>
-        </p:nvSpPr>
-        <p:spPr>
-          <a:xfrm>
-            <a:off x="838200" y="365125"/>
-            <a:ext cx="10515600" cy="575779"/>
-          </a:xfrm>
-        </p:spPr>
-        <p:txBody>
-          <a:bodyPr>
-            <a:noAutofit/>
-          </a:bodyPr>
-          <a:lstStyle/>
-          <a:p>
-            <a:r>
-              <a:rPr lang="en-US" sz="1800" b="1" i="0" dirty="0">
-                <a:effectLst/>
-                <a:latin typeface="AdvPSA183"/>
-              </a:rPr>
-              <a:t>Volcano Plots (FDR&lt;0.05 abs(Log2FC)&gt;1)</a:t>
-            </a:r>
-            <a:endParaRPr lang="en-US" sz="1800" b="1" dirty="0">
-              <a:latin typeface="AdvPSA183"/>
-            </a:endParaRPr>
-          </a:p>
-        </p:txBody>
-      </p:sp>
       <p:pic>
         <p:nvPicPr>
-          <p:cNvPr id="3074" name="Picture 2"/>
+          <p:cNvPr id="1027" name="Picture 3"/>
           <p:cNvPicPr>
             <a:picLocks noChangeAspect="1" noChangeArrowheads="1"/>
           </p:cNvPicPr>
@@ -4787,8 +4862,8 @@
         </p:blipFill>
         <p:spPr bwMode="auto">
           <a:xfrm>
-            <a:off x="3295680" y="1102912"/>
-            <a:ext cx="5378450" cy="4908550"/>
+            <a:off x="3466252" y="1378029"/>
+            <a:ext cx="5370097" cy="4539444"/>
           </a:xfrm>
           <a:prstGeom prst="rect">
             <a:avLst/>
@@ -4818,10 +4893,118 @@
           </a:extLst>
         </p:spPr>
       </p:pic>
+      <p:sp>
+        <p:nvSpPr>
+          <p:cNvPr id="2" name="TextBox 1"/>
+          <p:cNvSpPr txBox="1"/>
+          <p:nvPr/>
+        </p:nvSpPr>
+        <p:spPr>
+          <a:xfrm>
+            <a:off x="4530789" y="1020291"/>
+            <a:ext cx="1126206" cy="369332"/>
+          </a:xfrm>
+          <a:prstGeom prst="rect">
+            <a:avLst/>
+          </a:prstGeom>
+          <a:noFill/>
+        </p:spPr>
+        <p:txBody>
+          <a:bodyPr wrap="none" rtlCol="0">
+            <a:spAutoFit/>
+          </a:bodyPr>
+          <a:lstStyle/>
+          <a:p>
+            <a:r>
+              <a:rPr lang="en-US" dirty="0" err="1" smtClean="0"/>
+              <a:t>A_Control</a:t>
+            </a:r>
+            <a:endParaRPr lang="en-US" dirty="0"/>
+          </a:p>
+        </p:txBody>
+      </p:sp>
+      <p:sp>
+        <p:nvSpPr>
+          <p:cNvPr id="6" name="TextBox 5"/>
+          <p:cNvSpPr txBox="1"/>
+          <p:nvPr/>
+        </p:nvSpPr>
+        <p:spPr>
+          <a:xfrm>
+            <a:off x="6607417" y="1008697"/>
+            <a:ext cx="1405449" cy="369332"/>
+          </a:xfrm>
+          <a:prstGeom prst="rect">
+            <a:avLst/>
+          </a:prstGeom>
+          <a:noFill/>
+        </p:spPr>
+        <p:txBody>
+          <a:bodyPr wrap="none" rtlCol="0">
+            <a:spAutoFit/>
+          </a:bodyPr>
+          <a:lstStyle/>
+          <a:p>
+            <a:r>
+              <a:rPr lang="en-US" dirty="0" err="1" smtClean="0"/>
+              <a:t>A_Treatment</a:t>
+            </a:r>
+            <a:endParaRPr lang="en-US" dirty="0"/>
+          </a:p>
+        </p:txBody>
+      </p:sp>
+      <p:sp>
+        <p:nvSpPr>
+          <p:cNvPr id="7" name="Title 1">
+            <a:extLst>
+              <a:ext uri="{FF2B5EF4-FFF2-40B4-BE49-F238E27FC236}">
+                <a16:creationId xmlns="" xmlns:a16="http://schemas.microsoft.com/office/drawing/2014/main" id="{4EA3CB9E-619E-4288-9D33-73290203AB4F}"/>
+              </a:ext>
+            </a:extLst>
+          </p:cNvPr>
+          <p:cNvSpPr>
+            <a:spLocks noGrp="1"/>
+          </p:cNvSpPr>
+          <p:nvPr>
+            <p:ph type="title"/>
+          </p:nvPr>
+        </p:nvSpPr>
+        <p:spPr>
+          <a:xfrm>
+            <a:off x="838200" y="365125"/>
+            <a:ext cx="10515600" cy="575779"/>
+          </a:xfrm>
+        </p:spPr>
+        <p:txBody>
+          <a:bodyPr>
+            <a:noAutofit/>
+          </a:bodyPr>
+          <a:lstStyle/>
+          <a:p>
+            <a:r>
+              <a:rPr lang="en-US" sz="1800" b="1" i="0" dirty="0" err="1" smtClean="0">
+                <a:effectLst/>
+                <a:latin typeface="AdvPSA183"/>
+              </a:rPr>
+              <a:t>Heatmap</a:t>
+            </a:r>
+            <a:r>
+              <a:rPr lang="en-US" sz="1800" b="1" i="0" dirty="0" smtClean="0">
+                <a:effectLst/>
+                <a:latin typeface="AdvPSA183"/>
+              </a:rPr>
+              <a:t> for all DEGs</a:t>
+            </a:r>
+            <a:endParaRPr lang="en-US" sz="1800" b="1" dirty="0">
+              <a:latin typeface="AdvPSA183"/>
+            </a:endParaRPr>
+          </a:p>
+        </p:txBody>
+      </p:sp>
     </p:spTree>
     <p:extLst>
       <p:ext uri="{BB962C8B-B14F-4D97-AF65-F5344CB8AC3E}">
-        <p14:creationId xmlns:p14="http://schemas.microsoft.com/office/powerpoint/2010/main" val="1858227081"/>
+        <p14:creationId xmlns:p14="http://schemas.microsoft.com/office/powerpoint/2010/main" val="1955646064"/>
       </p:ext>
     </p:extLst>
   </p:cSld>
@@ -4853,7 +5036,7 @@
           <p:cNvPr id="2" name="Title 1">
             <a:extLst>
               <a:ext uri="{FF2B5EF4-FFF2-40B4-BE49-F238E27FC236}">
-                <a16:creationId xmlns:a16="http://schemas.microsoft.com/office/drawing/2014/main" xmlns="" id="{4EA3CB9E-619E-4288-9D33-73290203AB4F}"/>
+                <a16:creationId xmlns="" xmlns:a16="http://schemas.microsoft.com/office/drawing/2014/main" id="{4EA3CB9E-619E-4288-9D33-73290203AB4F}"/>
               </a:ext>
             </a:extLst>
           </p:cNvPr>
@@ -4881,7 +5064,7 @@
                 <a:effectLst/>
                 <a:latin typeface="AdvPSA183"/>
               </a:rPr>
-              <a:t>MA Plots (FDR&lt;0.05 abs(Log2FC)&gt;1)</a:t>
+              <a:t>Volcano Plots (FDR&lt;0.05 abs(Log2FC)&gt;1)</a:t>
             </a:r>
             <a:endParaRPr lang="en-US" sz="1800" b="1" dirty="0">
               <a:latin typeface="AdvPSA183"/>
@@ -4891,7 +5074,7 @@
       </p:sp>
       <p:pic>
         <p:nvPicPr>
-          <p:cNvPr id="3077" name="Picture 5"/>
+          <p:cNvPr id="3074" name="Picture 2"/>
           <p:cNvPicPr>
             <a:picLocks noChangeAspect="1" noChangeArrowheads="1"/>
           </p:cNvPicPr>
@@ -4912,8 +5095,8 @@
         </p:blipFill>
         <p:spPr bwMode="auto">
           <a:xfrm>
-            <a:off x="3184614" y="1527267"/>
-            <a:ext cx="4925346" cy="4636950"/>
+            <a:off x="3295680" y="1102912"/>
+            <a:ext cx="5378450" cy="4908550"/>
           </a:xfrm>
           <a:prstGeom prst="rect">
             <a:avLst/>
@@ -4946,7 +5129,7 @@
     </p:spTree>
     <p:extLst>
       <p:ext uri="{BB962C8B-B14F-4D97-AF65-F5344CB8AC3E}">
-        <p14:creationId xmlns:p14="http://schemas.microsoft.com/office/powerpoint/2010/main" val="2681866177"/>
+        <p14:creationId xmlns:p14="http://schemas.microsoft.com/office/powerpoint/2010/main" val="1858227081"/>
       </p:ext>
     </p:extLst>
   </p:cSld>
@@ -4975,10 +5158,135 @@
       </p:grpSpPr>
       <p:sp>
         <p:nvSpPr>
+          <p:cNvPr id="2" name="Title 1">
+            <a:extLst>
+              <a:ext uri="{FF2B5EF4-FFF2-40B4-BE49-F238E27FC236}">
+                <a16:creationId xmlns="" xmlns:a16="http://schemas.microsoft.com/office/drawing/2014/main" id="{4EA3CB9E-619E-4288-9D33-73290203AB4F}"/>
+              </a:ext>
+            </a:extLst>
+          </p:cNvPr>
+          <p:cNvSpPr>
+            <a:spLocks noGrp="1"/>
+          </p:cNvSpPr>
+          <p:nvPr>
+            <p:ph type="title"/>
+          </p:nvPr>
+        </p:nvSpPr>
+        <p:spPr>
+          <a:xfrm>
+            <a:off x="838200" y="365125"/>
+            <a:ext cx="10515600" cy="575779"/>
+          </a:xfrm>
+        </p:spPr>
+        <p:txBody>
+          <a:bodyPr>
+            <a:noAutofit/>
+          </a:bodyPr>
+          <a:lstStyle/>
+          <a:p>
+            <a:r>
+              <a:rPr lang="en-US" sz="1800" b="1" i="0" dirty="0">
+                <a:effectLst/>
+                <a:latin typeface="AdvPSA183"/>
+              </a:rPr>
+              <a:t>MA Plots (FDR&lt;0.05 abs(Log2FC)&gt;1)</a:t>
+            </a:r>
+            <a:endParaRPr lang="en-US" sz="1800" b="1" dirty="0">
+              <a:latin typeface="AdvPSA183"/>
+            </a:endParaRPr>
+          </a:p>
+        </p:txBody>
+      </p:sp>
+      <p:pic>
+        <p:nvPicPr>
+          <p:cNvPr id="3077" name="Picture 5"/>
+          <p:cNvPicPr>
+            <a:picLocks noChangeAspect="1" noChangeArrowheads="1"/>
+          </p:cNvPicPr>
+          <p:nvPr/>
+        </p:nvPicPr>
+        <p:blipFill>
+          <a:blip r:embed="rId2">
+            <a:extLst>
+              <a:ext uri="{28A0092B-C50C-407E-A947-70E740481C1C}">
+                <a14:useLocalDpi xmlns:a14="http://schemas.microsoft.com/office/drawing/2010/main" val="0"/>
+              </a:ext>
+            </a:extLst>
+          </a:blip>
+          <a:srcRect/>
+          <a:stretch>
+            <a:fillRect/>
+          </a:stretch>
+        </p:blipFill>
+        <p:spPr bwMode="auto">
+          <a:xfrm>
+            <a:off x="3184614" y="1527267"/>
+            <a:ext cx="4925346" cy="4636950"/>
+          </a:xfrm>
+          <a:prstGeom prst="rect">
+            <a:avLst/>
+          </a:prstGeom>
+          <a:noFill/>
+          <a:ln>
+            <a:noFill/>
+          </a:ln>
+          <a:extLst>
+            <a:ext uri="{909E8E84-426E-40DD-AFC4-6F175D3DCCD1}">
+              <a14:hiddenFill xmlns:a14="http://schemas.microsoft.com/office/drawing/2010/main">
+                <a:solidFill>
+                  <a:schemeClr val="accent1"/>
+                </a:solidFill>
+              </a14:hiddenFill>
+            </a:ext>
+            <a:ext uri="{91240B29-F687-4F45-9708-019B960494DF}">
+              <a14:hiddenLine xmlns:a14="http://schemas.microsoft.com/office/drawing/2010/main" w="9525">
+                <a:solidFill>
+                  <a:schemeClr val="tx1"/>
+                </a:solidFill>
+                <a:miter lim="800000"/>
+                <a:headEnd/>
+                <a:tailEnd/>
+              </a14:hiddenLine>
+            </a:ext>
+          </a:extLst>
+        </p:spPr>
+      </p:pic>
+    </p:spTree>
+    <p:extLst>
+      <p:ext uri="{BB962C8B-B14F-4D97-AF65-F5344CB8AC3E}">
+        <p14:creationId xmlns:p14="http://schemas.microsoft.com/office/powerpoint/2010/main" val="2681866177"/>
+      </p:ext>
+    </p:extLst>
+  </p:cSld>
+  <p:clrMapOvr>
+    <a:masterClrMapping/>
+  </p:clrMapOvr>
+</p:sld>
+</file>
+
+<file path=ppt/slides/slide8.xml><?xml version="1.0" encoding="utf-8"?>
+<p:sld xmlns:a="http://schemas.openxmlformats.org/drawingml/2006/main" xmlns:r="http://schemas.openxmlformats.org/officeDocument/2006/relationships" xmlns:p="http://schemas.openxmlformats.org/presentationml/2006/main">
+  <p:cSld>
+    <p:spTree>
+      <p:nvGrpSpPr>
+        <p:cNvPr id="1" name=""/>
+        <p:cNvGrpSpPr/>
+        <p:nvPr/>
+      </p:nvGrpSpPr>
+      <p:grpSpPr>
+        <a:xfrm>
+          <a:off x="0" y="0"/>
+          <a:ext cx="0" cy="0"/>
+          <a:chOff x="0" y="0"/>
+          <a:chExt cx="0" cy="0"/>
+        </a:xfrm>
+      </p:grpSpPr>
+      <p:sp>
+        <p:nvSpPr>
           <p:cNvPr id="13" name="Title 1">
             <a:extLst>
               <a:ext uri="{FF2B5EF4-FFF2-40B4-BE49-F238E27FC236}">
-                <a16:creationId xmlns:a16="http://schemas.microsoft.com/office/drawing/2014/main" xmlns="" id="{4EA3CB9E-619E-4288-9D33-73290203AB4F}"/>
+                <a16:creationId xmlns="" xmlns:a16="http://schemas.microsoft.com/office/drawing/2014/main" id="{4EA3CB9E-619E-4288-9D33-73290203AB4F}"/>
               </a:ext>
             </a:extLst>
           </p:cNvPr>
@@ -5203,217 +5511,6 @@
 </p:sld>
 </file>
 
-<file path=ppt/slides/slide8.xml><?xml version="1.0" encoding="utf-8"?>
-<p:sld xmlns:a="http://schemas.openxmlformats.org/drawingml/2006/main" xmlns:r="http://schemas.openxmlformats.org/officeDocument/2006/relationships" xmlns:p="http://schemas.openxmlformats.org/presentationml/2006/main">
-  <p:cSld>
-    <p:spTree>
-      <p:nvGrpSpPr>
-        <p:cNvPr id="1" name=""/>
-        <p:cNvGrpSpPr/>
-        <p:nvPr/>
-      </p:nvGrpSpPr>
-      <p:grpSpPr>
-        <a:xfrm>
-          <a:off x="0" y="0"/>
-          <a:ext cx="0" cy="0"/>
-          <a:chOff x="0" y="0"/>
-          <a:chExt cx="0" cy="0"/>
-        </a:xfrm>
-      </p:grpSpPr>
-      <p:sp>
-        <p:nvSpPr>
-          <p:cNvPr id="3" name="TextBox 2"/>
-          <p:cNvSpPr txBox="1"/>
-          <p:nvPr/>
-        </p:nvSpPr>
-        <p:spPr>
-          <a:xfrm>
-            <a:off x="2942339" y="5872312"/>
-            <a:ext cx="905184" cy="338554"/>
-          </a:xfrm>
-          <a:prstGeom prst="rect">
-            <a:avLst/>
-          </a:prstGeom>
-          <a:noFill/>
-        </p:spPr>
-        <p:txBody>
-          <a:bodyPr wrap="none" rtlCol="0">
-            <a:spAutoFit/>
-          </a:bodyPr>
-          <a:lstStyle/>
-          <a:p>
-            <a:r>
-              <a:rPr lang="en-US" sz="1600" dirty="0"/>
-              <a:t>Up DEGs</a:t>
-            </a:r>
-          </a:p>
-        </p:txBody>
-      </p:sp>
-      <p:pic>
-        <p:nvPicPr>
-          <p:cNvPr id="10243" name="Picture 3" descr="C:\Users\Fei\Dropbox (EinsteinMed)\Fei\RNA\Ian\GO_Down.png"/>
-          <p:cNvPicPr>
-            <a:picLocks noChangeAspect="1" noChangeArrowheads="1"/>
-          </p:cNvPicPr>
-          <p:nvPr/>
-        </p:nvPicPr>
-        <p:blipFill>
-          <a:blip r:embed="rId2" cstate="print">
-            <a:extLst>
-              <a:ext uri="{28A0092B-C50C-407E-A947-70E740481C1C}">
-                <a14:useLocalDpi xmlns:a14="http://schemas.microsoft.com/office/drawing/2010/main" val="0"/>
-              </a:ext>
-            </a:extLst>
-          </a:blip>
-          <a:srcRect/>
-          <a:stretch>
-            <a:fillRect/>
-          </a:stretch>
-        </p:blipFill>
-        <p:spPr bwMode="auto">
-          <a:xfrm>
-            <a:off x="6637359" y="1410055"/>
-            <a:ext cx="5368723" cy="4294979"/>
-          </a:xfrm>
-          <a:prstGeom prst="rect">
-            <a:avLst/>
-          </a:prstGeom>
-          <a:noFill/>
-          <a:extLst>
-            <a:ext uri="{909E8E84-426E-40DD-AFC4-6F175D3DCCD1}">
-              <a14:hiddenFill xmlns:a14="http://schemas.microsoft.com/office/drawing/2010/main">
-                <a:solidFill>
-                  <a:srgbClr val="FFFFFF"/>
-                </a:solidFill>
-              </a14:hiddenFill>
-            </a:ext>
-          </a:extLst>
-        </p:spPr>
-      </p:pic>
-      <p:sp>
-        <p:nvSpPr>
-          <p:cNvPr id="7" name="TextBox 6"/>
-          <p:cNvSpPr txBox="1"/>
-          <p:nvPr/>
-        </p:nvSpPr>
-        <p:spPr>
-          <a:xfrm>
-            <a:off x="8950032" y="5858165"/>
-            <a:ext cx="1156022" cy="338554"/>
-          </a:xfrm>
-          <a:prstGeom prst="rect">
-            <a:avLst/>
-          </a:prstGeom>
-          <a:noFill/>
-        </p:spPr>
-        <p:txBody>
-          <a:bodyPr wrap="none" rtlCol="0">
-            <a:spAutoFit/>
-          </a:bodyPr>
-          <a:lstStyle/>
-          <a:p>
-            <a:r>
-              <a:rPr lang="en-US" sz="1600" dirty="0"/>
-              <a:t>Down DEGs</a:t>
-            </a:r>
-          </a:p>
-        </p:txBody>
-      </p:sp>
-      <p:pic>
-        <p:nvPicPr>
-          <p:cNvPr id="10244" name="Picture 4" descr="C:\Users\Fei\Dropbox (EinsteinMed)\Fei\RNA\Ian\GO_Up.png"/>
-          <p:cNvPicPr>
-            <a:picLocks noChangeAspect="1" noChangeArrowheads="1"/>
-          </p:cNvPicPr>
-          <p:nvPr/>
-        </p:nvPicPr>
-        <p:blipFill>
-          <a:blip r:embed="rId3" cstate="print">
-            <a:extLst>
-              <a:ext uri="{28A0092B-C50C-407E-A947-70E740481C1C}">
-                <a14:useLocalDpi xmlns:a14="http://schemas.microsoft.com/office/drawing/2010/main" val="0"/>
-              </a:ext>
-            </a:extLst>
-          </a:blip>
-          <a:srcRect/>
-          <a:stretch>
-            <a:fillRect/>
-          </a:stretch>
-        </p:blipFill>
-        <p:spPr bwMode="auto">
-          <a:xfrm>
-            <a:off x="1019918" y="1410054"/>
-            <a:ext cx="5368723" cy="4294979"/>
-          </a:xfrm>
-          <a:prstGeom prst="rect">
-            <a:avLst/>
-          </a:prstGeom>
-          <a:noFill/>
-          <a:extLst>
-            <a:ext uri="{909E8E84-426E-40DD-AFC4-6F175D3DCCD1}">
-              <a14:hiddenFill xmlns:a14="http://schemas.microsoft.com/office/drawing/2010/main">
-                <a:solidFill>
-                  <a:srgbClr val="FFFFFF"/>
-                </a:solidFill>
-              </a14:hiddenFill>
-            </a:ext>
-          </a:extLst>
-        </p:spPr>
-      </p:pic>
-      <p:sp>
-        <p:nvSpPr>
-          <p:cNvPr id="8" name="Title 1">
-            <a:extLst>
-              <a:ext uri="{FF2B5EF4-FFF2-40B4-BE49-F238E27FC236}">
-                <a16:creationId xmlns:a16="http://schemas.microsoft.com/office/drawing/2014/main" xmlns="" id="{4EA3CB9E-619E-4288-9D33-73290203AB4F}"/>
-              </a:ext>
-            </a:extLst>
-          </p:cNvPr>
-          <p:cNvSpPr>
-            <a:spLocks noGrp="1"/>
-          </p:cNvSpPr>
-          <p:nvPr>
-            <p:ph type="title"/>
-          </p:nvPr>
-        </p:nvSpPr>
-        <p:spPr>
-          <a:xfrm>
-            <a:off x="838200" y="365125"/>
-            <a:ext cx="10515600" cy="575779"/>
-          </a:xfrm>
-        </p:spPr>
-        <p:txBody>
-          <a:bodyPr>
-            <a:noAutofit/>
-          </a:bodyPr>
-          <a:lstStyle/>
-          <a:p>
-            <a:r>
-              <a:rPr lang="en-US" sz="1800" b="1" i="0" dirty="0" smtClean="0">
-                <a:effectLst/>
-                <a:latin typeface="AdvPSA183"/>
-              </a:rPr>
-              <a:t>Bubble Plots</a:t>
-            </a:r>
-            <a:endParaRPr lang="en-US" sz="1800" b="1" dirty="0">
-              <a:latin typeface="AdvPSA183"/>
-            </a:endParaRPr>
-          </a:p>
-        </p:txBody>
-      </p:sp>
-    </p:spTree>
-    <p:extLst>
-      <p:ext uri="{BB962C8B-B14F-4D97-AF65-F5344CB8AC3E}">
-        <p14:creationId xmlns:p14="http://schemas.microsoft.com/office/powerpoint/2010/main" val="3441741079"/>
-      </p:ext>
-    </p:extLst>
-  </p:cSld>
-  <p:clrMapOvr>
-    <a:masterClrMapping/>
-  </p:clrMapOvr>
-</p:sld>
-</file>
-
 <file path=ppt/slides/slide9.xml><?xml version="1.0" encoding="utf-8"?>
 <p:sld xmlns:a="http://schemas.openxmlformats.org/drawingml/2006/main" xmlns:r="http://schemas.openxmlformats.org/officeDocument/2006/relationships" xmlns:p="http://schemas.openxmlformats.org/presentationml/2006/main">
   <p:cSld>
@@ -5433,55 +5530,43 @@
       </p:grpSpPr>
       <p:sp>
         <p:nvSpPr>
-          <p:cNvPr id="5" name="Title 1">
-            <a:extLst>
-              <a:ext uri="{FF2B5EF4-FFF2-40B4-BE49-F238E27FC236}">
-                <a16:creationId xmlns:a16="http://schemas.microsoft.com/office/drawing/2014/main" xmlns="" id="{4EA3CB9E-619E-4288-9D33-73290203AB4F}"/>
-              </a:ext>
-            </a:extLst>
-          </p:cNvPr>
-          <p:cNvSpPr>
-            <a:spLocks noGrp="1"/>
-          </p:cNvSpPr>
-          <p:nvPr>
-            <p:ph type="title"/>
-          </p:nvPr>
+          <p:cNvPr id="3" name="TextBox 2"/>
+          <p:cNvSpPr txBox="1"/>
+          <p:nvPr/>
         </p:nvSpPr>
         <p:spPr>
           <a:xfrm>
-            <a:off x="838200" y="365125"/>
-            <a:ext cx="10515600" cy="575779"/>
-          </a:xfrm>
-        </p:spPr>
-        <p:txBody>
-          <a:bodyPr>
-            <a:noAutofit/>
+            <a:off x="2942339" y="5872312"/>
+            <a:ext cx="905184" cy="338554"/>
+          </a:xfrm>
+          <a:prstGeom prst="rect">
+            <a:avLst/>
+          </a:prstGeom>
+          <a:noFill/>
+        </p:spPr>
+        <p:txBody>
+          <a:bodyPr wrap="none" rtlCol="0">
+            <a:spAutoFit/>
           </a:bodyPr>
           <a:lstStyle/>
           <a:p>
             <a:r>
-              <a:rPr lang="en-US" sz="1800" b="1" i="0" dirty="0" err="1" smtClean="0">
-                <a:effectLst/>
-                <a:latin typeface="AdvPSA183"/>
-              </a:rPr>
-              <a:t>BarPlot</a:t>
-            </a:r>
-            <a:endParaRPr lang="en-US" sz="1800" b="1" dirty="0">
-              <a:latin typeface="AdvPSA183"/>
-            </a:endParaRPr>
+              <a:rPr lang="en-US" sz="1600" dirty="0"/>
+              <a:t>Up DEGs</a:t>
+            </a:r>
           </a:p>
         </p:txBody>
       </p:sp>
       <p:pic>
         <p:nvPicPr>
-          <p:cNvPr id="4098" name="Picture 2"/>
+          <p:cNvPr id="10243" name="Picture 3" descr="C:\Users\Fei\Dropbox (EinsteinMed)\Fei\RNA\Ian\GO_Down.png"/>
           <p:cNvPicPr>
             <a:picLocks noChangeAspect="1" noChangeArrowheads="1"/>
           </p:cNvPicPr>
           <p:nvPr/>
         </p:nvPicPr>
         <p:blipFill>
-          <a:blip r:embed="rId2">
+          <a:blip r:embed="rId2" cstate="print">
             <a:extLst>
               <a:ext uri="{28A0092B-C50C-407E-A947-70E740481C1C}">
                 <a14:useLocalDpi xmlns:a14="http://schemas.microsoft.com/office/drawing/2010/main" val="0"/>
@@ -5495,41 +5580,139 @@
         </p:blipFill>
         <p:spPr bwMode="auto">
           <a:xfrm>
-            <a:off x="4119563" y="849996"/>
-            <a:ext cx="3952875" cy="5534025"/>
+            <a:off x="6637359" y="1410055"/>
+            <a:ext cx="5368723" cy="4294979"/>
           </a:xfrm>
           <a:prstGeom prst="rect">
             <a:avLst/>
           </a:prstGeom>
           <a:noFill/>
-          <a:ln>
-            <a:noFill/>
-          </a:ln>
           <a:extLst>
             <a:ext uri="{909E8E84-426E-40DD-AFC4-6F175D3DCCD1}">
               <a14:hiddenFill xmlns:a14="http://schemas.microsoft.com/office/drawing/2010/main">
                 <a:solidFill>
-                  <a:schemeClr val="accent1"/>
+                  <a:srgbClr val="FFFFFF"/>
                 </a:solidFill>
               </a14:hiddenFill>
             </a:ext>
-            <a:ext uri="{91240B29-F687-4F45-9708-019B960494DF}">
-              <a14:hiddenLine xmlns:a14="http://schemas.microsoft.com/office/drawing/2010/main" w="9525">
+          </a:extLst>
+        </p:spPr>
+      </p:pic>
+      <p:sp>
+        <p:nvSpPr>
+          <p:cNvPr id="7" name="TextBox 6"/>
+          <p:cNvSpPr txBox="1"/>
+          <p:nvPr/>
+        </p:nvSpPr>
+        <p:spPr>
+          <a:xfrm>
+            <a:off x="8950032" y="5858165"/>
+            <a:ext cx="1156022" cy="338554"/>
+          </a:xfrm>
+          <a:prstGeom prst="rect">
+            <a:avLst/>
+          </a:prstGeom>
+          <a:noFill/>
+        </p:spPr>
+        <p:txBody>
+          <a:bodyPr wrap="none" rtlCol="0">
+            <a:spAutoFit/>
+          </a:bodyPr>
+          <a:lstStyle/>
+          <a:p>
+            <a:r>
+              <a:rPr lang="en-US" sz="1600" dirty="0"/>
+              <a:t>Down DEGs</a:t>
+            </a:r>
+          </a:p>
+        </p:txBody>
+      </p:sp>
+      <p:pic>
+        <p:nvPicPr>
+          <p:cNvPr id="10244" name="Picture 4" descr="C:\Users\Fei\Dropbox (EinsteinMed)\Fei\RNA\Ian\GO_Up.png"/>
+          <p:cNvPicPr>
+            <a:picLocks noChangeAspect="1" noChangeArrowheads="1"/>
+          </p:cNvPicPr>
+          <p:nvPr/>
+        </p:nvPicPr>
+        <p:blipFill>
+          <a:blip r:embed="rId3" cstate="print">
+            <a:extLst>
+              <a:ext uri="{28A0092B-C50C-407E-A947-70E740481C1C}">
+                <a14:useLocalDpi xmlns:a14="http://schemas.microsoft.com/office/drawing/2010/main" val="0"/>
+              </a:ext>
+            </a:extLst>
+          </a:blip>
+          <a:srcRect/>
+          <a:stretch>
+            <a:fillRect/>
+          </a:stretch>
+        </p:blipFill>
+        <p:spPr bwMode="auto">
+          <a:xfrm>
+            <a:off x="1019918" y="1410054"/>
+            <a:ext cx="5368723" cy="4294979"/>
+          </a:xfrm>
+          <a:prstGeom prst="rect">
+            <a:avLst/>
+          </a:prstGeom>
+          <a:noFill/>
+          <a:extLst>
+            <a:ext uri="{909E8E84-426E-40DD-AFC4-6F175D3DCCD1}">
+              <a14:hiddenFill xmlns:a14="http://schemas.microsoft.com/office/drawing/2010/main">
                 <a:solidFill>
-                  <a:schemeClr val="tx1"/>
+                  <a:srgbClr val="FFFFFF"/>
                 </a:solidFill>
-                <a:miter lim="800000"/>
-                <a:headEnd/>
-                <a:tailEnd/>
-              </a14:hiddenLine>
+              </a14:hiddenFill>
             </a:ext>
           </a:extLst>
         </p:spPr>
       </p:pic>
+      <p:sp>
+        <p:nvSpPr>
+          <p:cNvPr id="8" name="Title 1">
+            <a:extLst>
+              <a:ext uri="{FF2B5EF4-FFF2-40B4-BE49-F238E27FC236}">
+                <a16:creationId xmlns="" xmlns:a16="http://schemas.microsoft.com/office/drawing/2014/main" id="{4EA3CB9E-619E-4288-9D33-73290203AB4F}"/>
+              </a:ext>
+            </a:extLst>
+          </p:cNvPr>
+          <p:cNvSpPr>
+            <a:spLocks noGrp="1"/>
+          </p:cNvSpPr>
+          <p:nvPr>
+            <p:ph type="title"/>
+          </p:nvPr>
+        </p:nvSpPr>
+        <p:spPr>
+          <a:xfrm>
+            <a:off x="838200" y="365125"/>
+            <a:ext cx="10515600" cy="575779"/>
+          </a:xfrm>
+        </p:spPr>
+        <p:txBody>
+          <a:bodyPr>
+            <a:noAutofit/>
+          </a:bodyPr>
+          <a:lstStyle/>
+          <a:p>
+            <a:r>
+              <a:rPr lang="en-US" sz="1800" b="1" i="0" dirty="0" smtClean="0">
+                <a:effectLst/>
+                <a:latin typeface="AdvPSA183"/>
+              </a:rPr>
+              <a:t>Bubble Plots</a:t>
+            </a:r>
+            <a:endParaRPr lang="en-US" sz="1800" b="1" dirty="0">
+              <a:latin typeface="AdvPSA183"/>
+            </a:endParaRPr>
+          </a:p>
+        </p:txBody>
+      </p:sp>
     </p:spTree>
     <p:extLst>
       <p:ext uri="{BB962C8B-B14F-4D97-AF65-F5344CB8AC3E}">
-        <p14:creationId xmlns:p14="http://schemas.microsoft.com/office/powerpoint/2010/main" val="3753259725"/>
+        <p14:creationId xmlns:p14="http://schemas.microsoft.com/office/powerpoint/2010/main" val="3441741079"/>
       </p:ext>
     </p:extLst>
   </p:cSld>
@@ -5828,13 +6011,28 @@
   <a:extraClrSchemeLst/>
   <a:extLst>
     <a:ext uri="{05A4C25C-085E-4340-85A3-A5531E510DB2}">
-      <thm15:themeFamily xmlns:thm15="http://schemas.microsoft.com/office/thememl/2012/main" xmlns="" name="Office Theme" id="{62F939B6-93AF-4DB8-9C6B-D6C7DFDC589F}" vid="{4A3C46E8-61CC-4603-A589-7422A47A8E4A}"/>
+      <thm15:themeFamily xmlns="" xmlns:thm15="http://schemas.microsoft.com/office/thememl/2012/main" name="Office Theme" id="{62F939B6-93AF-4DB8-9C6B-D6C7DFDC589F}" vid="{4A3C46E8-61CC-4603-A589-7422A47A8E4A}"/>
     </a:ext>
   </a:extLst>
 </a:theme>
 </file>
 
 <file path=customXml/item1.xml><?xml version="1.0" encoding="utf-8"?>
+<p:properties xmlns:p="http://schemas.microsoft.com/office/2006/metadata/properties" xmlns:xsi="http://www.w3.org/2001/XMLSchema-instance" xmlns:pc="http://schemas.microsoft.com/office/infopath/2007/PartnerControls">
+  <documentManagement/>
+</p:properties>
+</file>
+
+<file path=customXml/item2.xml><?xml version="1.0" encoding="utf-8"?>
+<?mso-contentType ?>
+<FormTemplates xmlns="http://schemas.microsoft.com/sharepoint/v3/contenttype/forms">
+  <Display>DocumentLibraryForm</Display>
+  <Edit>DocumentLibraryForm</Edit>
+  <New>DocumentLibraryForm</New>
+</FormTemplates>
+</file>
+
+<file path=customXml/item3.xml><?xml version="1.0" encoding="utf-8"?>
 <ct:contentTypeSchema xmlns:ct="http://schemas.microsoft.com/office/2006/metadata/contentType" xmlns:ma="http://schemas.microsoft.com/office/2006/metadata/properties/metaAttributes" ct:_="" ma:_="" ma:contentTypeName="Document" ma:contentTypeID="0x010100510A9F56C5C7DB40A6D5FA625A26C59B" ma:contentTypeVersion="0" ma:contentTypeDescription="Create a new document." ma:contentTypeScope="" ma:versionID="30314e3a4c46119540c28cf1f2eba749">
   <xsd:schema xmlns:xsd="http://www.w3.org/2001/XMLSchema" xmlns:xs="http://www.w3.org/2001/XMLSchema" xmlns:p="http://schemas.microsoft.com/office/2006/metadata/properties" targetNamespace="http://schemas.microsoft.com/office/2006/metadata/properties" ma:root="true" ma:fieldsID="e24b8defeb99a9f6421f7a034d7af481">
     <xsd:element name="properties">
@@ -5948,22 +6146,30 @@
 </ct:contentTypeSchema>
 </file>
 
-<file path=customXml/item2.xml><?xml version="1.0" encoding="utf-8"?>
-<?mso-contentType ?>
-<FormTemplates xmlns="http://schemas.microsoft.com/sharepoint/v3/contenttype/forms">
-  <Display>DocumentLibraryForm</Display>
-  <Edit>DocumentLibraryForm</Edit>
-  <New>DocumentLibraryForm</New>
-</FormTemplates>
+<file path=customXml/itemProps1.xml><?xml version="1.0" encoding="utf-8"?>
+<ds:datastoreItem xmlns:ds="http://schemas.openxmlformats.org/officeDocument/2006/customXml" ds:itemID="{BD5F8EFF-0F12-4289-B513-E298FA73B1BC}">
+  <ds:schemaRefs>
+    <ds:schemaRef ds:uri="http://purl.org/dc/dcmitype/"/>
+    <ds:schemaRef ds:uri="http://purl.org/dc/elements/1.1/"/>
+    <ds:schemaRef ds:uri="http://schemas.microsoft.com/office/infopath/2007/PartnerControls"/>
+    <ds:schemaRef ds:uri="http://www.w3.org/XML/1998/namespace"/>
+    <ds:schemaRef ds:uri="http://schemas.microsoft.com/office/2006/documentManagement/types"/>
+    <ds:schemaRef ds:uri="http://schemas.openxmlformats.org/package/2006/metadata/core-properties"/>
+    <ds:schemaRef ds:uri="http://schemas.microsoft.com/office/2006/metadata/properties"/>
+    <ds:schemaRef ds:uri="http://purl.org/dc/terms/"/>
+  </ds:schemaRefs>
+</ds:datastoreItem>
 </file>
 
-<file path=customXml/item3.xml><?xml version="1.0" encoding="utf-8"?>
-<p:properties xmlns:p="http://schemas.microsoft.com/office/2006/metadata/properties" xmlns:xsi="http://www.w3.org/2001/XMLSchema-instance" xmlns:pc="http://schemas.microsoft.com/office/infopath/2007/PartnerControls">
-  <documentManagement/>
-</p:properties>
+<file path=customXml/itemProps2.xml><?xml version="1.0" encoding="utf-8"?>
+<ds:datastoreItem xmlns:ds="http://schemas.openxmlformats.org/officeDocument/2006/customXml" ds:itemID="{CFB14931-7A34-424B-8219-C00EBC115B69}">
+  <ds:schemaRefs>
+    <ds:schemaRef ds:uri="http://schemas.microsoft.com/sharepoint/v3/contenttype/forms"/>
+  </ds:schemaRefs>
+</ds:datastoreItem>
 </file>
 
-<file path=customXml/itemProps1.xml><?xml version="1.0" encoding="utf-8"?>
+<file path=customXml/itemProps3.xml><?xml version="1.0" encoding="utf-8"?>
 <ds:datastoreItem xmlns:ds="http://schemas.openxmlformats.org/officeDocument/2006/customXml" ds:itemID="{3128AD8D-C324-4694-A088-A063F01683D2}">
   <ds:schemaRefs>
     <ds:schemaRef ds:uri="http://schemas.microsoft.com/office/2006/metadata/contentType"/>
@@ -5977,27 +6183,4 @@
     <ds:schemaRef ds:uri="http://schemas.microsoft.com/office/infopath/2007/PartnerControls"/>
   </ds:schemaRefs>
 </ds:datastoreItem>
-</file>
-
-<file path=customXml/itemProps2.xml><?xml version="1.0" encoding="utf-8"?>
-<ds:datastoreItem xmlns:ds="http://schemas.openxmlformats.org/officeDocument/2006/customXml" ds:itemID="{CFB14931-7A34-424B-8219-C00EBC115B69}">
-  <ds:schemaRefs>
-    <ds:schemaRef ds:uri="http://schemas.microsoft.com/sharepoint/v3/contenttype/forms"/>
-  </ds:schemaRefs>
-</ds:datastoreItem>
-</file>
-
-<file path=customXml/itemProps3.xml><?xml version="1.0" encoding="utf-8"?>
-<ds:datastoreItem xmlns:ds="http://schemas.openxmlformats.org/officeDocument/2006/customXml" ds:itemID="{BD5F8EFF-0F12-4289-B513-E298FA73B1BC}">
-  <ds:schemaRefs>
-    <ds:schemaRef ds:uri="http://purl.org/dc/dcmitype/"/>
-    <ds:schemaRef ds:uri="http://purl.org/dc/elements/1.1/"/>
-    <ds:schemaRef ds:uri="http://schemas.microsoft.com/office/infopath/2007/PartnerControls"/>
-    <ds:schemaRef ds:uri="http://www.w3.org/XML/1998/namespace"/>
-    <ds:schemaRef ds:uri="http://schemas.microsoft.com/office/2006/documentManagement/types"/>
-    <ds:schemaRef ds:uri="http://schemas.openxmlformats.org/package/2006/metadata/core-properties"/>
-    <ds:schemaRef ds:uri="http://schemas.microsoft.com/office/2006/metadata/properties"/>
-    <ds:schemaRef ds:uri="http://purl.org/dc/terms/"/>
-  </ds:schemaRefs>
-</ds:datastoreItem>
 </file>
</xml_diff>